<commit_message>
maps added to presentation
</commit_message>
<xml_diff>
--- a/presentation/phs_stroke_presentation.pptx
+++ b/presentation/phs_stroke_presentation.pptx
@@ -5,7 +5,7 @@
     <p:sldMasterId id="2147483659" r:id="rId1"/>
   </p:sldMasterIdLst>
   <p:notesMasterIdLst>
-    <p:notesMasterId r:id="rId28"/>
+    <p:notesMasterId r:id="rId32"/>
   </p:notesMasterIdLst>
   <p:sldIdLst>
     <p:sldId id="256" r:id="rId2"/>
@@ -24,31 +24,35 @@
     <p:sldId id="287" r:id="rId15"/>
     <p:sldId id="288" r:id="rId16"/>
     <p:sldId id="295" r:id="rId17"/>
-    <p:sldId id="289" r:id="rId18"/>
-    <p:sldId id="292" r:id="rId19"/>
-    <p:sldId id="294" r:id="rId20"/>
-    <p:sldId id="293" r:id="rId21"/>
-    <p:sldId id="290" r:id="rId22"/>
-    <p:sldId id="269" r:id="rId23"/>
-    <p:sldId id="275" r:id="rId24"/>
-    <p:sldId id="274" r:id="rId25"/>
-    <p:sldId id="291" r:id="rId26"/>
-    <p:sldId id="279" r:id="rId27"/>
+    <p:sldId id="296" r:id="rId18"/>
+    <p:sldId id="297" r:id="rId19"/>
+    <p:sldId id="298" r:id="rId20"/>
+    <p:sldId id="299" r:id="rId21"/>
+    <p:sldId id="289" r:id="rId22"/>
+    <p:sldId id="292" r:id="rId23"/>
+    <p:sldId id="294" r:id="rId24"/>
+    <p:sldId id="293" r:id="rId25"/>
+    <p:sldId id="290" r:id="rId26"/>
+    <p:sldId id="269" r:id="rId27"/>
+    <p:sldId id="275" r:id="rId28"/>
+    <p:sldId id="274" r:id="rId29"/>
+    <p:sldId id="291" r:id="rId30"/>
+    <p:sldId id="279" r:id="rId31"/>
   </p:sldIdLst>
   <p:sldSz cx="9144000" cy="5143500" type="screen16x9"/>
   <p:notesSz cx="6858000" cy="9144000"/>
   <p:embeddedFontLst>
     <p:embeddedFont>
       <p:font typeface="Oswald" pitchFamily="2" charset="77"/>
-      <p:regular r:id="rId29"/>
-      <p:bold r:id="rId30"/>
+      <p:regular r:id="rId33"/>
+      <p:bold r:id="rId34"/>
     </p:embeddedFont>
     <p:embeddedFont>
       <p:font typeface="Source Sans Pro" panose="020B0503030403020204" pitchFamily="34" charset="0"/>
-      <p:regular r:id="rId31"/>
-      <p:bold r:id="rId32"/>
-      <p:italic r:id="rId33"/>
-      <p:boldItalic r:id="rId34"/>
+      <p:regular r:id="rId35"/>
+      <p:bold r:id="rId36"/>
+      <p:italic r:id="rId37"/>
+      <p:boldItalic r:id="rId38"/>
     </p:embeddedFont>
   </p:embeddedFontLst>
   <p:defaultTextStyle>
@@ -822,8 +826,8 @@
               <a:buNone/>
             </a:pPr>
             <a:r>
-              <a:rPr lang="en-GB" dirty="0"/>
-              <a:t>Talk about brief?</a:t>
+              <a:rPr lang="en-GB" b="1" u="sng" dirty="0"/>
+              <a:t>Brief</a:t>
             </a:r>
           </a:p>
           <a:p>
@@ -839,29 +843,38 @@
             <a:endParaRPr lang="en-GB" dirty="0"/>
           </a:p>
           <a:p>
-            <a:pPr marL="0" lvl="0" indent="0" algn="l" rtl="0">
+            <a:pPr marL="171450" lvl="0" indent="-171450" algn="l" rtl="0">
               <a:spcBef>
                 <a:spcPts val="0"/>
               </a:spcBef>
               <a:spcAft>
                 <a:spcPts val="0"/>
               </a:spcAft>
-              <a:buNone/>
             </a:pPr>
             <a:r>
               <a:rPr lang="en-GB" dirty="0"/>
-              <a:t>Look at discharge and mortality data and investigate the effects of demographics on the types of CVD</a:t>
+              <a:t>discharge and mortality data and investigate the effects of demographics on the types of CVD</a:t>
             </a:r>
           </a:p>
           <a:p>
-            <a:pPr marL="0" lvl="0" indent="0" algn="l" rtl="0">
+            <a:pPr marL="171450" lvl="0" indent="-171450" algn="l" rtl="0">
               <a:spcBef>
                 <a:spcPts val="0"/>
               </a:spcBef>
               <a:spcAft>
                 <a:spcPts val="0"/>
               </a:spcAft>
-              <a:buNone/>
+            </a:pPr>
+            <a:endParaRPr lang="en-GB" dirty="0"/>
+          </a:p>
+          <a:p>
+            <a:pPr marL="171450" lvl="0" indent="-171450" algn="l" rtl="0">
+              <a:spcBef>
+                <a:spcPts val="0"/>
+              </a:spcBef>
+              <a:spcAft>
+                <a:spcPts val="0"/>
+              </a:spcAft>
             </a:pPr>
             <a:r>
               <a:rPr lang="en-GB" dirty="0"/>
@@ -928,6 +941,190 @@
           <a:bodyPr/>
           <a:lstStyle/>
           <a:p>
+            <a:r>
+              <a:rPr lang="en-US" dirty="0"/>
+              <a:t>Had 13 years of data </a:t>
+            </a:r>
+          </a:p>
+          <a:p>
+            <a:r>
+              <a:rPr lang="en-US" dirty="0"/>
+              <a:t>Predicted on next 13 years</a:t>
+            </a:r>
+          </a:p>
+        </p:txBody>
+      </p:sp>
+    </p:spTree>
+    <p:extLst>
+      <p:ext uri="{BB962C8B-B14F-4D97-AF65-F5344CB8AC3E}">
+        <p14:creationId xmlns:p14="http://schemas.microsoft.com/office/powerpoint/2010/main" val="1235958171"/>
+      </p:ext>
+    </p:extLst>
+  </p:cSld>
+  <p:clrMapOvr>
+    <a:masterClrMapping/>
+  </p:clrMapOvr>
+</p:notes>
+</file>
+
+<file path=ppt/notesSlides/notesSlide11.xml><?xml version="1.0" encoding="utf-8"?>
+<p:notes xmlns:a="http://schemas.openxmlformats.org/drawingml/2006/main" xmlns:r="http://schemas.openxmlformats.org/officeDocument/2006/relationships" xmlns:p="http://schemas.openxmlformats.org/presentationml/2006/main" showMasterSp="0" showMasterPhAnim="0">
+  <p:cSld>
+    <p:spTree>
+      <p:nvGrpSpPr>
+        <p:cNvPr id="1" name="Shape 495"/>
+        <p:cNvGrpSpPr/>
+        <p:nvPr/>
+      </p:nvGrpSpPr>
+      <p:grpSpPr>
+        <a:xfrm>
+          <a:off x="0" y="0"/>
+          <a:ext cx="0" cy="0"/>
+          <a:chOff x="0" y="0"/>
+          <a:chExt cx="0" cy="0"/>
+        </a:xfrm>
+      </p:grpSpPr>
+      <p:sp>
+        <p:nvSpPr>
+          <p:cNvPr id="496" name="Google Shape;496;p:notes"/>
+          <p:cNvSpPr>
+            <a:spLocks noGrp="1" noRot="1" noChangeAspect="1"/>
+          </p:cNvSpPr>
+          <p:nvPr>
+            <p:ph type="sldImg" idx="2"/>
+          </p:nvPr>
+        </p:nvSpPr>
+        <p:spPr>
+          <a:xfrm>
+            <a:off x="381000" y="685800"/>
+            <a:ext cx="6096000" cy="3429000"/>
+          </a:xfrm>
+          <a:custGeom>
+            <a:avLst/>
+            <a:gdLst/>
+            <a:ahLst/>
+            <a:cxnLst/>
+            <a:rect l="l" t="t" r="r" b="b"/>
+            <a:pathLst>
+              <a:path w="120000" h="120000" extrusionOk="0">
+                <a:moveTo>
+                  <a:pt x="0" y="0"/>
+                </a:moveTo>
+                <a:lnTo>
+                  <a:pt x="120000" y="0"/>
+                </a:lnTo>
+                <a:lnTo>
+                  <a:pt x="120000" y="120000"/>
+                </a:lnTo>
+                <a:lnTo>
+                  <a:pt x="0" y="120000"/>
+                </a:lnTo>
+                <a:close/>
+              </a:path>
+            </a:pathLst>
+          </a:custGeom>
+        </p:spPr>
+      </p:sp>
+      <p:sp>
+        <p:nvSpPr>
+          <p:cNvPr id="497" name="Google Shape;497;p:notes"/>
+          <p:cNvSpPr txBox="1">
+            <a:spLocks noGrp="1"/>
+          </p:cNvSpPr>
+          <p:nvPr>
+            <p:ph type="body" idx="1"/>
+          </p:nvPr>
+        </p:nvSpPr>
+        <p:spPr>
+          <a:xfrm>
+            <a:off x="685800" y="4343400"/>
+            <a:ext cx="5486400" cy="4114800"/>
+          </a:xfrm>
+          <a:prstGeom prst="rect">
+            <a:avLst/>
+          </a:prstGeom>
+        </p:spPr>
+        <p:txBody>
+          <a:bodyPr spcFirstLastPara="1" wrap="square" lIns="91425" tIns="91425" rIns="91425" bIns="91425" anchor="t" anchorCtr="0">
+            <a:noAutofit/>
+          </a:bodyPr>
+          <a:lstStyle/>
+          <a:p>
+            <a:pPr marL="0" lvl="0" indent="0" algn="l" rtl="0">
+              <a:spcBef>
+                <a:spcPts val="0"/>
+              </a:spcBef>
+              <a:spcAft>
+                <a:spcPts val="0"/>
+              </a:spcAft>
+              <a:buNone/>
+            </a:pPr>
+            <a:endParaRPr dirty="0"/>
+          </a:p>
+        </p:txBody>
+      </p:sp>
+    </p:spTree>
+    <p:extLst>
+      <p:ext uri="{BB962C8B-B14F-4D97-AF65-F5344CB8AC3E}">
+        <p14:creationId xmlns:p14="http://schemas.microsoft.com/office/powerpoint/2010/main" val="2140799352"/>
+      </p:ext>
+    </p:extLst>
+  </p:cSld>
+  <p:clrMapOvr>
+    <a:masterClrMapping/>
+  </p:clrMapOvr>
+</p:notes>
+</file>
+
+<file path=ppt/notesSlides/notesSlide12.xml><?xml version="1.0" encoding="utf-8"?>
+<p:notes xmlns:a="http://schemas.openxmlformats.org/drawingml/2006/main" xmlns:r="http://schemas.openxmlformats.org/officeDocument/2006/relationships" xmlns:p="http://schemas.openxmlformats.org/presentationml/2006/main">
+  <p:cSld>
+    <p:spTree>
+      <p:nvGrpSpPr>
+        <p:cNvPr id="1" name=""/>
+        <p:cNvGrpSpPr/>
+        <p:nvPr/>
+      </p:nvGrpSpPr>
+      <p:grpSpPr>
+        <a:xfrm>
+          <a:off x="0" y="0"/>
+          <a:ext cx="0" cy="0"/>
+          <a:chOff x="0" y="0"/>
+          <a:chExt cx="0" cy="0"/>
+        </a:xfrm>
+      </p:grpSpPr>
+      <p:sp>
+        <p:nvSpPr>
+          <p:cNvPr id="2" name="Slide Image Placeholder 1"/>
+          <p:cNvSpPr>
+            <a:spLocks noGrp="1" noRot="1" noChangeAspect="1"/>
+          </p:cNvSpPr>
+          <p:nvPr>
+            <p:ph type="sldImg"/>
+          </p:nvPr>
+        </p:nvSpPr>
+        <p:spPr>
+          <a:xfrm>
+            <a:off x="381000" y="685800"/>
+            <a:ext cx="6096000" cy="3429000"/>
+          </a:xfrm>
+        </p:spPr>
+      </p:sp>
+      <p:sp>
+        <p:nvSpPr>
+          <p:cNvPr id="3" name="Notes Placeholder 2"/>
+          <p:cNvSpPr>
+            <a:spLocks noGrp="1"/>
+          </p:cNvSpPr>
+          <p:nvPr>
+            <p:ph type="body" idx="1"/>
+          </p:nvPr>
+        </p:nvSpPr>
+        <p:spPr/>
+        <p:txBody>
+          <a:bodyPr/>
+          <a:lstStyle/>
+          <a:p>
             <a:endParaRPr lang="en-US" dirty="0"/>
           </a:p>
         </p:txBody>
@@ -945,7 +1142,7 @@
 </p:notes>
 </file>
 
-<file path=ppt/notesSlides/notesSlide11.xml><?xml version="1.0" encoding="utf-8"?>
+<file path=ppt/notesSlides/notesSlide13.xml><?xml version="1.0" encoding="utf-8"?>
 <p:notes xmlns:a="http://schemas.openxmlformats.org/drawingml/2006/main" xmlns:r="http://schemas.openxmlformats.org/officeDocument/2006/relationships" xmlns:p="http://schemas.openxmlformats.org/presentationml/2006/main">
   <p:cSld>
     <p:spTree>
@@ -1247,13 +1444,98 @@
                 <a:srgbClr val="000000"/>
               </a:buClr>
               <a:buSzPts val="1400"/>
-              <a:buFont typeface="Arial"/>
               <a:buNone/>
               <a:tabLst/>
               <a:defRPr/>
             </a:pPr>
             <a:r>
-              <a:rPr lang="en-US" dirty="0"/>
+              <a:rPr lang="en-US" sz="2000" b="1" dirty="0"/>
+              <a:t>LEAD IN - CVD is a leading cause of death in Scotland</a:t>
+            </a:r>
+          </a:p>
+          <a:p>
+            <a:pPr marL="342900" marR="0" lvl="0" indent="-342900" algn="l" defTabSz="914400" rtl="0" eaLnBrk="1" fontAlgn="auto" latinLnBrk="0" hangingPunct="1">
+              <a:lnSpc>
+                <a:spcPct val="100000"/>
+              </a:lnSpc>
+              <a:spcBef>
+                <a:spcPts val="0"/>
+              </a:spcBef>
+              <a:spcAft>
+                <a:spcPts val="0"/>
+              </a:spcAft>
+              <a:buClr>
+                <a:srgbClr val="000000"/>
+              </a:buClr>
+              <a:buSzPts val="1400"/>
+              <a:tabLst/>
+              <a:defRPr/>
+            </a:pPr>
+            <a:endParaRPr lang="en-US" sz="2000" dirty="0"/>
+          </a:p>
+          <a:p>
+            <a:pPr marL="342900" marR="0" lvl="0" indent="-342900" algn="l" defTabSz="914400" rtl="0" eaLnBrk="1" fontAlgn="auto" latinLnBrk="0" hangingPunct="1">
+              <a:lnSpc>
+                <a:spcPct val="100000"/>
+              </a:lnSpc>
+              <a:spcBef>
+                <a:spcPts val="0"/>
+              </a:spcBef>
+              <a:spcAft>
+                <a:spcPts val="0"/>
+              </a:spcAft>
+              <a:buClr>
+                <a:srgbClr val="000000"/>
+              </a:buClr>
+              <a:buSzPts val="1400"/>
+              <a:tabLst/>
+              <a:defRPr/>
+            </a:pPr>
+            <a:r>
+              <a:rPr lang="en-US" sz="2000" dirty="0"/>
+              <a:t>Nearly 4000 deaths in 2021</a:t>
+            </a:r>
+          </a:p>
+          <a:p>
+            <a:pPr marL="342900" marR="0" lvl="0" indent="-342900" algn="l" defTabSz="914400" rtl="0" eaLnBrk="1" fontAlgn="auto" latinLnBrk="0" hangingPunct="1">
+              <a:lnSpc>
+                <a:spcPct val="100000"/>
+              </a:lnSpc>
+              <a:spcBef>
+                <a:spcPts val="0"/>
+              </a:spcBef>
+              <a:spcAft>
+                <a:spcPts val="0"/>
+              </a:spcAft>
+              <a:buClr>
+                <a:srgbClr val="000000"/>
+              </a:buClr>
+              <a:buSzPts val="1400"/>
+              <a:tabLst/>
+              <a:defRPr/>
+            </a:pPr>
+            <a:endParaRPr lang="en-US" sz="2000" dirty="0"/>
+          </a:p>
+          <a:p>
+            <a:pPr marL="342900" marR="0" lvl="0" indent="-342900" algn="l" defTabSz="914400" rtl="0" eaLnBrk="1" fontAlgn="auto" latinLnBrk="0" hangingPunct="1">
+              <a:lnSpc>
+                <a:spcPct val="100000"/>
+              </a:lnSpc>
+              <a:spcBef>
+                <a:spcPts val="0"/>
+              </a:spcBef>
+              <a:spcAft>
+                <a:spcPts val="0"/>
+              </a:spcAft>
+              <a:buClr>
+                <a:srgbClr val="000000"/>
+              </a:buClr>
+              <a:buSzPts val="1400"/>
+              <a:tabLst/>
+              <a:defRPr/>
+            </a:pPr>
+            <a:r>
+              <a:rPr lang="en-US" sz="2000" dirty="0"/>
               <a:t>130,000 is 2.4% of population</a:t>
             </a:r>
           </a:p>
@@ -1375,11 +1657,11 @@
               <a:defRPr/>
             </a:pPr>
             <a:r>
-              <a:rPr lang="en-GB" sz="1100" dirty="0">
+              <a:rPr lang="en-GB" sz="1100" b="1" dirty="0">
                 <a:effectLst/>
                 <a:latin typeface="ArialMT"/>
               </a:rPr>
-              <a:t>So I’ve mentioned the different types of CVD that exist but what is the most common. </a:t>
+              <a:t>LEAD IN - So I’ve mentioned the different types of CVD that exist but what is the most common. </a:t>
             </a:r>
           </a:p>
           <a:p>
@@ -1402,16 +1684,39 @@
               <a:tabLst/>
               <a:defRPr/>
             </a:pPr>
+            <a:endParaRPr lang="en-GB" sz="1100" b="1" dirty="0">
+              <a:effectLst/>
+              <a:latin typeface="ArialMT"/>
+            </a:endParaRPr>
+          </a:p>
+          <a:p>
+            <a:pPr marL="171450" marR="0" lvl="0" indent="-171450" algn="l" defTabSz="914400" rtl="0" eaLnBrk="1" fontAlgn="auto" latinLnBrk="0" hangingPunct="1">
+              <a:lnSpc>
+                <a:spcPct val="100000"/>
+              </a:lnSpc>
+              <a:spcBef>
+                <a:spcPts val="0"/>
+              </a:spcBef>
+              <a:spcAft>
+                <a:spcPts val="0"/>
+              </a:spcAft>
+              <a:buClr>
+                <a:srgbClr val="000000"/>
+              </a:buClr>
+              <a:buSzPts val="1400"/>
+              <a:tabLst/>
+              <a:defRPr/>
+            </a:pPr>
             <a:r>
               <a:rPr lang="en-GB" sz="1100" dirty="0">
                 <a:effectLst/>
                 <a:latin typeface="ArialMT"/>
               </a:rPr>
-              <a:t>In terms of number of discharges stroke is by far the most common</a:t>
+              <a:t>In terms of discharge data - stroke is by far the most common</a:t>
             </a:r>
           </a:p>
           <a:p>
-            <a:pPr marL="0" marR="0" lvl="0" indent="0" algn="l" defTabSz="914400" rtl="0" eaLnBrk="1" fontAlgn="auto" latinLnBrk="0" hangingPunct="1">
+            <a:pPr marL="171450" marR="0" lvl="0" indent="-171450" algn="l" defTabSz="914400" rtl="0" eaLnBrk="1" fontAlgn="auto" latinLnBrk="0" hangingPunct="1">
               <a:lnSpc>
                 <a:spcPct val="100000"/>
               </a:lnSpc>
@@ -1425,8 +1730,6 @@
                 <a:srgbClr val="000000"/>
               </a:buClr>
               <a:buSzPts val="1400"/>
-              <a:buFont typeface="Arial"/>
-              <a:buNone/>
               <a:tabLst/>
               <a:defRPr/>
             </a:pPr>
@@ -1458,13 +1761,10 @@
               <a:tabLst/>
               <a:defRPr/>
             </a:pPr>
-            <a:r>
-              <a:rPr lang="en-GB" sz="1100" dirty="0">
-                <a:effectLst/>
-                <a:latin typeface="ArialMT"/>
-              </a:rPr>
-              <a:t>The mortality data categorised TIAs under Other CVD</a:t>
-            </a:r>
+            <a:endParaRPr lang="en-GB" sz="1100" b="1" u="sng" dirty="0">
+              <a:effectLst/>
+              <a:latin typeface="ArialMT"/>
+            </a:endParaRPr>
           </a:p>
           <a:p>
             <a:pPr marL="0" marR="0" lvl="0" indent="0" algn="l" defTabSz="914400" rtl="0" eaLnBrk="1" fontAlgn="auto" latinLnBrk="0" hangingPunct="1">
@@ -1487,15 +1787,15 @@
               <a:defRPr/>
             </a:pPr>
             <a:r>
-              <a:rPr lang="en-GB" sz="1100" dirty="0">
+              <a:rPr lang="en-GB" sz="1100" b="1" u="sng" dirty="0">
                 <a:effectLst/>
                 <a:latin typeface="ArialMT"/>
               </a:rPr>
-              <a:t>That could be why Other CVD is so high but this category also includes something called “sequelae of CVD” </a:t>
+              <a:t>Other CVD</a:t>
             </a:r>
           </a:p>
           <a:p>
-            <a:pPr marL="0" marR="0" lvl="0" indent="0" algn="l" defTabSz="914400" rtl="0" eaLnBrk="1" fontAlgn="auto" latinLnBrk="0" hangingPunct="1">
+            <a:pPr marL="171450" marR="0" lvl="0" indent="-171450" algn="l" defTabSz="914400" rtl="0" eaLnBrk="1" fontAlgn="auto" latinLnBrk="0" hangingPunct="1">
               <a:lnSpc>
                 <a:spcPct val="100000"/>
               </a:lnSpc>
@@ -1509,8 +1809,6 @@
                 <a:srgbClr val="000000"/>
               </a:buClr>
               <a:buSzPts val="1400"/>
-              <a:buFont typeface="Arial"/>
-              <a:buNone/>
               <a:tabLst/>
               <a:defRPr/>
             </a:pPr>
@@ -1519,11 +1817,11 @@
                 <a:effectLst/>
                 <a:latin typeface="ArialMT"/>
               </a:rPr>
-              <a:t>Sequelae – consequence of previous disease or injury</a:t>
+              <a:t>Other CVD also has a high mortality rate</a:t>
             </a:r>
           </a:p>
           <a:p>
-            <a:pPr marL="0" marR="0" lvl="0" indent="0" algn="l" defTabSz="914400" rtl="0" eaLnBrk="1" fontAlgn="auto" latinLnBrk="0" hangingPunct="1">
+            <a:pPr marL="171450" marR="0" lvl="0" indent="-171450" algn="l" defTabSz="914400" rtl="0" eaLnBrk="1" fontAlgn="auto" latinLnBrk="0" hangingPunct="1">
               <a:lnSpc>
                 <a:spcPct val="100000"/>
               </a:lnSpc>
@@ -1537,8 +1835,58 @@
                 <a:srgbClr val="000000"/>
               </a:buClr>
               <a:buSzPts val="1400"/>
-              <a:buFont typeface="Arial"/>
-              <a:buNone/>
+              <a:tabLst/>
+              <a:defRPr/>
+            </a:pPr>
+            <a:r>
+              <a:rPr lang="en-GB" sz="1100" dirty="0">
+                <a:effectLst/>
+                <a:latin typeface="ArialMT"/>
+              </a:rPr>
+              <a:t>This category includes something called “sequelae of CVD” </a:t>
+            </a:r>
+          </a:p>
+          <a:p>
+            <a:pPr marL="171450" marR="0" lvl="0" indent="-171450" algn="l" defTabSz="914400" rtl="0" eaLnBrk="1" fontAlgn="auto" latinLnBrk="0" hangingPunct="1">
+              <a:lnSpc>
+                <a:spcPct val="100000"/>
+              </a:lnSpc>
+              <a:spcBef>
+                <a:spcPts val="0"/>
+              </a:spcBef>
+              <a:spcAft>
+                <a:spcPts val="0"/>
+              </a:spcAft>
+              <a:buClr>
+                <a:srgbClr val="000000"/>
+              </a:buClr>
+              <a:buSzPts val="1400"/>
+              <a:tabLst/>
+              <a:defRPr/>
+            </a:pPr>
+            <a:r>
+              <a:rPr lang="en-GB" sz="1100" dirty="0">
+                <a:effectLst/>
+                <a:latin typeface="ArialMT"/>
+              </a:rPr>
+              <a:t>Sequelae – consequence of CVD incident</a:t>
+            </a:r>
+          </a:p>
+          <a:p>
+            <a:pPr marL="171450" marR="0" lvl="0" indent="-171450" algn="l" defTabSz="914400" rtl="0" eaLnBrk="1" fontAlgn="auto" latinLnBrk="0" hangingPunct="1">
+              <a:lnSpc>
+                <a:spcPct val="100000"/>
+              </a:lnSpc>
+              <a:spcBef>
+                <a:spcPts val="0"/>
+              </a:spcBef>
+              <a:spcAft>
+                <a:spcPts val="0"/>
+              </a:spcAft>
+              <a:buClr>
+                <a:srgbClr val="000000"/>
+              </a:buClr>
+              <a:buSzPts val="1400"/>
               <a:tabLst/>
               <a:defRPr/>
             </a:pPr>
@@ -1738,13 +2086,116 @@
               <a:defRPr/>
             </a:pPr>
             <a:r>
+              <a:rPr lang="en-GB" sz="1100" b="1" dirty="0">
+                <a:solidFill>
+                  <a:srgbClr val="000000"/>
+                </a:solidFill>
+                <a:latin typeface="Helvetica Neue" panose="02000503000000020004" pitchFamily="2" charset="0"/>
+              </a:rPr>
+              <a:t>LEAD IN – if we break down the data further into different age groups</a:t>
+            </a:r>
+          </a:p>
+          <a:p>
+            <a:pPr marL="0" marR="0" lvl="0" indent="0" algn="l" defTabSz="914400" rtl="0" eaLnBrk="1" fontAlgn="auto" latinLnBrk="0" hangingPunct="1">
+              <a:lnSpc>
+                <a:spcPct val="100000"/>
+              </a:lnSpc>
+              <a:spcBef>
+                <a:spcPts val="0"/>
+              </a:spcBef>
+              <a:spcAft>
+                <a:spcPts val="0"/>
+              </a:spcAft>
+              <a:buClrTx/>
+              <a:buSzTx/>
+              <a:buFontTx/>
+              <a:buNone/>
+              <a:tabLst/>
+              <a:defRPr/>
+            </a:pPr>
+            <a:endParaRPr lang="en-GB" sz="1100" dirty="0">
+              <a:solidFill>
+                <a:srgbClr val="000000"/>
+              </a:solidFill>
+              <a:latin typeface="Helvetica Neue" panose="02000503000000020004" pitchFamily="2" charset="0"/>
+            </a:endParaRPr>
+          </a:p>
+          <a:p>
+            <a:pPr marL="171450" marR="0" lvl="0" indent="-171450" algn="l" defTabSz="914400" rtl="0" eaLnBrk="1" fontAlgn="auto" latinLnBrk="0" hangingPunct="1">
+              <a:lnSpc>
+                <a:spcPct val="100000"/>
+              </a:lnSpc>
+              <a:spcBef>
+                <a:spcPts val="0"/>
+              </a:spcBef>
+              <a:spcAft>
+                <a:spcPts val="0"/>
+              </a:spcAft>
+              <a:buClrTx/>
+              <a:buSzTx/>
+              <a:tabLst/>
+              <a:defRPr/>
+            </a:pPr>
+            <a:r>
               <a:rPr lang="en-GB" sz="1100" dirty="0">
                 <a:solidFill>
                   <a:srgbClr val="000000"/>
                 </a:solidFill>
                 <a:latin typeface="Helvetica Neue" panose="02000503000000020004" pitchFamily="2" charset="0"/>
               </a:rPr>
-              <a:t>LEAD IN</a:t>
+              <a:t>For most categories the discharges increase with age </a:t>
+            </a:r>
+          </a:p>
+          <a:p>
+            <a:pPr marL="171450" marR="0" lvl="0" indent="-171450" algn="l" defTabSz="914400" rtl="0" eaLnBrk="1" fontAlgn="auto" latinLnBrk="0" hangingPunct="1">
+              <a:lnSpc>
+                <a:spcPct val="100000"/>
+              </a:lnSpc>
+              <a:spcBef>
+                <a:spcPts val="0"/>
+              </a:spcBef>
+              <a:spcAft>
+                <a:spcPts val="0"/>
+              </a:spcAft>
+              <a:buClrTx/>
+              <a:buSzTx/>
+              <a:tabLst/>
+              <a:defRPr/>
+            </a:pPr>
+            <a:r>
+              <a:rPr lang="en-GB" sz="1100" dirty="0">
+                <a:solidFill>
+                  <a:srgbClr val="000000"/>
+                </a:solidFill>
+                <a:latin typeface="Helvetica Neue" panose="02000503000000020004" pitchFamily="2" charset="0"/>
+              </a:rPr>
+              <a:t>but SAH affects younger age groups at a similar level to over 75s</a:t>
+            </a:r>
+          </a:p>
+          <a:p>
+            <a:pPr marL="171450" marR="0" lvl="0" indent="-171450" algn="l" defTabSz="914400" rtl="0" eaLnBrk="1" fontAlgn="auto" latinLnBrk="0" hangingPunct="1">
+              <a:lnSpc>
+                <a:spcPct val="100000"/>
+              </a:lnSpc>
+              <a:spcBef>
+                <a:spcPts val="0"/>
+              </a:spcBef>
+              <a:spcAft>
+                <a:spcPts val="0"/>
+              </a:spcAft>
+              <a:buClrTx/>
+              <a:buSzTx/>
+              <a:tabLst/>
+              <a:defRPr/>
+            </a:pPr>
+            <a:r>
+              <a:rPr lang="en-GB" sz="1100" dirty="0">
+                <a:solidFill>
+                  <a:srgbClr val="000000"/>
+                </a:solidFill>
+                <a:latin typeface="Helvetica Neue" panose="02000503000000020004" pitchFamily="2" charset="0"/>
+              </a:rPr>
+              <a:t>Mortality data shows that the chance of survival is better for younger age groups – which is what we would expect. </a:t>
             </a:r>
           </a:p>
           <a:p>
@@ -1790,71 +2241,12 @@
               <a:tabLst/>
               <a:defRPr/>
             </a:pPr>
-            <a:r>
-              <a:rPr lang="en-GB" sz="1100" dirty="0">
-                <a:solidFill>
-                  <a:srgbClr val="000000"/>
-                </a:solidFill>
-                <a:latin typeface="Helvetica Neue" panose="02000503000000020004" pitchFamily="2" charset="0"/>
-              </a:rPr>
-              <a:t>For most categories the discharges increase with age as you might expect</a:t>
-            </a:r>
-          </a:p>
-          <a:p>
-            <a:pPr marL="0" marR="0" lvl="0" indent="0" algn="l" defTabSz="914400" rtl="0" eaLnBrk="1" fontAlgn="auto" latinLnBrk="0" hangingPunct="1">
-              <a:lnSpc>
-                <a:spcPct val="100000"/>
-              </a:lnSpc>
-              <a:spcBef>
-                <a:spcPts val="0"/>
-              </a:spcBef>
-              <a:spcAft>
-                <a:spcPts val="0"/>
-              </a:spcAft>
-              <a:buClrTx/>
-              <a:buSzTx/>
-              <a:buFontTx/>
-              <a:buNone/>
-              <a:tabLst/>
-              <a:defRPr/>
-            </a:pPr>
-            <a:r>
-              <a:rPr lang="en-GB" sz="1100" dirty="0">
-                <a:solidFill>
-                  <a:srgbClr val="000000"/>
-                </a:solidFill>
-                <a:latin typeface="Helvetica Neue" panose="02000503000000020004" pitchFamily="2" charset="0"/>
-              </a:rPr>
-              <a:t>but SAH affects younger age groups</a:t>
-            </a:r>
-          </a:p>
-          <a:p>
-            <a:pPr marL="0" marR="0" lvl="0" indent="0" algn="l" defTabSz="914400" rtl="0" eaLnBrk="1" fontAlgn="auto" latinLnBrk="0" hangingPunct="1">
-              <a:lnSpc>
-                <a:spcPct val="100000"/>
-              </a:lnSpc>
-              <a:spcBef>
-                <a:spcPts val="0"/>
-              </a:spcBef>
-              <a:spcAft>
-                <a:spcPts val="0"/>
-              </a:spcAft>
-              <a:buClrTx/>
-              <a:buSzTx/>
-              <a:buFontTx/>
-              <a:buNone/>
-              <a:tabLst/>
-              <a:defRPr/>
-            </a:pPr>
-            <a:r>
-              <a:rPr lang="en-GB" sz="1100" dirty="0">
-                <a:solidFill>
-                  <a:srgbClr val="000000"/>
-                </a:solidFill>
-                <a:latin typeface="Helvetica Neue" panose="02000503000000020004" pitchFamily="2" charset="0"/>
-              </a:rPr>
-              <a:t>Mortality data follows a similar trend for all categories but it appears that more younger people survive </a:t>
-            </a:r>
+            <a:endParaRPr lang="en-GB" sz="1100" dirty="0">
+              <a:solidFill>
+                <a:srgbClr val="000000"/>
+              </a:solidFill>
+              <a:latin typeface="Helvetica Neue" panose="02000503000000020004" pitchFamily="2" charset="0"/>
+            </a:endParaRPr>
           </a:p>
           <a:p>
             <a:pPr marL="0" marR="0" lvl="0" indent="0" algn="l" defTabSz="914400" rtl="0" eaLnBrk="1" fontAlgn="auto" latinLnBrk="0" hangingPunct="1">
@@ -1880,181 +2272,6 @@
               </a:solidFill>
               <a:latin typeface="Helvetica Neue" panose="02000503000000020004" pitchFamily="2" charset="0"/>
             </a:endParaRPr>
-          </a:p>
-          <a:p>
-            <a:pPr marL="0" marR="0" lvl="0" indent="0" algn="l" defTabSz="914400" rtl="0" eaLnBrk="1" fontAlgn="auto" latinLnBrk="0" hangingPunct="1">
-              <a:lnSpc>
-                <a:spcPct val="100000"/>
-              </a:lnSpc>
-              <a:spcBef>
-                <a:spcPts val="0"/>
-              </a:spcBef>
-              <a:spcAft>
-                <a:spcPts val="0"/>
-              </a:spcAft>
-              <a:buClrTx/>
-              <a:buSzTx/>
-              <a:buFontTx/>
-              <a:buNone/>
-              <a:tabLst/>
-              <a:defRPr/>
-            </a:pPr>
-            <a:endParaRPr lang="en-GB" sz="1100" dirty="0">
-              <a:solidFill>
-                <a:srgbClr val="000000"/>
-              </a:solidFill>
-              <a:latin typeface="Helvetica Neue" panose="02000503000000020004" pitchFamily="2" charset="0"/>
-            </a:endParaRPr>
-          </a:p>
-          <a:p>
-            <a:pPr marL="0" marR="0" lvl="0" indent="0" algn="l" defTabSz="914400" rtl="0" eaLnBrk="1" fontAlgn="auto" latinLnBrk="0" hangingPunct="1">
-              <a:lnSpc>
-                <a:spcPct val="100000"/>
-              </a:lnSpc>
-              <a:spcBef>
-                <a:spcPts val="0"/>
-              </a:spcBef>
-              <a:spcAft>
-                <a:spcPts val="0"/>
-              </a:spcAft>
-              <a:buClrTx/>
-              <a:buSzTx/>
-              <a:buFontTx/>
-              <a:buNone/>
-              <a:tabLst/>
-              <a:defRPr/>
-            </a:pPr>
-            <a:endParaRPr lang="en-GB" sz="1100" dirty="0">
-              <a:solidFill>
-                <a:srgbClr val="000000"/>
-              </a:solidFill>
-              <a:latin typeface="Helvetica Neue" panose="02000503000000020004" pitchFamily="2" charset="0"/>
-            </a:endParaRPr>
-          </a:p>
-          <a:p>
-            <a:pPr marL="0" marR="0" lvl="0" indent="0" algn="l" defTabSz="914400" rtl="0" eaLnBrk="1" fontAlgn="auto" latinLnBrk="0" hangingPunct="1">
-              <a:lnSpc>
-                <a:spcPct val="100000"/>
-              </a:lnSpc>
-              <a:spcBef>
-                <a:spcPts val="0"/>
-              </a:spcBef>
-              <a:spcAft>
-                <a:spcPts val="0"/>
-              </a:spcAft>
-              <a:buClrTx/>
-              <a:buSzTx/>
-              <a:buFontTx/>
-              <a:buNone/>
-              <a:tabLst/>
-              <a:defRPr/>
-            </a:pPr>
-            <a:endParaRPr lang="en-GB" sz="1100" dirty="0">
-              <a:solidFill>
-                <a:srgbClr val="000000"/>
-              </a:solidFill>
-              <a:latin typeface="Helvetica Neue" panose="02000503000000020004" pitchFamily="2" charset="0"/>
-            </a:endParaRPr>
-          </a:p>
-          <a:p>
-            <a:pPr marL="0" marR="0" lvl="0" indent="0" algn="l" defTabSz="914400" rtl="0" eaLnBrk="1" fontAlgn="auto" latinLnBrk="0" hangingPunct="1">
-              <a:lnSpc>
-                <a:spcPct val="100000"/>
-              </a:lnSpc>
-              <a:spcBef>
-                <a:spcPts val="0"/>
-              </a:spcBef>
-              <a:spcAft>
-                <a:spcPts val="0"/>
-              </a:spcAft>
-              <a:buClrTx/>
-              <a:buSzTx/>
-              <a:buFontTx/>
-              <a:buNone/>
-              <a:tabLst/>
-              <a:defRPr/>
-            </a:pPr>
-            <a:r>
-              <a:rPr lang="en-GB" sz="1100" dirty="0">
-                <a:effectLst/>
-                <a:latin typeface="ArialMT"/>
-              </a:rPr>
-              <a:t>LEAD IN – I’m going to go on to discuss how CVD affects different age groups, sex and </a:t>
-            </a:r>
-          </a:p>
-          <a:p>
-            <a:pPr marL="0" marR="0" lvl="0" indent="0" algn="l" defTabSz="914400" rtl="0" eaLnBrk="1" fontAlgn="auto" latinLnBrk="0" hangingPunct="1">
-              <a:lnSpc>
-                <a:spcPct val="100000"/>
-              </a:lnSpc>
-              <a:spcBef>
-                <a:spcPts val="0"/>
-              </a:spcBef>
-              <a:spcAft>
-                <a:spcPts val="0"/>
-              </a:spcAft>
-              <a:buClrTx/>
-              <a:buSzTx/>
-              <a:buFontTx/>
-              <a:buNone/>
-              <a:tabLst/>
-              <a:defRPr/>
-            </a:pPr>
-            <a:r>
-              <a:rPr lang="en-GB" sz="1100" dirty="0">
-                <a:solidFill>
-                  <a:srgbClr val="000000"/>
-                </a:solidFill>
-                <a:latin typeface="Helvetica Neue" panose="02000503000000020004" pitchFamily="2" charset="0"/>
-              </a:rPr>
-              <a:t>It is important to note at this point that I’ll be showing </a:t>
-            </a:r>
-            <a:r>
-              <a:rPr lang="en-GB" sz="1100" dirty="0" err="1">
-                <a:solidFill>
-                  <a:srgbClr val="000000"/>
-                </a:solidFill>
-                <a:latin typeface="Helvetica Neue" panose="02000503000000020004" pitchFamily="2" charset="0"/>
-              </a:rPr>
-              <a:t>easr</a:t>
-            </a:r>
-            <a:r>
-              <a:rPr lang="en-GB" sz="1100" dirty="0">
-                <a:solidFill>
-                  <a:srgbClr val="000000"/>
-                </a:solidFill>
-                <a:latin typeface="Helvetica Neue" panose="02000503000000020004" pitchFamily="2" charset="0"/>
-              </a:rPr>
-              <a:t> values from now on. What are these?</a:t>
-            </a:r>
-          </a:p>
-          <a:p>
-            <a:pPr marL="0" marR="0" lvl="0" indent="0" algn="l" defTabSz="914400" rtl="0" eaLnBrk="1" fontAlgn="auto" latinLnBrk="0" hangingPunct="1">
-              <a:lnSpc>
-                <a:spcPct val="100000"/>
-              </a:lnSpc>
-              <a:spcBef>
-                <a:spcPts val="0"/>
-              </a:spcBef>
-              <a:spcAft>
-                <a:spcPts val="0"/>
-              </a:spcAft>
-              <a:buClrTx/>
-              <a:buSzTx/>
-              <a:buFontTx/>
-              <a:buNone/>
-              <a:tabLst/>
-              <a:defRPr/>
-            </a:pPr>
-            <a:r>
-              <a:rPr lang="en-GB" sz="1100" dirty="0">
-                <a:solidFill>
-                  <a:srgbClr val="000000"/>
-                </a:solidFill>
-                <a:latin typeface="Helvetica Neue" panose="02000503000000020004" pitchFamily="2" charset="0"/>
-              </a:rPr>
-              <a:t>This means the data is reported per 100,000 people and adjusted for age and sex. </a:t>
-            </a:r>
           </a:p>
           <a:p>
             <a:pPr marL="0" marR="0" lvl="0" indent="0" algn="l" defTabSz="914400" rtl="0" eaLnBrk="1" fontAlgn="auto" latinLnBrk="0" hangingPunct="1">
@@ -2197,11 +2414,74 @@
               <a:defRPr/>
             </a:pPr>
             <a:r>
+              <a:rPr lang="en-GB" sz="1100" b="1" dirty="0">
+                <a:effectLst/>
+                <a:latin typeface="ArialMT"/>
+              </a:rPr>
+              <a:t>LEAD IN – if we look at the data broken down by sex</a:t>
+            </a:r>
+          </a:p>
+          <a:p>
+            <a:pPr marL="0" marR="0" lvl="0" indent="0" algn="l" defTabSz="914400" rtl="0" eaLnBrk="1" fontAlgn="auto" latinLnBrk="0" hangingPunct="1">
+              <a:lnSpc>
+                <a:spcPct val="100000"/>
+              </a:lnSpc>
+              <a:spcBef>
+                <a:spcPts val="0"/>
+              </a:spcBef>
+              <a:spcAft>
+                <a:spcPts val="0"/>
+              </a:spcAft>
+              <a:buClrTx/>
+              <a:buSzTx/>
+              <a:buFontTx/>
+              <a:buNone/>
+              <a:tabLst/>
+              <a:defRPr/>
+            </a:pPr>
+            <a:endParaRPr lang="en-GB" sz="1100" b="1" dirty="0">
+              <a:effectLst/>
+              <a:latin typeface="ArialMT"/>
+            </a:endParaRPr>
+          </a:p>
+          <a:p>
+            <a:pPr marL="0" marR="0" lvl="0" indent="0" algn="l" defTabSz="914400" rtl="0" eaLnBrk="1" fontAlgn="auto" latinLnBrk="0" hangingPunct="1">
+              <a:lnSpc>
+                <a:spcPct val="100000"/>
+              </a:lnSpc>
+              <a:spcBef>
+                <a:spcPts val="0"/>
+              </a:spcBef>
+              <a:spcAft>
+                <a:spcPts val="0"/>
+              </a:spcAft>
+              <a:buClrTx/>
+              <a:buSzTx/>
+              <a:buFontTx/>
+              <a:buNone/>
+              <a:tabLst/>
+              <a:defRPr/>
+            </a:pPr>
+            <a:r>
               <a:rPr lang="en-GB" sz="1100" dirty="0">
                 <a:effectLst/>
                 <a:latin typeface="ArialMT"/>
               </a:rPr>
-              <a:t>LEAD IN – I’m going to go on to discuss how CVD affects different age groups, sex and </a:t>
+              <a:t>It is again subarachnoid </a:t>
+            </a:r>
+            <a:r>
+              <a:rPr lang="en-GB" sz="1100" dirty="0" err="1">
+                <a:effectLst/>
+                <a:latin typeface="ArialMT"/>
+              </a:rPr>
+              <a:t>heamorrhage</a:t>
+            </a:r>
+            <a:r>
+              <a:rPr lang="en-GB" sz="1100" dirty="0">
+                <a:effectLst/>
+                <a:latin typeface="ArialMT"/>
+              </a:rPr>
+              <a:t> which shows a different pattern. </a:t>
             </a:r>
           </a:p>
           <a:p>
@@ -2245,6 +2525,32 @@
               <a:tabLst/>
               <a:defRPr/>
             </a:pPr>
+            <a:r>
+              <a:rPr lang="en-GB" sz="1100" dirty="0">
+                <a:effectLst/>
+                <a:latin typeface="ArialMT"/>
+              </a:rPr>
+              <a:t>SAH is the only type of CVD with female predominance</a:t>
+            </a:r>
+          </a:p>
+          <a:p>
+            <a:pPr marL="0" marR="0" lvl="0" indent="0" algn="l" defTabSz="914400" rtl="0" eaLnBrk="1" fontAlgn="auto" latinLnBrk="0" hangingPunct="1">
+              <a:lnSpc>
+                <a:spcPct val="100000"/>
+              </a:lnSpc>
+              <a:spcBef>
+                <a:spcPts val="0"/>
+              </a:spcBef>
+              <a:spcAft>
+                <a:spcPts val="0"/>
+              </a:spcAft>
+              <a:buClrTx/>
+              <a:buSzTx/>
+              <a:buFontTx/>
+              <a:buNone/>
+              <a:tabLst/>
+              <a:defRPr/>
+            </a:pPr>
             <a:endParaRPr lang="en-GB" sz="1100" dirty="0">
               <a:effectLst/>
               <a:latin typeface="ArialMT"/>
@@ -2268,160 +2574,12 @@
               <a:tabLst/>
               <a:defRPr/>
             </a:pPr>
-            <a:endParaRPr lang="en-GB" sz="1100" dirty="0">
-              <a:solidFill>
-                <a:srgbClr val="000000"/>
-              </a:solidFill>
-              <a:latin typeface="Helvetica Neue" panose="02000503000000020004" pitchFamily="2" charset="0"/>
-            </a:endParaRPr>
-          </a:p>
-          <a:p>
-            <a:pPr marL="0" marR="0" lvl="0" indent="0" algn="l" defTabSz="914400" rtl="0" eaLnBrk="1" fontAlgn="auto" latinLnBrk="0" hangingPunct="1">
-              <a:lnSpc>
-                <a:spcPct val="100000"/>
-              </a:lnSpc>
-              <a:spcBef>
-                <a:spcPts val="0"/>
-              </a:spcBef>
-              <a:spcAft>
-                <a:spcPts val="0"/>
-              </a:spcAft>
-              <a:buClrTx/>
-              <a:buSzTx/>
-              <a:buFontTx/>
-              <a:buNone/>
-              <a:tabLst/>
-              <a:defRPr/>
-            </a:pPr>
-            <a:r>
-              <a:rPr lang="en-GB" sz="1100" dirty="0">
-                <a:solidFill>
-                  <a:srgbClr val="000000"/>
-                </a:solidFill>
-                <a:latin typeface="Helvetica Neue" panose="02000503000000020004" pitchFamily="2" charset="0"/>
-              </a:rPr>
-              <a:t>It is important to note at this point that I’ll be showing </a:t>
-            </a:r>
-            <a:r>
-              <a:rPr lang="en-GB" sz="1100" dirty="0" err="1">
-                <a:solidFill>
-                  <a:srgbClr val="000000"/>
-                </a:solidFill>
-                <a:latin typeface="Helvetica Neue" panose="02000503000000020004" pitchFamily="2" charset="0"/>
-              </a:rPr>
-              <a:t>easr</a:t>
-            </a:r>
-            <a:r>
-              <a:rPr lang="en-GB" sz="1100" dirty="0">
-                <a:solidFill>
-                  <a:srgbClr val="000000"/>
-                </a:solidFill>
-                <a:latin typeface="Helvetica Neue" panose="02000503000000020004" pitchFamily="2" charset="0"/>
-              </a:rPr>
-              <a:t> values from now on. What are these?</a:t>
-            </a:r>
-          </a:p>
-          <a:p>
-            <a:pPr marL="0" marR="0" lvl="0" indent="0" algn="l" defTabSz="914400" rtl="0" eaLnBrk="1" fontAlgn="auto" latinLnBrk="0" hangingPunct="1">
-              <a:lnSpc>
-                <a:spcPct val="100000"/>
-              </a:lnSpc>
-              <a:spcBef>
-                <a:spcPts val="0"/>
-              </a:spcBef>
-              <a:spcAft>
-                <a:spcPts val="0"/>
-              </a:spcAft>
-              <a:buClrTx/>
-              <a:buSzTx/>
-              <a:buFontTx/>
-              <a:buNone/>
-              <a:tabLst/>
-              <a:defRPr/>
-            </a:pPr>
-            <a:endParaRPr lang="en-GB" sz="1100" dirty="0">
-              <a:solidFill>
-                <a:srgbClr val="000000"/>
-              </a:solidFill>
-              <a:latin typeface="Helvetica Neue" panose="02000503000000020004" pitchFamily="2" charset="0"/>
-            </a:endParaRPr>
-          </a:p>
-          <a:p>
-            <a:pPr marL="0" marR="0" lvl="0" indent="0" algn="l" defTabSz="914400" rtl="0" eaLnBrk="1" fontAlgn="auto" latinLnBrk="0" hangingPunct="1">
-              <a:lnSpc>
-                <a:spcPct val="100000"/>
-              </a:lnSpc>
-              <a:spcBef>
-                <a:spcPts val="0"/>
-              </a:spcBef>
-              <a:spcAft>
-                <a:spcPts val="0"/>
-              </a:spcAft>
-              <a:buClrTx/>
-              <a:buSzTx/>
-              <a:buFontTx/>
-              <a:buNone/>
-              <a:tabLst/>
-              <a:defRPr/>
-            </a:pPr>
-            <a:r>
-              <a:rPr lang="en-GB" sz="1100" dirty="0">
-                <a:solidFill>
-                  <a:srgbClr val="000000"/>
-                </a:solidFill>
-                <a:latin typeface="Helvetica Neue" panose="02000503000000020004" pitchFamily="2" charset="0"/>
-              </a:rPr>
-              <a:t>This means the data is reported per 100,000 people and adjusted for age and sex. </a:t>
-            </a:r>
-          </a:p>
-          <a:p>
-            <a:pPr marL="0" marR="0" lvl="0" indent="0" algn="l" defTabSz="914400" rtl="0" eaLnBrk="1" fontAlgn="auto" latinLnBrk="0" hangingPunct="1">
-              <a:lnSpc>
-                <a:spcPct val="100000"/>
-              </a:lnSpc>
-              <a:spcBef>
-                <a:spcPts val="0"/>
-              </a:spcBef>
-              <a:spcAft>
-                <a:spcPts val="0"/>
-              </a:spcAft>
-              <a:buClr>
-                <a:srgbClr val="000000"/>
-              </a:buClr>
-              <a:buSzPts val="1400"/>
-              <a:buFont typeface="Arial"/>
-              <a:buNone/>
-              <a:tabLst/>
-              <a:defRPr/>
-            </a:pPr>
-            <a:endParaRPr lang="en-GB" dirty="0"/>
-          </a:p>
-          <a:p>
-            <a:pPr marL="0" marR="0" lvl="0" indent="0" algn="l" defTabSz="914400" rtl="0" eaLnBrk="1" fontAlgn="auto" latinLnBrk="0" hangingPunct="1">
-              <a:lnSpc>
-                <a:spcPct val="100000"/>
-              </a:lnSpc>
-              <a:spcBef>
-                <a:spcPts val="0"/>
-              </a:spcBef>
-              <a:spcAft>
-                <a:spcPts val="0"/>
-              </a:spcAft>
-              <a:buClr>
-                <a:srgbClr val="000000"/>
-              </a:buClr>
-              <a:buSzPts val="1400"/>
-              <a:buFont typeface="Arial"/>
-              <a:buNone/>
-              <a:tabLst/>
-              <a:defRPr/>
-            </a:pPr>
             <a:r>
               <a:rPr lang="en-GB" sz="1100" dirty="0">
                 <a:effectLst/>
                 <a:latin typeface="ArialMT"/>
               </a:rPr>
-              <a:t>Nothing too striking about the discharge data but I wanted to show the </a:t>
+              <a:t>Another result that popped up from this data was a peak in male deaths from SAH in 2020 - COVID</a:t>
             </a:r>
           </a:p>
           <a:p>
@@ -2522,6 +2680,24 @@
             </a:endParaRPr>
           </a:p>
           <a:p>
+            <a:pPr marL="139700" indent="0">
+              <a:buNone/>
+            </a:pPr>
+            <a:r>
+              <a:rPr lang="en-GB" sz="1100" b="1" u="sng" dirty="0">
+                <a:solidFill>
+                  <a:schemeClr val="bg1">
+                    <a:lumMod val="50000"/>
+                  </a:schemeClr>
+                </a:solidFill>
+                <a:effectLst/>
+                <a:latin typeface="Source Sans Pro" panose="020B0503030403020204" pitchFamily="34" charset="0"/>
+                <a:ea typeface="Source Sans Pro" panose="020B0503030403020204" pitchFamily="34" charset="0"/>
+              </a:rPr>
+              <a:t>MAP</a:t>
+            </a:r>
+          </a:p>
+          <a:p>
             <a:r>
               <a:rPr lang="en-GB" sz="1100" dirty="0">
                 <a:solidFill>
@@ -2579,20 +2755,11 @@
             </a:endParaRPr>
           </a:p>
           <a:p>
-            <a:endParaRPr lang="en-GB" sz="1100" dirty="0">
-              <a:solidFill>
-                <a:schemeClr val="bg1">
-                  <a:lumMod val="50000"/>
-                </a:schemeClr>
-              </a:solidFill>
-              <a:effectLst/>
-              <a:latin typeface="Source Sans Pro" panose="020B0503030403020204" pitchFamily="34" charset="0"/>
-              <a:ea typeface="Source Sans Pro" panose="020B0503030403020204" pitchFamily="34" charset="0"/>
-            </a:endParaRPr>
-          </a:p>
-          <a:p>
+            <a:pPr marL="139700" indent="0">
+              <a:buNone/>
+            </a:pPr>
             <a:r>
-              <a:rPr lang="en-GB" sz="1100" dirty="0">
+              <a:rPr lang="en-GB" sz="1100" b="1" u="sng" dirty="0">
                 <a:solidFill>
                   <a:schemeClr val="bg1">
                     <a:lumMod val="50000"/>
@@ -2602,7 +2769,7 @@
                 <a:latin typeface="Source Sans Pro" panose="020B0503030403020204" pitchFamily="34" charset="0"/>
                 <a:ea typeface="Source Sans Pro" panose="020B0503030403020204" pitchFamily="34" charset="0"/>
               </a:rPr>
-              <a:t>From PHS report:</a:t>
+              <a:t>Health Board Graphs</a:t>
             </a:r>
           </a:p>
           <a:p>
@@ -2617,8 +2784,35 @@
                 <a:latin typeface="Source Sans Pro" panose="020B0503030403020204" pitchFamily="34" charset="0"/>
                 <a:ea typeface="Source Sans Pro" panose="020B0503030403020204" pitchFamily="34" charset="0"/>
               </a:rPr>
-              <a:t>“Over the past ten years, there was an increase in the adjusted discharge rate for stroke in all deprivation quintiles. The rate in the most deprived quintile increased by 39% compared to 21% in the least deprived quintile.” </a:t>
+              <a:t>Some are going up some are going down</a:t>
             </a:r>
+          </a:p>
+          <a:p>
+            <a:r>
+              <a:rPr lang="en-GB" sz="1100" dirty="0">
+                <a:solidFill>
+                  <a:schemeClr val="bg1">
+                    <a:lumMod val="50000"/>
+                  </a:schemeClr>
+                </a:solidFill>
+                <a:effectLst/>
+                <a:latin typeface="Source Sans Pro" panose="020B0503030403020204" pitchFamily="34" charset="0"/>
+                <a:ea typeface="Source Sans Pro" panose="020B0503030403020204" pitchFamily="34" charset="0"/>
+              </a:rPr>
+              <a:t>There are a lot of complicated factors feeding in to these numbers</a:t>
+            </a:r>
+          </a:p>
+          <a:p>
+            <a:endParaRPr lang="en-GB" sz="1100" dirty="0">
+              <a:solidFill>
+                <a:schemeClr val="bg1">
+                  <a:lumMod val="50000"/>
+                </a:schemeClr>
+              </a:solidFill>
+              <a:effectLst/>
+              <a:latin typeface="Source Sans Pro" panose="020B0503030403020204" pitchFamily="34" charset="0"/>
+              <a:ea typeface="Source Sans Pro" panose="020B0503030403020204" pitchFamily="34" charset="0"/>
+            </a:endParaRPr>
           </a:p>
         </p:txBody>
       </p:sp>
@@ -2702,11 +2896,11 @@
 </file>
 
 <file path=ppt/notesSlides/notesSlide9.xml><?xml version="1.0" encoding="utf-8"?>
-<p:notes xmlns:a="http://schemas.openxmlformats.org/drawingml/2006/main" xmlns:r="http://schemas.openxmlformats.org/officeDocument/2006/relationships" xmlns:p="http://schemas.openxmlformats.org/presentationml/2006/main" showMasterSp="0" showMasterPhAnim="0">
+<p:notes xmlns:a="http://schemas.openxmlformats.org/drawingml/2006/main" xmlns:r="http://schemas.openxmlformats.org/officeDocument/2006/relationships" xmlns:p="http://schemas.openxmlformats.org/presentationml/2006/main">
   <p:cSld>
     <p:spTree>
       <p:nvGrpSpPr>
-        <p:cNvPr id="1" name="Shape 495"/>
+        <p:cNvPr id="1" name=""/>
         <p:cNvGrpSpPr/>
         <p:nvPr/>
       </p:nvGrpSpPr>
@@ -2720,12 +2914,12 @@
       </p:grpSpPr>
       <p:sp>
         <p:nvSpPr>
-          <p:cNvPr id="496" name="Google Shape;496;p:notes"/>
+          <p:cNvPr id="2" name="Slide Image Placeholder 1"/>
           <p:cNvSpPr>
             <a:spLocks noGrp="1" noRot="1" noChangeAspect="1"/>
           </p:cNvSpPr>
           <p:nvPr>
-            <p:ph type="sldImg" idx="2"/>
+            <p:ph type="sldImg"/>
           </p:nvPr>
         </p:nvSpPr>
         <p:spPr>
@@ -2733,74 +2927,40 @@
             <a:off x="381000" y="685800"/>
             <a:ext cx="6096000" cy="3429000"/>
           </a:xfrm>
-          <a:custGeom>
-            <a:avLst/>
-            <a:gdLst/>
-            <a:ahLst/>
-            <a:cxnLst/>
-            <a:rect l="l" t="t" r="r" b="b"/>
-            <a:pathLst>
-              <a:path w="120000" h="120000" extrusionOk="0">
-                <a:moveTo>
-                  <a:pt x="0" y="0"/>
-                </a:moveTo>
-                <a:lnTo>
-                  <a:pt x="120000" y="0"/>
-                </a:lnTo>
-                <a:lnTo>
-                  <a:pt x="120000" y="120000"/>
-                </a:lnTo>
-                <a:lnTo>
-                  <a:pt x="0" y="120000"/>
-                </a:lnTo>
-                <a:close/>
-              </a:path>
-            </a:pathLst>
-          </a:custGeom>
         </p:spPr>
       </p:sp>
       <p:sp>
         <p:nvSpPr>
-          <p:cNvPr id="497" name="Google Shape;497;p:notes"/>
-          <p:cNvSpPr txBox="1">
+          <p:cNvPr id="3" name="Notes Placeholder 2"/>
+          <p:cNvSpPr>
             <a:spLocks noGrp="1"/>
           </p:cNvSpPr>
           <p:nvPr>
             <p:ph type="body" idx="1"/>
           </p:nvPr>
         </p:nvSpPr>
-        <p:spPr>
-          <a:xfrm>
-            <a:off x="685800" y="4343400"/>
-            <a:ext cx="5486400" cy="4114800"/>
-          </a:xfrm>
-          <a:prstGeom prst="rect">
-            <a:avLst/>
-          </a:prstGeom>
-        </p:spPr>
+        <p:spPr/>
         <p:txBody>
-          <a:bodyPr spcFirstLastPara="1" wrap="square" lIns="91425" tIns="91425" rIns="91425" bIns="91425" anchor="t" anchorCtr="0">
-            <a:noAutofit/>
-          </a:bodyPr>
+          <a:bodyPr/>
           <a:lstStyle/>
           <a:p>
-            <a:pPr marL="0" lvl="0" indent="0" algn="l" rtl="0">
-              <a:spcBef>
-                <a:spcPts val="0"/>
-              </a:spcBef>
-              <a:spcAft>
-                <a:spcPts val="0"/>
-              </a:spcAft>
-              <a:buNone/>
-            </a:pPr>
-            <a:endParaRPr dirty="0"/>
+            <a:r>
+              <a:rPr lang="en-US" dirty="0"/>
+              <a:t>Adjusted R2 – already talked about</a:t>
+            </a:r>
+          </a:p>
+          <a:p>
+            <a:r>
+              <a:rPr lang="en-US" dirty="0"/>
+              <a:t>RSE – skewed by the amount of low data</a:t>
+            </a:r>
           </a:p>
         </p:txBody>
       </p:sp>
     </p:spTree>
     <p:extLst>
       <p:ext uri="{BB962C8B-B14F-4D97-AF65-F5344CB8AC3E}">
-        <p14:creationId xmlns:p14="http://schemas.microsoft.com/office/powerpoint/2010/main" val="2140799352"/>
+        <p14:creationId xmlns:p14="http://schemas.microsoft.com/office/powerpoint/2010/main" val="4120744275"/>
       </p:ext>
     </p:extLst>
   </p:cSld>
@@ -7411,8 +7571,8 @@
         </p:nvSpPr>
         <p:spPr>
           <a:xfrm>
-            <a:off x="506406" y="735334"/>
-            <a:ext cx="7319333" cy="3096194"/>
+            <a:off x="569725" y="3858511"/>
+            <a:ext cx="7863872" cy="716617"/>
           </a:xfrm>
         </p:spPr>
         <p:txBody>
@@ -7420,42 +7580,12 @@
           <a:lstStyle/>
           <a:p>
             <a:r>
-              <a:rPr lang="en-US" dirty="0"/>
+              <a:rPr lang="en-US" sz="1800" dirty="0"/>
               <a:t>Mortality rates &lt; 10 causing the model issues (evidence from density plots) </a:t>
             </a:r>
           </a:p>
         </p:txBody>
       </p:sp>
-      <p:pic>
-        <p:nvPicPr>
-          <p:cNvPr id="4" name="Picture 3">
-            <a:extLst>
-              <a:ext uri="{FF2B5EF4-FFF2-40B4-BE49-F238E27FC236}">
-                <a16:creationId xmlns:a16="http://schemas.microsoft.com/office/drawing/2014/main" id="{9EBFC925-76D8-6A0F-888C-83E485FDB2BC}"/>
-              </a:ext>
-            </a:extLst>
-          </p:cNvPr>
-          <p:cNvPicPr>
-            <a:picLocks noChangeAspect="1"/>
-          </p:cNvPicPr>
-          <p:nvPr/>
-        </p:nvPicPr>
-        <p:blipFill>
-          <a:blip r:embed="rId2"/>
-          <a:stretch>
-            <a:fillRect/>
-          </a:stretch>
-        </p:blipFill>
-        <p:spPr>
-          <a:xfrm>
-            <a:off x="369757" y="1600100"/>
-            <a:ext cx="4639862" cy="2867157"/>
-          </a:xfrm>
-          <a:prstGeom prst="rect">
-            <a:avLst/>
-          </a:prstGeom>
-        </p:spPr>
-      </p:pic>
       <p:graphicFrame>
         <p:nvGraphicFramePr>
           <p:cNvPr id="8" name="Table 8">
@@ -7471,13 +7601,13 @@
           <p:nvPr>
             <p:extLst>
               <p:ext uri="{D42A27DB-BD31-4B8C-83A1-F6EECF244321}">
-                <p14:modId xmlns:p14="http://schemas.microsoft.com/office/powerpoint/2010/main" val="1438938436"/>
+                <p14:modId xmlns:p14="http://schemas.microsoft.com/office/powerpoint/2010/main" val="1983264943"/>
               </p:ext>
             </p:extLst>
           </p:nvPr>
         </p:nvGraphicFramePr>
         <p:xfrm>
-          <a:off x="5340428" y="1940460"/>
+          <a:off x="5185802" y="1565124"/>
           <a:ext cx="3636425" cy="1524000"/>
         </p:xfrm>
         <a:graphic>
@@ -7567,7 +7697,7 @@
                       <a:endParaRPr lang="en-US" sz="1100" dirty="0"/>
                     </a:p>
                   </a:txBody>
-                  <a:tcPr>
+                  <a:tcPr anchor="ctr">
                     <a:lnL w="12700" cap="flat" cmpd="sng" algn="ctr">
                       <a:solidFill>
                         <a:schemeClr val="bg1">
@@ -7733,7 +7863,7 @@
                       </a:r>
                     </a:p>
                   </a:txBody>
-                  <a:tcPr>
+                  <a:tcPr anchor="ctr">
                     <a:lnL w="12700" cap="flat" cmpd="sng" algn="ctr">
                       <a:solidFill>
                         <a:schemeClr val="bg1">
@@ -7823,7 +7953,7 @@
                       </a:r>
                     </a:p>
                   </a:txBody>
-                  <a:tcPr>
+                  <a:tcPr anchor="ctr">
                     <a:lnL w="12700" cap="flat" cmpd="sng" algn="ctr">
                       <a:solidFill>
                         <a:schemeClr val="bg1">
@@ -8002,7 +8132,7 @@
                       <a:endParaRPr lang="en-US" sz="1100" dirty="0"/>
                     </a:p>
                   </a:txBody>
-                  <a:tcPr>
+                  <a:tcPr anchor="ctr">
                     <a:lnL w="12700" cap="flat" cmpd="sng" algn="ctr">
                       <a:solidFill>
                         <a:schemeClr val="bg1">
@@ -8059,6 +8189,36 @@
           </a:graphicData>
         </a:graphic>
       </p:graphicFrame>
+      <p:pic>
+        <p:nvPicPr>
+          <p:cNvPr id="5" name="Picture 4">
+            <a:extLst>
+              <a:ext uri="{FF2B5EF4-FFF2-40B4-BE49-F238E27FC236}">
+                <a16:creationId xmlns:a16="http://schemas.microsoft.com/office/drawing/2014/main" id="{ED1B91D0-2B99-2857-8FFD-886B8EF5E232}"/>
+              </a:ext>
+            </a:extLst>
+          </p:cNvPr>
+          <p:cNvPicPr>
+            <a:picLocks noChangeAspect="1"/>
+          </p:cNvPicPr>
+          <p:nvPr/>
+        </p:nvPicPr>
+        <p:blipFill>
+          <a:blip r:embed="rId3"/>
+          <a:stretch>
+            <a:fillRect/>
+          </a:stretch>
+        </p:blipFill>
+        <p:spPr>
+          <a:xfrm>
+            <a:off x="321773" y="1077742"/>
+            <a:ext cx="4496411" cy="2780769"/>
+          </a:xfrm>
+          <a:prstGeom prst="rect">
+            <a:avLst/>
+          </a:prstGeom>
+        </p:spPr>
+      </p:pic>
     </p:spTree>
     <p:extLst>
       <p:ext uri="{BB962C8B-B14F-4D97-AF65-F5344CB8AC3E}">
@@ -8103,7 +8263,7 @@
                                           </p:stCondLst>
                                         </p:cTn>
                                         <p:tgtEl>
-                                          <p:spTgt spid="4"/>
+                                          <p:spTgt spid="8"/>
                                         </p:tgtEl>
                                         <p:attrNameLst>
                                           <p:attrName>style.visibility</p:attrName>
@@ -8143,51 +8303,6 @@
                                     <p:set>
                                       <p:cBhvr>
                                         <p:cTn id="10" dur="1" fill="hold">
-                                          <p:stCondLst>
-                                            <p:cond delay="0"/>
-                                          </p:stCondLst>
-                                        </p:cTn>
-                                        <p:tgtEl>
-                                          <p:spTgt spid="8"/>
-                                        </p:tgtEl>
-                                        <p:attrNameLst>
-                                          <p:attrName>style.visibility</p:attrName>
-                                        </p:attrNameLst>
-                                      </p:cBhvr>
-                                      <p:to>
-                                        <p:strVal val="visible"/>
-                                      </p:to>
-                                    </p:set>
-                                  </p:childTnLst>
-                                </p:cTn>
-                              </p:par>
-                            </p:childTnLst>
-                          </p:cTn>
-                        </p:par>
-                      </p:childTnLst>
-                    </p:cTn>
-                  </p:par>
-                  <p:par>
-                    <p:cTn id="11" fill="hold">
-                      <p:stCondLst>
-                        <p:cond delay="indefinite"/>
-                      </p:stCondLst>
-                      <p:childTnLst>
-                        <p:par>
-                          <p:cTn id="12" fill="hold">
-                            <p:stCondLst>
-                              <p:cond delay="0"/>
-                            </p:stCondLst>
-                            <p:childTnLst>
-                              <p:par>
-                                <p:cTn id="13" presetID="1" presetClass="entr" presetSubtype="0" fill="hold" nodeType="clickEffect">
-                                  <p:stCondLst>
-                                    <p:cond delay="0"/>
-                                  </p:stCondLst>
-                                  <p:childTnLst>
-                                    <p:set>
-                                      <p:cBhvr>
-                                        <p:cTn id="14" dur="1" fill="hold">
                                           <p:stCondLst>
                                             <p:cond delay="0"/>
                                           </p:stCondLst>
@@ -8301,14 +8416,14 @@
           <p:nvPr/>
         </p:nvPicPr>
         <p:blipFill>
-          <a:blip r:embed="rId2"/>
+          <a:blip r:embed="rId3"/>
           <a:stretch>
             <a:fillRect/>
           </a:stretch>
         </p:blipFill>
         <p:spPr>
           <a:xfrm>
-            <a:off x="1744981" y="985196"/>
+            <a:off x="1709811" y="967611"/>
             <a:ext cx="5426286" cy="3353120"/>
           </a:xfrm>
           <a:prstGeom prst="rect">
@@ -9627,6 +9742,28 @@
               <a:buFont typeface="Arial" panose="020B0604020202020204" pitchFamily="34" charset="0"/>
               <a:buChar char="•"/>
             </a:pPr>
+            <a:r>
+              <a:rPr lang="en-US" sz="1600" dirty="0">
+                <a:solidFill>
+                  <a:schemeClr val="bg1">
+                    <a:lumMod val="50000"/>
+                  </a:schemeClr>
+                </a:solidFill>
+              </a:rPr>
+              <a:t>Outliers at high values</a:t>
+            </a:r>
+          </a:p>
+          <a:p>
+            <a:pPr lvl="1">
+              <a:buClr>
+                <a:schemeClr val="bg1">
+                  <a:lumMod val="50000"/>
+                </a:schemeClr>
+              </a:buClr>
+              <a:buSzPct val="120000"/>
+              <a:buFont typeface="Arial" panose="020B0604020202020204" pitchFamily="34" charset="0"/>
+              <a:buChar char="•"/>
+            </a:pPr>
             <a:endParaRPr lang="en-US" sz="1600" dirty="0">
               <a:solidFill>
                 <a:schemeClr val="bg1">
@@ -10297,13 +10434,21 @@
           <a:p>
             <a:r>
               <a:rPr lang="en-US" dirty="0"/>
-              <a:t>Test model improvements</a:t>
+              <a:t>Test </a:t>
+            </a:r>
+            <a:r>
+              <a:rPr lang="en-US"/>
+              <a:t>model improvements</a:t>
             </a:r>
           </a:p>
           <a:p>
             <a:r>
+              <a:rPr lang="en-US"/>
+              <a:t>Investigate </a:t>
+            </a:r>
+            <a:r>
               <a:rPr lang="en-US" dirty="0"/>
-              <a:t>Investigate neural networks for forecasting</a:t>
+              <a:t>neural networks for forecasting</a:t>
             </a:r>
           </a:p>
           <a:p>
@@ -10468,10 +10613,10 @@
       </p:sp>
       <p:pic>
         <p:nvPicPr>
-          <p:cNvPr id="6" name="Picture 5">
+          <p:cNvPr id="7" name="Picture 6">
             <a:extLst>
               <a:ext uri="{FF2B5EF4-FFF2-40B4-BE49-F238E27FC236}">
-                <a16:creationId xmlns:a16="http://schemas.microsoft.com/office/drawing/2014/main" id="{574EB961-66D2-38D5-D69E-6014EA2E8A6D}"/>
+                <a16:creationId xmlns:a16="http://schemas.microsoft.com/office/drawing/2014/main" id="{6D034F92-E493-EFC9-B2B2-564F848F741A}"/>
               </a:ext>
             </a:extLst>
           </p:cNvPr>
@@ -10488,8 +10633,8 @@
         </p:blipFill>
         <p:spPr>
           <a:xfrm>
-            <a:off x="1449090" y="924923"/>
-            <a:ext cx="5792491" cy="3582319"/>
+            <a:off x="1510717" y="871648"/>
+            <a:ext cx="5645863" cy="3491638"/>
           </a:xfrm>
           <a:prstGeom prst="rect">
             <a:avLst/>
@@ -10499,7 +10644,7 @@
     </p:spTree>
     <p:extLst>
       <p:ext uri="{BB962C8B-B14F-4D97-AF65-F5344CB8AC3E}">
-        <p14:creationId xmlns:p14="http://schemas.microsoft.com/office/powerpoint/2010/main" val="3931475615"/>
+        <p14:creationId xmlns:p14="http://schemas.microsoft.com/office/powerpoint/2010/main" val="3365207672"/>
       </p:ext>
     </p:extLst>
   </p:cSld>
@@ -10544,8 +10689,8 @@
         </p:nvSpPr>
         <p:spPr>
           <a:xfrm>
-            <a:off x="426203" y="202425"/>
-            <a:ext cx="8237350" cy="593312"/>
+            <a:off x="395207" y="202425"/>
+            <a:ext cx="8307091" cy="593312"/>
           </a:xfrm>
         </p:spPr>
         <p:txBody>
@@ -10589,7 +10734,7 @@
           <p:cNvPr id="3" name="Picture 2">
             <a:extLst>
               <a:ext uri="{FF2B5EF4-FFF2-40B4-BE49-F238E27FC236}">
-                <a16:creationId xmlns:a16="http://schemas.microsoft.com/office/drawing/2014/main" id="{4B39AB76-ACAD-A037-ADB6-702A6C1D10F8}"/>
+                <a16:creationId xmlns:a16="http://schemas.microsoft.com/office/drawing/2014/main" id="{8885819B-2E50-DAE3-B91E-4464ACCC5E5C}"/>
               </a:ext>
             </a:extLst>
           </p:cNvPr>
@@ -10606,8 +10751,8 @@
         </p:blipFill>
         <p:spPr>
           <a:xfrm>
-            <a:off x="1743559" y="1058842"/>
-            <a:ext cx="5195331" cy="3213010"/>
+            <a:off x="1707500" y="963546"/>
+            <a:ext cx="5349421" cy="3308306"/>
           </a:xfrm>
           <a:prstGeom prst="rect">
             <a:avLst/>
@@ -10617,7 +10762,7 @@
     </p:spTree>
     <p:extLst>
       <p:ext uri="{BB962C8B-B14F-4D97-AF65-F5344CB8AC3E}">
-        <p14:creationId xmlns:p14="http://schemas.microsoft.com/office/powerpoint/2010/main" val="1502109215"/>
+        <p14:creationId xmlns:p14="http://schemas.microsoft.com/office/powerpoint/2010/main" val="3327824857"/>
       </p:ext>
     </p:extLst>
   </p:cSld>
@@ -10704,10 +10849,10 @@
       </p:sp>
       <p:pic>
         <p:nvPicPr>
-          <p:cNvPr id="4" name="Picture 3">
+          <p:cNvPr id="6" name="Picture 5">
             <a:extLst>
               <a:ext uri="{FF2B5EF4-FFF2-40B4-BE49-F238E27FC236}">
-                <a16:creationId xmlns:a16="http://schemas.microsoft.com/office/drawing/2014/main" id="{761237FC-E59C-56FF-36C9-08F78E1DD7A9}"/>
+                <a16:creationId xmlns:a16="http://schemas.microsoft.com/office/drawing/2014/main" id="{4E57C26C-7466-3191-5421-68B8CB630C6D}"/>
               </a:ext>
             </a:extLst>
           </p:cNvPr>
@@ -10724,8 +10869,8 @@
         </p:blipFill>
         <p:spPr>
           <a:xfrm>
-            <a:off x="1683260" y="995610"/>
-            <a:ext cx="5333598" cy="3298521"/>
+            <a:off x="1567542" y="957468"/>
+            <a:ext cx="5359248" cy="3314383"/>
           </a:xfrm>
           <a:prstGeom prst="rect">
             <a:avLst/>
@@ -10735,7 +10880,7 @@
     </p:spTree>
     <p:extLst>
       <p:ext uri="{BB962C8B-B14F-4D97-AF65-F5344CB8AC3E}">
-        <p14:creationId xmlns:p14="http://schemas.microsoft.com/office/powerpoint/2010/main" val="471901888"/>
+        <p14:creationId xmlns:p14="http://schemas.microsoft.com/office/powerpoint/2010/main" val="3726355596"/>
       </p:ext>
     </p:extLst>
   </p:cSld>
@@ -10847,7 +10992,7 @@
           <a:p>
             <a:r>
               <a:rPr lang="en-US" sz="1800" dirty="0"/>
-              <a:t>Four types of CVD in the PHS Data</a:t>
+              <a:t>Four types of CVD in the Public Health Scotland data</a:t>
             </a:r>
           </a:p>
           <a:p>
@@ -11769,6 +11914,478 @@
         </p:nvSpPr>
         <p:spPr>
           <a:xfrm>
+            <a:off x="0" y="202425"/>
+            <a:ext cx="9144000" cy="593312"/>
+          </a:xfrm>
+        </p:spPr>
+        <p:txBody>
+          <a:bodyPr/>
+          <a:lstStyle/>
+          <a:p>
+            <a:r>
+              <a:rPr lang="en-US" dirty="0"/>
+              <a:t>Appendix 1 – Model Predictions by Sex</a:t>
+            </a:r>
+          </a:p>
+        </p:txBody>
+      </p:sp>
+      <p:sp>
+        <p:nvSpPr>
+          <p:cNvPr id="5" name="Text Placeholder 4">
+            <a:extLst>
+              <a:ext uri="{FF2B5EF4-FFF2-40B4-BE49-F238E27FC236}">
+                <a16:creationId xmlns:a16="http://schemas.microsoft.com/office/drawing/2014/main" id="{EAA0FE56-D8D2-17D2-4C56-7E5F0670125F}"/>
+              </a:ext>
+            </a:extLst>
+          </p:cNvPr>
+          <p:cNvSpPr>
+            <a:spLocks noGrp="1"/>
+          </p:cNvSpPr>
+          <p:nvPr>
+            <p:ph type="body" idx="1"/>
+          </p:nvPr>
+        </p:nvSpPr>
+        <p:spPr/>
+        <p:txBody>
+          <a:bodyPr/>
+          <a:lstStyle/>
+          <a:p>
+            <a:endParaRPr lang="en-US"/>
+          </a:p>
+        </p:txBody>
+      </p:sp>
+      <p:pic>
+        <p:nvPicPr>
+          <p:cNvPr id="3" name="Picture 2">
+            <a:extLst>
+              <a:ext uri="{FF2B5EF4-FFF2-40B4-BE49-F238E27FC236}">
+                <a16:creationId xmlns:a16="http://schemas.microsoft.com/office/drawing/2014/main" id="{7351EBDF-345E-0571-C418-25080914FD25}"/>
+              </a:ext>
+            </a:extLst>
+          </p:cNvPr>
+          <p:cNvPicPr>
+            <a:picLocks noChangeAspect="1"/>
+          </p:cNvPicPr>
+          <p:nvPr/>
+        </p:nvPicPr>
+        <p:blipFill>
+          <a:blip r:embed="rId2"/>
+          <a:stretch>
+            <a:fillRect/>
+          </a:stretch>
+        </p:blipFill>
+        <p:spPr>
+          <a:xfrm>
+            <a:off x="1922105" y="1141387"/>
+            <a:ext cx="5061857" cy="3130465"/>
+          </a:xfrm>
+          <a:prstGeom prst="rect">
+            <a:avLst/>
+          </a:prstGeom>
+        </p:spPr>
+      </p:pic>
+    </p:spTree>
+    <p:extLst>
+      <p:ext uri="{BB962C8B-B14F-4D97-AF65-F5344CB8AC3E}">
+        <p14:creationId xmlns:p14="http://schemas.microsoft.com/office/powerpoint/2010/main" val="965687218"/>
+      </p:ext>
+    </p:extLst>
+  </p:cSld>
+  <p:clrMapOvr>
+    <a:masterClrMapping/>
+  </p:clrMapOvr>
+</p:sld>
+</file>
+
+<file path=ppt/slides/slide21.xml><?xml version="1.0" encoding="utf-8"?>
+<p:sld xmlns:a="http://schemas.openxmlformats.org/drawingml/2006/main" xmlns:r="http://schemas.openxmlformats.org/officeDocument/2006/relationships" xmlns:p="http://schemas.openxmlformats.org/presentationml/2006/main">
+  <p:cSld>
+    <p:spTree>
+      <p:nvGrpSpPr>
+        <p:cNvPr id="1" name=""/>
+        <p:cNvGrpSpPr/>
+        <p:nvPr/>
+      </p:nvGrpSpPr>
+      <p:grpSpPr>
+        <a:xfrm>
+          <a:off x="0" y="0"/>
+          <a:ext cx="0" cy="0"/>
+          <a:chOff x="0" y="0"/>
+          <a:chExt cx="0" cy="0"/>
+        </a:xfrm>
+      </p:grpSpPr>
+      <p:sp>
+        <p:nvSpPr>
+          <p:cNvPr id="2" name="Title 1">
+            <a:extLst>
+              <a:ext uri="{FF2B5EF4-FFF2-40B4-BE49-F238E27FC236}">
+                <a16:creationId xmlns:a16="http://schemas.microsoft.com/office/drawing/2014/main" id="{4465E9A8-D70E-6EE5-5A10-FCAD177783E4}"/>
+              </a:ext>
+            </a:extLst>
+          </p:cNvPr>
+          <p:cNvSpPr>
+            <a:spLocks noGrp="1"/>
+          </p:cNvSpPr>
+          <p:nvPr>
+            <p:ph type="title"/>
+          </p:nvPr>
+        </p:nvSpPr>
+        <p:spPr>
+          <a:xfrm>
+            <a:off x="395207" y="202425"/>
+            <a:ext cx="8307091" cy="593312"/>
+          </a:xfrm>
+        </p:spPr>
+        <p:txBody>
+          <a:bodyPr/>
+          <a:lstStyle/>
+          <a:p>
+            <a:r>
+              <a:rPr lang="en-US" dirty="0"/>
+              <a:t>Appendix 2 – Future Predictions by HB</a:t>
+            </a:r>
+          </a:p>
+        </p:txBody>
+      </p:sp>
+      <p:sp>
+        <p:nvSpPr>
+          <p:cNvPr id="5" name="Text Placeholder 4">
+            <a:extLst>
+              <a:ext uri="{FF2B5EF4-FFF2-40B4-BE49-F238E27FC236}">
+                <a16:creationId xmlns:a16="http://schemas.microsoft.com/office/drawing/2014/main" id="{EAA0FE56-D8D2-17D2-4C56-7E5F0670125F}"/>
+              </a:ext>
+            </a:extLst>
+          </p:cNvPr>
+          <p:cNvSpPr>
+            <a:spLocks noGrp="1"/>
+          </p:cNvSpPr>
+          <p:nvPr>
+            <p:ph type="body" idx="1"/>
+          </p:nvPr>
+        </p:nvSpPr>
+        <p:spPr/>
+        <p:txBody>
+          <a:bodyPr/>
+          <a:lstStyle/>
+          <a:p>
+            <a:endParaRPr lang="en-US"/>
+          </a:p>
+        </p:txBody>
+      </p:sp>
+      <p:pic>
+        <p:nvPicPr>
+          <p:cNvPr id="6" name="Picture 5">
+            <a:extLst>
+              <a:ext uri="{FF2B5EF4-FFF2-40B4-BE49-F238E27FC236}">
+                <a16:creationId xmlns:a16="http://schemas.microsoft.com/office/drawing/2014/main" id="{574EB961-66D2-38D5-D69E-6014EA2E8A6D}"/>
+              </a:ext>
+            </a:extLst>
+          </p:cNvPr>
+          <p:cNvPicPr>
+            <a:picLocks noChangeAspect="1"/>
+          </p:cNvPicPr>
+          <p:nvPr/>
+        </p:nvPicPr>
+        <p:blipFill>
+          <a:blip r:embed="rId2"/>
+          <a:stretch>
+            <a:fillRect/>
+          </a:stretch>
+        </p:blipFill>
+        <p:spPr>
+          <a:xfrm>
+            <a:off x="1449090" y="924923"/>
+            <a:ext cx="5792491" cy="3582319"/>
+          </a:xfrm>
+          <a:prstGeom prst="rect">
+            <a:avLst/>
+          </a:prstGeom>
+        </p:spPr>
+      </p:pic>
+    </p:spTree>
+    <p:extLst>
+      <p:ext uri="{BB962C8B-B14F-4D97-AF65-F5344CB8AC3E}">
+        <p14:creationId xmlns:p14="http://schemas.microsoft.com/office/powerpoint/2010/main" val="3931475615"/>
+      </p:ext>
+    </p:extLst>
+  </p:cSld>
+  <p:clrMapOvr>
+    <a:masterClrMapping/>
+  </p:clrMapOvr>
+</p:sld>
+</file>
+
+<file path=ppt/slides/slide22.xml><?xml version="1.0" encoding="utf-8"?>
+<p:sld xmlns:a="http://schemas.openxmlformats.org/drawingml/2006/main" xmlns:r="http://schemas.openxmlformats.org/officeDocument/2006/relationships" xmlns:p="http://schemas.openxmlformats.org/presentationml/2006/main">
+  <p:cSld>
+    <p:spTree>
+      <p:nvGrpSpPr>
+        <p:cNvPr id="1" name=""/>
+        <p:cNvGrpSpPr/>
+        <p:nvPr/>
+      </p:nvGrpSpPr>
+      <p:grpSpPr>
+        <a:xfrm>
+          <a:off x="0" y="0"/>
+          <a:ext cx="0" cy="0"/>
+          <a:chOff x="0" y="0"/>
+          <a:chExt cx="0" cy="0"/>
+        </a:xfrm>
+      </p:grpSpPr>
+      <p:sp>
+        <p:nvSpPr>
+          <p:cNvPr id="2" name="Title 1">
+            <a:extLst>
+              <a:ext uri="{FF2B5EF4-FFF2-40B4-BE49-F238E27FC236}">
+                <a16:creationId xmlns:a16="http://schemas.microsoft.com/office/drawing/2014/main" id="{4465E9A8-D70E-6EE5-5A10-FCAD177783E4}"/>
+              </a:ext>
+            </a:extLst>
+          </p:cNvPr>
+          <p:cNvSpPr>
+            <a:spLocks noGrp="1"/>
+          </p:cNvSpPr>
+          <p:nvPr>
+            <p:ph type="title"/>
+          </p:nvPr>
+        </p:nvSpPr>
+        <p:spPr>
+          <a:xfrm>
+            <a:off x="426203" y="202425"/>
+            <a:ext cx="8237350" cy="593312"/>
+          </a:xfrm>
+        </p:spPr>
+        <p:txBody>
+          <a:bodyPr/>
+          <a:lstStyle/>
+          <a:p>
+            <a:r>
+              <a:rPr lang="en-US" dirty="0"/>
+              <a:t>Appendix 2 –Future Predictions by Age</a:t>
+            </a:r>
+          </a:p>
+        </p:txBody>
+      </p:sp>
+      <p:sp>
+        <p:nvSpPr>
+          <p:cNvPr id="5" name="Text Placeholder 4">
+            <a:extLst>
+              <a:ext uri="{FF2B5EF4-FFF2-40B4-BE49-F238E27FC236}">
+                <a16:creationId xmlns:a16="http://schemas.microsoft.com/office/drawing/2014/main" id="{EAA0FE56-D8D2-17D2-4C56-7E5F0670125F}"/>
+              </a:ext>
+            </a:extLst>
+          </p:cNvPr>
+          <p:cNvSpPr>
+            <a:spLocks noGrp="1"/>
+          </p:cNvSpPr>
+          <p:nvPr>
+            <p:ph type="body" idx="1"/>
+          </p:nvPr>
+        </p:nvSpPr>
+        <p:spPr/>
+        <p:txBody>
+          <a:bodyPr/>
+          <a:lstStyle/>
+          <a:p>
+            <a:endParaRPr lang="en-US"/>
+          </a:p>
+        </p:txBody>
+      </p:sp>
+      <p:pic>
+        <p:nvPicPr>
+          <p:cNvPr id="3" name="Picture 2">
+            <a:extLst>
+              <a:ext uri="{FF2B5EF4-FFF2-40B4-BE49-F238E27FC236}">
+                <a16:creationId xmlns:a16="http://schemas.microsoft.com/office/drawing/2014/main" id="{4B39AB76-ACAD-A037-ADB6-702A6C1D10F8}"/>
+              </a:ext>
+            </a:extLst>
+          </p:cNvPr>
+          <p:cNvPicPr>
+            <a:picLocks noChangeAspect="1"/>
+          </p:cNvPicPr>
+          <p:nvPr/>
+        </p:nvPicPr>
+        <p:blipFill>
+          <a:blip r:embed="rId2"/>
+          <a:stretch>
+            <a:fillRect/>
+          </a:stretch>
+        </p:blipFill>
+        <p:spPr>
+          <a:xfrm>
+            <a:off x="1743559" y="1058842"/>
+            <a:ext cx="5195331" cy="3213010"/>
+          </a:xfrm>
+          <a:prstGeom prst="rect">
+            <a:avLst/>
+          </a:prstGeom>
+        </p:spPr>
+      </p:pic>
+    </p:spTree>
+    <p:extLst>
+      <p:ext uri="{BB962C8B-B14F-4D97-AF65-F5344CB8AC3E}">
+        <p14:creationId xmlns:p14="http://schemas.microsoft.com/office/powerpoint/2010/main" val="1502109215"/>
+      </p:ext>
+    </p:extLst>
+  </p:cSld>
+  <p:clrMapOvr>
+    <a:masterClrMapping/>
+  </p:clrMapOvr>
+</p:sld>
+</file>
+
+<file path=ppt/slides/slide23.xml><?xml version="1.0" encoding="utf-8"?>
+<p:sld xmlns:a="http://schemas.openxmlformats.org/drawingml/2006/main" xmlns:r="http://schemas.openxmlformats.org/officeDocument/2006/relationships" xmlns:p="http://schemas.openxmlformats.org/presentationml/2006/main">
+  <p:cSld>
+    <p:spTree>
+      <p:nvGrpSpPr>
+        <p:cNvPr id="1" name=""/>
+        <p:cNvGrpSpPr/>
+        <p:nvPr/>
+      </p:nvGrpSpPr>
+      <p:grpSpPr>
+        <a:xfrm>
+          <a:off x="0" y="0"/>
+          <a:ext cx="0" cy="0"/>
+          <a:chOff x="0" y="0"/>
+          <a:chExt cx="0" cy="0"/>
+        </a:xfrm>
+      </p:grpSpPr>
+      <p:sp>
+        <p:nvSpPr>
+          <p:cNvPr id="2" name="Title 1">
+            <a:extLst>
+              <a:ext uri="{FF2B5EF4-FFF2-40B4-BE49-F238E27FC236}">
+                <a16:creationId xmlns:a16="http://schemas.microsoft.com/office/drawing/2014/main" id="{4465E9A8-D70E-6EE5-5A10-FCAD177783E4}"/>
+              </a:ext>
+            </a:extLst>
+          </p:cNvPr>
+          <p:cNvSpPr>
+            <a:spLocks noGrp="1"/>
+          </p:cNvSpPr>
+          <p:nvPr>
+            <p:ph type="title"/>
+          </p:nvPr>
+        </p:nvSpPr>
+        <p:spPr>
+          <a:xfrm>
+            <a:off x="0" y="202425"/>
+            <a:ext cx="9144000" cy="593312"/>
+          </a:xfrm>
+        </p:spPr>
+        <p:txBody>
+          <a:bodyPr/>
+          <a:lstStyle/>
+          <a:p>
+            <a:r>
+              <a:rPr lang="en-US" sz="3400" dirty="0"/>
+              <a:t>Appendix 2 – Future Predictions by CVD Type</a:t>
+            </a:r>
+          </a:p>
+        </p:txBody>
+      </p:sp>
+      <p:sp>
+        <p:nvSpPr>
+          <p:cNvPr id="5" name="Text Placeholder 4">
+            <a:extLst>
+              <a:ext uri="{FF2B5EF4-FFF2-40B4-BE49-F238E27FC236}">
+                <a16:creationId xmlns:a16="http://schemas.microsoft.com/office/drawing/2014/main" id="{EAA0FE56-D8D2-17D2-4C56-7E5F0670125F}"/>
+              </a:ext>
+            </a:extLst>
+          </p:cNvPr>
+          <p:cNvSpPr>
+            <a:spLocks noGrp="1"/>
+          </p:cNvSpPr>
+          <p:nvPr>
+            <p:ph type="body" idx="1"/>
+          </p:nvPr>
+        </p:nvSpPr>
+        <p:spPr/>
+        <p:txBody>
+          <a:bodyPr/>
+          <a:lstStyle/>
+          <a:p>
+            <a:endParaRPr lang="en-US"/>
+          </a:p>
+        </p:txBody>
+      </p:sp>
+      <p:pic>
+        <p:nvPicPr>
+          <p:cNvPr id="4" name="Picture 3">
+            <a:extLst>
+              <a:ext uri="{FF2B5EF4-FFF2-40B4-BE49-F238E27FC236}">
+                <a16:creationId xmlns:a16="http://schemas.microsoft.com/office/drawing/2014/main" id="{761237FC-E59C-56FF-36C9-08F78E1DD7A9}"/>
+              </a:ext>
+            </a:extLst>
+          </p:cNvPr>
+          <p:cNvPicPr>
+            <a:picLocks noChangeAspect="1"/>
+          </p:cNvPicPr>
+          <p:nvPr/>
+        </p:nvPicPr>
+        <p:blipFill>
+          <a:blip r:embed="rId2"/>
+          <a:stretch>
+            <a:fillRect/>
+          </a:stretch>
+        </p:blipFill>
+        <p:spPr>
+          <a:xfrm>
+            <a:off x="1683260" y="995610"/>
+            <a:ext cx="5333598" cy="3298521"/>
+          </a:xfrm>
+          <a:prstGeom prst="rect">
+            <a:avLst/>
+          </a:prstGeom>
+        </p:spPr>
+      </p:pic>
+    </p:spTree>
+    <p:extLst>
+      <p:ext uri="{BB962C8B-B14F-4D97-AF65-F5344CB8AC3E}">
+        <p14:creationId xmlns:p14="http://schemas.microsoft.com/office/powerpoint/2010/main" val="471901888"/>
+      </p:ext>
+    </p:extLst>
+  </p:cSld>
+  <p:clrMapOvr>
+    <a:masterClrMapping/>
+  </p:clrMapOvr>
+</p:sld>
+</file>
+
+<file path=ppt/slides/slide24.xml><?xml version="1.0" encoding="utf-8"?>
+<p:sld xmlns:a="http://schemas.openxmlformats.org/drawingml/2006/main" xmlns:r="http://schemas.openxmlformats.org/officeDocument/2006/relationships" xmlns:p="http://schemas.openxmlformats.org/presentationml/2006/main">
+  <p:cSld>
+    <p:spTree>
+      <p:nvGrpSpPr>
+        <p:cNvPr id="1" name=""/>
+        <p:cNvGrpSpPr/>
+        <p:nvPr/>
+      </p:nvGrpSpPr>
+      <p:grpSpPr>
+        <a:xfrm>
+          <a:off x="0" y="0"/>
+          <a:ext cx="0" cy="0"/>
+          <a:chOff x="0" y="0"/>
+          <a:chExt cx="0" cy="0"/>
+        </a:xfrm>
+      </p:grpSpPr>
+      <p:sp>
+        <p:nvSpPr>
+          <p:cNvPr id="2" name="Title 1">
+            <a:extLst>
+              <a:ext uri="{FF2B5EF4-FFF2-40B4-BE49-F238E27FC236}">
+                <a16:creationId xmlns:a16="http://schemas.microsoft.com/office/drawing/2014/main" id="{4465E9A8-D70E-6EE5-5A10-FCAD177783E4}"/>
+              </a:ext>
+            </a:extLst>
+          </p:cNvPr>
+          <p:cNvSpPr>
+            <a:spLocks noGrp="1"/>
+          </p:cNvSpPr>
+          <p:nvPr>
+            <p:ph type="title"/>
+          </p:nvPr>
+        </p:nvSpPr>
+        <p:spPr>
+          <a:xfrm>
             <a:off x="278969" y="202425"/>
             <a:ext cx="8369085" cy="593312"/>
           </a:xfrm>
@@ -11779,7 +12396,7 @@
           <a:p>
             <a:r>
               <a:rPr lang="en-US" dirty="0"/>
-              <a:t>Appendix 1 – Model Predictions by Sex</a:t>
+              <a:t>Appendix 2 – Model Predictions by Sex</a:t>
             </a:r>
           </a:p>
         </p:txBody>
@@ -11852,7 +12469,7 @@
 </p:sld>
 </file>
 
-<file path=ppt/slides/slide21.xml><?xml version="1.0" encoding="utf-8"?>
+<file path=ppt/slides/slide25.xml><?xml version="1.0" encoding="utf-8"?>
 <p:sld xmlns:a="http://schemas.openxmlformats.org/drawingml/2006/main" xmlns:r="http://schemas.openxmlformats.org/officeDocument/2006/relationships" xmlns:p="http://schemas.openxmlformats.org/presentationml/2006/main">
   <p:cSld>
     <p:spTree>
@@ -12105,7 +12722,7 @@
 </p:sld>
 </file>
 
-<file path=ppt/slides/slide22.xml><?xml version="1.0" encoding="utf-8"?>
+<file path=ppt/slides/slide26.xml><?xml version="1.0" encoding="utf-8"?>
 <p:sld xmlns:a="http://schemas.openxmlformats.org/drawingml/2006/main" xmlns:r="http://schemas.openxmlformats.org/officeDocument/2006/relationships" xmlns:p="http://schemas.openxmlformats.org/presentationml/2006/main">
   <p:cSld>
     <p:spTree>
@@ -17947,7 +18564,7 @@
 </p:sld>
 </file>
 
-<file path=ppt/slides/slide23.xml><?xml version="1.0" encoding="utf-8"?>
+<file path=ppt/slides/slide27.xml><?xml version="1.0" encoding="utf-8"?>
 <p:sld xmlns:a="http://schemas.openxmlformats.org/drawingml/2006/main" xmlns:r="http://schemas.openxmlformats.org/officeDocument/2006/relationships" xmlns:p="http://schemas.openxmlformats.org/presentationml/2006/main">
   <p:cSld>
     <p:spTree>
@@ -18644,7 +19261,7 @@
 </p:sld>
 </file>
 
-<file path=ppt/slides/slide24.xml><?xml version="1.0" encoding="utf-8"?>
+<file path=ppt/slides/slide28.xml><?xml version="1.0" encoding="utf-8"?>
 <p:sld xmlns:a="http://schemas.openxmlformats.org/drawingml/2006/main" xmlns:r="http://schemas.openxmlformats.org/officeDocument/2006/relationships" xmlns:p="http://schemas.openxmlformats.org/presentationml/2006/main">
   <p:cSld>
     <p:spTree>
@@ -18770,7 +19387,7 @@
 </p:sld>
 </file>
 
-<file path=ppt/slides/slide25.xml><?xml version="1.0" encoding="utf-8"?>
+<file path=ppt/slides/slide29.xml><?xml version="1.0" encoding="utf-8"?>
 <p:sld xmlns:a="http://schemas.openxmlformats.org/drawingml/2006/main" xmlns:r="http://schemas.openxmlformats.org/officeDocument/2006/relationships" xmlns:p="http://schemas.openxmlformats.org/presentationml/2006/main">
   <p:cSld>
     <p:spTree>
@@ -18912,7 +19529,230 @@
 </p:sld>
 </file>
 
-<file path=ppt/slides/slide26.xml><?xml version="1.0" encoding="utf-8"?>
+<file path=ppt/slides/slide3.xml><?xml version="1.0" encoding="utf-8"?>
+<p:sld xmlns:a="http://schemas.openxmlformats.org/drawingml/2006/main" xmlns:r="http://schemas.openxmlformats.org/officeDocument/2006/relationships" xmlns:p="http://schemas.openxmlformats.org/presentationml/2006/main">
+  <p:cSld>
+    <p:spTree>
+      <p:nvGrpSpPr>
+        <p:cNvPr id="1" name="Shape 498"/>
+        <p:cNvGrpSpPr/>
+        <p:nvPr/>
+      </p:nvGrpSpPr>
+      <p:grpSpPr>
+        <a:xfrm>
+          <a:off x="0" y="0"/>
+          <a:ext cx="0" cy="0"/>
+          <a:chOff x="0" y="0"/>
+          <a:chExt cx="0" cy="0"/>
+        </a:xfrm>
+      </p:grpSpPr>
+      <p:sp>
+        <p:nvSpPr>
+          <p:cNvPr id="499" name="Google Shape;499;p18"/>
+          <p:cNvSpPr txBox="1">
+            <a:spLocks noGrp="1"/>
+          </p:cNvSpPr>
+          <p:nvPr>
+            <p:ph type="title"/>
+          </p:nvPr>
+        </p:nvSpPr>
+        <p:spPr>
+          <a:xfrm>
+            <a:off x="635725" y="160501"/>
+            <a:ext cx="7921049" cy="715800"/>
+          </a:xfrm>
+          <a:prstGeom prst="rect">
+            <a:avLst/>
+          </a:prstGeom>
+        </p:spPr>
+        <p:txBody>
+          <a:bodyPr spcFirstLastPara="1" wrap="square" lIns="91425" tIns="91425" rIns="91425" bIns="91425" anchor="b" anchorCtr="0">
+            <a:noAutofit/>
+          </a:bodyPr>
+          <a:lstStyle/>
+          <a:p>
+            <a:pPr marL="0" lvl="0" indent="0" algn="ctr" rtl="0">
+              <a:spcBef>
+                <a:spcPts val="0"/>
+              </a:spcBef>
+              <a:spcAft>
+                <a:spcPts val="0"/>
+              </a:spcAft>
+              <a:buNone/>
+            </a:pPr>
+            <a:r>
+              <a:rPr lang="en-US" sz="3200" dirty="0"/>
+              <a:t>Introduction – CVD in Scotland</a:t>
+            </a:r>
+            <a:endParaRPr sz="3200" dirty="0">
+              <a:solidFill>
+                <a:schemeClr val="accent2"/>
+              </a:solidFill>
+            </a:endParaRPr>
+          </a:p>
+        </p:txBody>
+      </p:sp>
+      <p:sp>
+        <p:nvSpPr>
+          <p:cNvPr id="500" name="Google Shape;500;p18"/>
+          <p:cNvSpPr txBox="1">
+            <a:spLocks noGrp="1"/>
+          </p:cNvSpPr>
+          <p:nvPr>
+            <p:ph type="body" idx="1"/>
+          </p:nvPr>
+        </p:nvSpPr>
+        <p:spPr>
+          <a:xfrm>
+            <a:off x="374681" y="1304260"/>
+            <a:ext cx="4652972" cy="2869373"/>
+          </a:xfrm>
+          <a:prstGeom prst="rect">
+            <a:avLst/>
+          </a:prstGeom>
+        </p:spPr>
+        <p:txBody>
+          <a:bodyPr spcFirstLastPara="1" wrap="square" lIns="91425" tIns="91425" rIns="91425" bIns="91425" anchor="t" anchorCtr="0">
+            <a:normAutofit/>
+          </a:bodyPr>
+          <a:lstStyle/>
+          <a:p>
+            <a:r>
+              <a:rPr lang="en-GB" sz="1800" dirty="0">
+                <a:effectLst/>
+              </a:rPr>
+              <a:t>3826 deaths in Scotland in 2021 where CVD was underlying cause</a:t>
+            </a:r>
+          </a:p>
+          <a:p>
+            <a:endParaRPr lang="en-GB" sz="1800" dirty="0">
+              <a:effectLst/>
+            </a:endParaRPr>
+          </a:p>
+          <a:p>
+            <a:r>
+              <a:rPr lang="en-US" sz="1800" dirty="0"/>
+              <a:t>130,000 people living in Scotland have survived a stroke or TIA </a:t>
+            </a:r>
+          </a:p>
+          <a:p>
+            <a:endParaRPr lang="en-US" sz="1800" dirty="0"/>
+          </a:p>
+          <a:p>
+            <a:r>
+              <a:rPr lang="en-US" sz="1800" dirty="0"/>
+              <a:t>&gt;50% of stroke survivors are under 75</a:t>
+            </a:r>
+          </a:p>
+        </p:txBody>
+      </p:sp>
+      <p:pic>
+        <p:nvPicPr>
+          <p:cNvPr id="5" name="Picture 4">
+            <a:extLst>
+              <a:ext uri="{FF2B5EF4-FFF2-40B4-BE49-F238E27FC236}">
+                <a16:creationId xmlns:a16="http://schemas.microsoft.com/office/drawing/2014/main" id="{63DFFC7C-3E5D-17CC-FD7A-FE77B32A1A82}"/>
+              </a:ext>
+            </a:extLst>
+          </p:cNvPr>
+          <p:cNvPicPr>
+            <a:picLocks noChangeAspect="1"/>
+          </p:cNvPicPr>
+          <p:nvPr/>
+        </p:nvPicPr>
+        <p:blipFill>
+          <a:blip r:embed="rId3"/>
+          <a:stretch>
+            <a:fillRect/>
+          </a:stretch>
+        </p:blipFill>
+        <p:spPr>
+          <a:xfrm>
+            <a:off x="4836940" y="1370056"/>
+            <a:ext cx="3988521" cy="2466668"/>
+          </a:xfrm>
+          <a:prstGeom prst="rect">
+            <a:avLst/>
+          </a:prstGeom>
+        </p:spPr>
+      </p:pic>
+      <p:sp>
+        <p:nvSpPr>
+          <p:cNvPr id="7" name="TextBox 6">
+            <a:extLst>
+              <a:ext uri="{FF2B5EF4-FFF2-40B4-BE49-F238E27FC236}">
+                <a16:creationId xmlns:a16="http://schemas.microsoft.com/office/drawing/2014/main" id="{DD9475FF-3F6C-38AB-F6C3-73FBEA1214E3}"/>
+              </a:ext>
+            </a:extLst>
+          </p:cNvPr>
+          <p:cNvSpPr txBox="1"/>
+          <p:nvPr/>
+        </p:nvSpPr>
+        <p:spPr>
+          <a:xfrm>
+            <a:off x="0" y="4774168"/>
+            <a:ext cx="5402335" cy="369332"/>
+          </a:xfrm>
+          <a:prstGeom prst="rect">
+            <a:avLst/>
+          </a:prstGeom>
+          <a:solidFill>
+            <a:srgbClr val="E5E5E5">
+              <a:alpha val="50196"/>
+            </a:srgbClr>
+          </a:solidFill>
+        </p:spPr>
+        <p:txBody>
+          <a:bodyPr wrap="square">
+            <a:spAutoFit/>
+          </a:bodyPr>
+          <a:lstStyle/>
+          <a:p>
+            <a:r>
+              <a:rPr lang="en-US" sz="900" dirty="0">
+                <a:latin typeface="Source Sans Pro" panose="020B0503030403020204" pitchFamily="34" charset="0"/>
+                <a:ea typeface="Source Sans Pro" panose="020B0503030403020204" pitchFamily="34" charset="0"/>
+              </a:rPr>
+              <a:t>References: 	</a:t>
+            </a:r>
+            <a:r>
+              <a:rPr lang="en-US" sz="900" dirty="0">
+                <a:latin typeface="Source Sans Pro" panose="020B0503030403020204" pitchFamily="34" charset="0"/>
+                <a:ea typeface="Source Sans Pro" panose="020B0503030403020204" pitchFamily="34" charset="0"/>
+                <a:hlinkClick r:id="rId4"/>
+              </a:rPr>
+              <a:t>https://www.scotpho.org.uk/population-dynamics/deaths/data/most-frequent-causes/</a:t>
+            </a:r>
+            <a:endParaRPr lang="en-US" sz="900" dirty="0">
+              <a:latin typeface="Source Sans Pro" panose="020B0503030403020204" pitchFamily="34" charset="0"/>
+              <a:ea typeface="Source Sans Pro" panose="020B0503030403020204" pitchFamily="34" charset="0"/>
+            </a:endParaRPr>
+          </a:p>
+          <a:p>
+            <a:r>
+              <a:rPr lang="en-US" sz="900" dirty="0">
+                <a:latin typeface="Source Sans Pro" panose="020B0503030403020204" pitchFamily="34" charset="0"/>
+                <a:ea typeface="Source Sans Pro" panose="020B0503030403020204" pitchFamily="34" charset="0"/>
+              </a:rPr>
+              <a:t>	British Heart Foundation - Global Heart &amp; Circulatory Disease Factsheet Feb 2023</a:t>
+            </a:r>
+          </a:p>
+        </p:txBody>
+      </p:sp>
+    </p:spTree>
+    <p:extLst>
+      <p:ext uri="{BB962C8B-B14F-4D97-AF65-F5344CB8AC3E}">
+        <p14:creationId xmlns:p14="http://schemas.microsoft.com/office/powerpoint/2010/main" val="3824504773"/>
+      </p:ext>
+    </p:extLst>
+  </p:cSld>
+  <p:clrMapOvr>
+    <a:masterClrMapping/>
+  </p:clrMapOvr>
+</p:sld>
+</file>
+
+<file path=ppt/slides/slide30.xml><?xml version="1.0" encoding="utf-8"?>
 <p:sld xmlns:a="http://schemas.openxmlformats.org/drawingml/2006/main" xmlns:r="http://schemas.openxmlformats.org/officeDocument/2006/relationships" xmlns:p="http://schemas.openxmlformats.org/presentationml/2006/main">
   <p:cSld>
     <p:spTree>
@@ -21162,229 +22002,6 @@
 </p:sld>
 </file>
 
-<file path=ppt/slides/slide3.xml><?xml version="1.0" encoding="utf-8"?>
-<p:sld xmlns:a="http://schemas.openxmlformats.org/drawingml/2006/main" xmlns:r="http://schemas.openxmlformats.org/officeDocument/2006/relationships" xmlns:p="http://schemas.openxmlformats.org/presentationml/2006/main">
-  <p:cSld>
-    <p:spTree>
-      <p:nvGrpSpPr>
-        <p:cNvPr id="1" name="Shape 498"/>
-        <p:cNvGrpSpPr/>
-        <p:nvPr/>
-      </p:nvGrpSpPr>
-      <p:grpSpPr>
-        <a:xfrm>
-          <a:off x="0" y="0"/>
-          <a:ext cx="0" cy="0"/>
-          <a:chOff x="0" y="0"/>
-          <a:chExt cx="0" cy="0"/>
-        </a:xfrm>
-      </p:grpSpPr>
-      <p:sp>
-        <p:nvSpPr>
-          <p:cNvPr id="499" name="Google Shape;499;p18"/>
-          <p:cNvSpPr txBox="1">
-            <a:spLocks noGrp="1"/>
-          </p:cNvSpPr>
-          <p:nvPr>
-            <p:ph type="title"/>
-          </p:nvPr>
-        </p:nvSpPr>
-        <p:spPr>
-          <a:xfrm>
-            <a:off x="635725" y="160501"/>
-            <a:ext cx="7921049" cy="715800"/>
-          </a:xfrm>
-          <a:prstGeom prst="rect">
-            <a:avLst/>
-          </a:prstGeom>
-        </p:spPr>
-        <p:txBody>
-          <a:bodyPr spcFirstLastPara="1" wrap="square" lIns="91425" tIns="91425" rIns="91425" bIns="91425" anchor="b" anchorCtr="0">
-            <a:noAutofit/>
-          </a:bodyPr>
-          <a:lstStyle/>
-          <a:p>
-            <a:pPr marL="0" lvl="0" indent="0" algn="ctr" rtl="0">
-              <a:spcBef>
-                <a:spcPts val="0"/>
-              </a:spcBef>
-              <a:spcAft>
-                <a:spcPts val="0"/>
-              </a:spcAft>
-              <a:buNone/>
-            </a:pPr>
-            <a:r>
-              <a:rPr lang="en-US" sz="3200" dirty="0"/>
-              <a:t>Introduction – CVD in Scotland</a:t>
-            </a:r>
-            <a:endParaRPr sz="3200" dirty="0">
-              <a:solidFill>
-                <a:schemeClr val="accent2"/>
-              </a:solidFill>
-            </a:endParaRPr>
-          </a:p>
-        </p:txBody>
-      </p:sp>
-      <p:sp>
-        <p:nvSpPr>
-          <p:cNvPr id="500" name="Google Shape;500;p18"/>
-          <p:cNvSpPr txBox="1">
-            <a:spLocks noGrp="1"/>
-          </p:cNvSpPr>
-          <p:nvPr>
-            <p:ph type="body" idx="1"/>
-          </p:nvPr>
-        </p:nvSpPr>
-        <p:spPr>
-          <a:xfrm>
-            <a:off x="374681" y="1304260"/>
-            <a:ext cx="4652972" cy="2869373"/>
-          </a:xfrm>
-          <a:prstGeom prst="rect">
-            <a:avLst/>
-          </a:prstGeom>
-        </p:spPr>
-        <p:txBody>
-          <a:bodyPr spcFirstLastPara="1" wrap="square" lIns="91425" tIns="91425" rIns="91425" bIns="91425" anchor="t" anchorCtr="0">
-            <a:normAutofit/>
-          </a:bodyPr>
-          <a:lstStyle/>
-          <a:p>
-            <a:r>
-              <a:rPr lang="en-GB" sz="1800" dirty="0">
-                <a:effectLst/>
-              </a:rPr>
-              <a:t>3826 deaths in Scotland in 2021 where CVD was underlying cause</a:t>
-            </a:r>
-          </a:p>
-          <a:p>
-            <a:endParaRPr lang="en-GB" sz="1800" dirty="0">
-              <a:effectLst/>
-            </a:endParaRPr>
-          </a:p>
-          <a:p>
-            <a:r>
-              <a:rPr lang="en-US" sz="1800" dirty="0"/>
-              <a:t>130,000 people living in Scotland have survived a stroke or TIA </a:t>
-            </a:r>
-          </a:p>
-          <a:p>
-            <a:endParaRPr lang="en-US" sz="1800" dirty="0"/>
-          </a:p>
-          <a:p>
-            <a:r>
-              <a:rPr lang="en-US" sz="1800" dirty="0"/>
-              <a:t>&gt;50% of stroke survivors are under 75</a:t>
-            </a:r>
-          </a:p>
-        </p:txBody>
-      </p:sp>
-      <p:pic>
-        <p:nvPicPr>
-          <p:cNvPr id="5" name="Picture 4">
-            <a:extLst>
-              <a:ext uri="{FF2B5EF4-FFF2-40B4-BE49-F238E27FC236}">
-                <a16:creationId xmlns:a16="http://schemas.microsoft.com/office/drawing/2014/main" id="{63DFFC7C-3E5D-17CC-FD7A-FE77B32A1A82}"/>
-              </a:ext>
-            </a:extLst>
-          </p:cNvPr>
-          <p:cNvPicPr>
-            <a:picLocks noChangeAspect="1"/>
-          </p:cNvPicPr>
-          <p:nvPr/>
-        </p:nvPicPr>
-        <p:blipFill>
-          <a:blip r:embed="rId3"/>
-          <a:stretch>
-            <a:fillRect/>
-          </a:stretch>
-        </p:blipFill>
-        <p:spPr>
-          <a:xfrm>
-            <a:off x="4836940" y="1370056"/>
-            <a:ext cx="3988521" cy="2466668"/>
-          </a:xfrm>
-          <a:prstGeom prst="rect">
-            <a:avLst/>
-          </a:prstGeom>
-        </p:spPr>
-      </p:pic>
-      <p:sp>
-        <p:nvSpPr>
-          <p:cNvPr id="7" name="TextBox 6">
-            <a:extLst>
-              <a:ext uri="{FF2B5EF4-FFF2-40B4-BE49-F238E27FC236}">
-                <a16:creationId xmlns:a16="http://schemas.microsoft.com/office/drawing/2014/main" id="{DD9475FF-3F6C-38AB-F6C3-73FBEA1214E3}"/>
-              </a:ext>
-            </a:extLst>
-          </p:cNvPr>
-          <p:cNvSpPr txBox="1"/>
-          <p:nvPr/>
-        </p:nvSpPr>
-        <p:spPr>
-          <a:xfrm>
-            <a:off x="0" y="4774168"/>
-            <a:ext cx="5402335" cy="369332"/>
-          </a:xfrm>
-          <a:prstGeom prst="rect">
-            <a:avLst/>
-          </a:prstGeom>
-          <a:solidFill>
-            <a:srgbClr val="E5E5E5">
-              <a:alpha val="50196"/>
-            </a:srgbClr>
-          </a:solidFill>
-        </p:spPr>
-        <p:txBody>
-          <a:bodyPr wrap="square">
-            <a:spAutoFit/>
-          </a:bodyPr>
-          <a:lstStyle/>
-          <a:p>
-            <a:r>
-              <a:rPr lang="en-US" sz="900" dirty="0">
-                <a:latin typeface="Source Sans Pro" panose="020B0503030403020204" pitchFamily="34" charset="0"/>
-                <a:ea typeface="Source Sans Pro" panose="020B0503030403020204" pitchFamily="34" charset="0"/>
-              </a:rPr>
-              <a:t>References: 	</a:t>
-            </a:r>
-            <a:r>
-              <a:rPr lang="en-US" sz="900" dirty="0">
-                <a:latin typeface="Source Sans Pro" panose="020B0503030403020204" pitchFamily="34" charset="0"/>
-                <a:ea typeface="Source Sans Pro" panose="020B0503030403020204" pitchFamily="34" charset="0"/>
-                <a:hlinkClick r:id="rId4"/>
-              </a:rPr>
-              <a:t>https://www.scotpho.org.uk/population-dynamics/deaths/data/most-frequent-causes/</a:t>
-            </a:r>
-            <a:endParaRPr lang="en-US" sz="900" dirty="0">
-              <a:latin typeface="Source Sans Pro" panose="020B0503030403020204" pitchFamily="34" charset="0"/>
-              <a:ea typeface="Source Sans Pro" panose="020B0503030403020204" pitchFamily="34" charset="0"/>
-            </a:endParaRPr>
-          </a:p>
-          <a:p>
-            <a:r>
-              <a:rPr lang="en-US" sz="900" dirty="0">
-                <a:latin typeface="Source Sans Pro" panose="020B0503030403020204" pitchFamily="34" charset="0"/>
-                <a:ea typeface="Source Sans Pro" panose="020B0503030403020204" pitchFamily="34" charset="0"/>
-              </a:rPr>
-              <a:t>	British Heart Foundation - Global Heart &amp; Circulatory Disease Factsheet Feb 2023</a:t>
-            </a:r>
-          </a:p>
-        </p:txBody>
-      </p:sp>
-    </p:spTree>
-    <p:extLst>
-      <p:ext uri="{BB962C8B-B14F-4D97-AF65-F5344CB8AC3E}">
-        <p14:creationId xmlns:p14="http://schemas.microsoft.com/office/powerpoint/2010/main" val="3824504773"/>
-      </p:ext>
-    </p:extLst>
-  </p:cSld>
-  <p:clrMapOvr>
-    <a:masterClrMapping/>
-  </p:clrMapOvr>
-</p:sld>
-</file>
-
 <file path=ppt/slides/slide4.xml><?xml version="1.0" encoding="utf-8"?>
 <p:sld xmlns:a="http://schemas.openxmlformats.org/drawingml/2006/main" xmlns:r="http://schemas.openxmlformats.org/officeDocument/2006/relationships" xmlns:p="http://schemas.openxmlformats.org/presentationml/2006/main">
   <p:cSld>
@@ -21858,19 +22475,19 @@
           <a:p>
             <a:r>
               <a:rPr lang="en-GB" sz="1600" dirty="0"/>
-              <a:t>Stroke, TIAs and Other CVDs increase with age</a:t>
+              <a:t>Stroke, TIAs and Other CVDs discharge rates increase with age</a:t>
             </a:r>
           </a:p>
           <a:p>
             <a:r>
               <a:rPr lang="en-GB" sz="1600" dirty="0"/>
-              <a:t>Subarachnoid haemorrhage affects younger age groups</a:t>
+              <a:t>Subarachnoid haemorrhage affects younger age groups at a similar level to over 75s</a:t>
             </a:r>
           </a:p>
           <a:p>
             <a:r>
               <a:rPr lang="en-GB" sz="1600" dirty="0"/>
-              <a:t>Mortality data shows that chance of survival is better for younger age groups</a:t>
+              <a:t>Chance of survival is better for younger age groups</a:t>
             </a:r>
           </a:p>
         </p:txBody>
@@ -23105,6 +23722,36 @@
           <a:chExt cx="0" cy="0"/>
         </a:xfrm>
       </p:grpSpPr>
+      <p:pic>
+        <p:nvPicPr>
+          <p:cNvPr id="29" name="Picture 28" descr="Map&#10;&#10;Description automatically generated">
+            <a:extLst>
+              <a:ext uri="{FF2B5EF4-FFF2-40B4-BE49-F238E27FC236}">
+                <a16:creationId xmlns:a16="http://schemas.microsoft.com/office/drawing/2014/main" id="{37888C13-1B88-B847-E214-23B862BE28A7}"/>
+              </a:ext>
+            </a:extLst>
+          </p:cNvPr>
+          <p:cNvPicPr>
+            <a:picLocks noChangeAspect="1"/>
+          </p:cNvPicPr>
+          <p:nvPr/>
+        </p:nvPicPr>
+        <p:blipFill>
+          <a:blip r:embed="rId3"/>
+          <a:stretch>
+            <a:fillRect/>
+          </a:stretch>
+        </p:blipFill>
+        <p:spPr>
+          <a:xfrm>
+            <a:off x="554058" y="702967"/>
+            <a:ext cx="2535750" cy="4140000"/>
+          </a:xfrm>
+          <a:prstGeom prst="rect">
+            <a:avLst/>
+          </a:prstGeom>
+        </p:spPr>
+      </p:pic>
       <p:sp>
         <p:nvSpPr>
           <p:cNvPr id="2" name="Title 1">
@@ -23425,10 +24072,10 @@
           <p:nvPr/>
         </p:nvPicPr>
         <p:blipFill>
-          <a:blip r:embed="rId3">
+          <a:blip r:embed="rId4">
             <a:extLst>
               <a:ext uri="{96DAC541-7B7A-43D3-8B79-37D633B846F1}">
-                <asvg:svgBlip xmlns:asvg="http://schemas.microsoft.com/office/drawing/2016/SVG/main" r:embed="rId4"/>
+                <asvg:svgBlip xmlns:asvg="http://schemas.microsoft.com/office/drawing/2016/SVG/main" r:embed="rId5"/>
               </a:ext>
             </a:extLst>
           </a:blip>
@@ -23438,7 +24085,7 @@
         </p:blipFill>
         <p:spPr>
           <a:xfrm>
-            <a:off x="8440525" y="760117"/>
+            <a:off x="8288594" y="741118"/>
             <a:ext cx="399726" cy="399726"/>
           </a:xfrm>
           <a:prstGeom prst="rect">
@@ -23461,10 +24108,10 @@
           <p:nvPr/>
         </p:nvPicPr>
         <p:blipFill>
-          <a:blip r:embed="rId5">
+          <a:blip r:embed="rId6">
             <a:extLst>
               <a:ext uri="{96DAC541-7B7A-43D3-8B79-37D633B846F1}">
-                <asvg:svgBlip xmlns:asvg="http://schemas.microsoft.com/office/drawing/2016/SVG/main" r:embed="rId6"/>
+                <asvg:svgBlip xmlns:asvg="http://schemas.microsoft.com/office/drawing/2016/SVG/main" r:embed="rId7"/>
               </a:ext>
             </a:extLst>
           </a:blip>
@@ -23584,14 +24231,14 @@
           <p:nvPr/>
         </p:nvPicPr>
         <p:blipFill>
-          <a:blip r:embed="rId7"/>
+          <a:blip r:embed="rId8"/>
           <a:stretch>
             <a:fillRect/>
           </a:stretch>
         </p:blipFill>
         <p:spPr>
           <a:xfrm>
-            <a:off x="4257578" y="1272368"/>
+            <a:off x="3873902" y="1279344"/>
             <a:ext cx="4537365" cy="2806097"/>
           </a:xfrm>
           <a:prstGeom prst="rect">
@@ -23614,15 +24261,15 @@
           <p:nvPr/>
         </p:nvPicPr>
         <p:blipFill>
-          <a:blip r:embed="rId8"/>
+          <a:blip r:embed="rId9"/>
           <a:stretch>
             <a:fillRect/>
           </a:stretch>
         </p:blipFill>
         <p:spPr>
           <a:xfrm>
-            <a:off x="4385708" y="1780968"/>
-            <a:ext cx="4191146" cy="2591981"/>
+            <a:off x="4135461" y="1781118"/>
+            <a:ext cx="4268283" cy="2639686"/>
           </a:xfrm>
           <a:prstGeom prst="rect">
             <a:avLst/>
@@ -23763,10 +24410,10 @@
       </p:cxnSp>
       <p:pic>
         <p:nvPicPr>
-          <p:cNvPr id="25" name="Picture 24" descr="Map&#10;&#10;Description automatically generated">
+          <p:cNvPr id="27" name="Picture 26">
             <a:extLst>
               <a:ext uri="{FF2B5EF4-FFF2-40B4-BE49-F238E27FC236}">
-                <a16:creationId xmlns:a16="http://schemas.microsoft.com/office/drawing/2014/main" id="{3B4E6008-C9AF-AE31-98D8-2BB5868A1CEA}"/>
+                <a16:creationId xmlns:a16="http://schemas.microsoft.com/office/drawing/2014/main" id="{C2985A1F-9D4E-951D-87C5-9709677E68AC}"/>
               </a:ext>
             </a:extLst>
           </p:cNvPr>
@@ -23775,15 +24422,16 @@
           </p:cNvPicPr>
           <p:nvPr/>
         </p:nvPicPr>
-        <p:blipFill rotWithShape="1">
-          <a:blip r:embed="rId9"/>
-          <a:srcRect t="2244" r="1530" b="3164"/>
-          <a:stretch/>
+        <p:blipFill>
+          <a:blip r:embed="rId10"/>
+          <a:stretch>
+            <a:fillRect/>
+          </a:stretch>
         </p:blipFill>
         <p:spPr>
           <a:xfrm>
-            <a:off x="468454" y="702967"/>
-            <a:ext cx="2741039" cy="4140000"/>
+            <a:off x="572911" y="702967"/>
+            <a:ext cx="2501250" cy="4140000"/>
           </a:xfrm>
           <a:prstGeom prst="rect">
             <a:avLst/>
@@ -24562,6 +25210,78 @@
                       </p:childTnLst>
                     </p:cTn>
                   </p:par>
+                  <p:par>
+                    <p:cTn id="61" fill="hold">
+                      <p:stCondLst>
+                        <p:cond delay="indefinite"/>
+                      </p:stCondLst>
+                      <p:childTnLst>
+                        <p:par>
+                          <p:cTn id="62" fill="hold">
+                            <p:stCondLst>
+                              <p:cond delay="0"/>
+                            </p:stCondLst>
+                            <p:childTnLst>
+                              <p:par>
+                                <p:cTn id="63" presetID="1" presetClass="entr" presetSubtype="0" fill="hold" nodeType="clickEffect">
+                                  <p:stCondLst>
+                                    <p:cond delay="0"/>
+                                  </p:stCondLst>
+                                  <p:childTnLst>
+                                    <p:set>
+                                      <p:cBhvr>
+                                        <p:cTn id="64" dur="1" fill="hold">
+                                          <p:stCondLst>
+                                            <p:cond delay="0"/>
+                                          </p:stCondLst>
+                                        </p:cTn>
+                                        <p:tgtEl>
+                                          <p:spTgt spid="27"/>
+                                        </p:tgtEl>
+                                        <p:attrNameLst>
+                                          <p:attrName>style.visibility</p:attrName>
+                                        </p:attrNameLst>
+                                      </p:cBhvr>
+                                      <p:to>
+                                        <p:strVal val="visible"/>
+                                      </p:to>
+                                    </p:set>
+                                  </p:childTnLst>
+                                </p:cTn>
+                              </p:par>
+                              <p:par>
+                                <p:cTn id="65" presetID="1" presetClass="exit" presetSubtype="0" fill="hold" nodeType="withEffect">
+                                  <p:stCondLst>
+                                    <p:cond delay="0"/>
+                                  </p:stCondLst>
+                                  <p:childTnLst>
+                                    <p:set>
+                                      <p:cBhvr>
+                                        <p:cTn id="66" dur="1" fill="hold">
+                                          <p:stCondLst>
+                                            <p:cond delay="0"/>
+                                          </p:stCondLst>
+                                        </p:cTn>
+                                        <p:tgtEl>
+                                          <p:spTgt spid="29"/>
+                                        </p:tgtEl>
+                                        <p:attrNameLst>
+                                          <p:attrName>style.visibility</p:attrName>
+                                        </p:attrNameLst>
+                                      </p:cBhvr>
+                                      <p:to>
+                                        <p:strVal val="hidden"/>
+                                      </p:to>
+                                    </p:set>
+                                  </p:childTnLst>
+                                </p:cTn>
+                              </p:par>
+                            </p:childTnLst>
+                          </p:cTn>
+                        </p:par>
+                      </p:childTnLst>
+                    </p:cTn>
+                  </p:par>
                 </p:childTnLst>
               </p:cTn>
               <p:prevCondLst>
@@ -24616,6 +25336,36 @@
           <a:chExt cx="0" cy="0"/>
         </a:xfrm>
       </p:grpSpPr>
+      <p:pic>
+        <p:nvPicPr>
+          <p:cNvPr id="13" name="Picture 12">
+            <a:extLst>
+              <a:ext uri="{FF2B5EF4-FFF2-40B4-BE49-F238E27FC236}">
+                <a16:creationId xmlns:a16="http://schemas.microsoft.com/office/drawing/2014/main" id="{3E4C6825-20F5-0343-DCC7-AC95E9AD5075}"/>
+              </a:ext>
+            </a:extLst>
+          </p:cNvPr>
+          <p:cNvPicPr>
+            <a:picLocks noChangeAspect="1"/>
+          </p:cNvPicPr>
+          <p:nvPr/>
+        </p:nvPicPr>
+        <p:blipFill>
+          <a:blip r:embed="rId3"/>
+          <a:stretch>
+            <a:fillRect/>
+          </a:stretch>
+        </p:blipFill>
+        <p:spPr>
+          <a:xfrm>
+            <a:off x="3653656" y="854079"/>
+            <a:ext cx="4576374" cy="2830221"/>
+          </a:xfrm>
+          <a:prstGeom prst="rect">
+            <a:avLst/>
+          </a:prstGeom>
+        </p:spPr>
+      </p:pic>
       <p:sp>
         <p:nvSpPr>
           <p:cNvPr id="2" name="Title 1">
@@ -24660,7 +25410,7 @@
         </p:nvSpPr>
         <p:spPr>
           <a:xfrm>
-            <a:off x="4426090" y="3742643"/>
+            <a:off x="3877732" y="3742643"/>
             <a:ext cx="4922177" cy="868047"/>
           </a:xfrm>
           <a:prstGeom prst="rect">
@@ -24877,36 +25627,6 @@
       </p:sp>
       <p:pic>
         <p:nvPicPr>
-          <p:cNvPr id="3" name="Picture 2">
-            <a:extLst>
-              <a:ext uri="{FF2B5EF4-FFF2-40B4-BE49-F238E27FC236}">
-                <a16:creationId xmlns:a16="http://schemas.microsoft.com/office/drawing/2014/main" id="{945D353E-A9F3-9D9B-D422-F746FF8AAFE0}"/>
-              </a:ext>
-            </a:extLst>
-          </p:cNvPr>
-          <p:cNvPicPr>
-            <a:picLocks noChangeAspect="1"/>
-          </p:cNvPicPr>
-          <p:nvPr/>
-        </p:nvPicPr>
-        <p:blipFill>
-          <a:blip r:embed="rId3"/>
-          <a:stretch>
-            <a:fillRect/>
-          </a:stretch>
-        </p:blipFill>
-        <p:spPr>
-          <a:xfrm>
-            <a:off x="4153704" y="752170"/>
-            <a:ext cx="4771491" cy="2950890"/>
-          </a:xfrm>
-          <a:prstGeom prst="rect">
-            <a:avLst/>
-          </a:prstGeom>
-        </p:spPr>
-      </p:pic>
-      <p:pic>
-        <p:nvPicPr>
           <p:cNvPr id="12" name="Picture 11">
             <a:extLst>
               <a:ext uri="{FF2B5EF4-FFF2-40B4-BE49-F238E27FC236}">
@@ -24927,8 +25647,8 @@
         </p:blipFill>
         <p:spPr>
           <a:xfrm>
-            <a:off x="4426090" y="1128662"/>
-            <a:ext cx="4226720" cy="2613981"/>
+            <a:off x="3807728" y="970682"/>
+            <a:ext cx="4422302" cy="2734937"/>
           </a:xfrm>
           <a:prstGeom prst="rect">
             <a:avLst/>
@@ -24937,10 +25657,10 @@
       </p:pic>
       <p:pic>
         <p:nvPicPr>
-          <p:cNvPr id="7" name="Picture 6" descr="Map&#10;&#10;Description automatically generated">
+          <p:cNvPr id="8" name="Picture 7" descr="Map&#10;&#10;Description automatically generated">
             <a:extLst>
               <a:ext uri="{FF2B5EF4-FFF2-40B4-BE49-F238E27FC236}">
-                <a16:creationId xmlns:a16="http://schemas.microsoft.com/office/drawing/2014/main" id="{8DEDE3E3-E950-EA8E-4828-FC5FE6EDFABC}"/>
+                <a16:creationId xmlns:a16="http://schemas.microsoft.com/office/drawing/2014/main" id="{1EDFC747-0204-BD6C-3C61-A6E81A83A901}"/>
               </a:ext>
             </a:extLst>
           </p:cNvPr>
@@ -24949,16 +25669,44 @@
           </p:cNvPicPr>
           <p:nvPr/>
         </p:nvPicPr>
-        <p:blipFill>
+        <p:blipFill rotWithShape="1">
           <a:blip r:embed="rId5"/>
-          <a:stretch>
-            <a:fillRect/>
-          </a:stretch>
+          <a:srcRect l="3801" t="3676" r="4565"/>
+          <a:stretch/>
         </p:blipFill>
         <p:spPr>
           <a:xfrm>
-            <a:off x="420852" y="752170"/>
-            <a:ext cx="2645000" cy="4140000"/>
+            <a:off x="517348" y="677525"/>
+            <a:ext cx="2516204" cy="4140000"/>
+          </a:xfrm>
+          <a:prstGeom prst="rect">
+            <a:avLst/>
+          </a:prstGeom>
+        </p:spPr>
+      </p:pic>
+      <p:pic>
+        <p:nvPicPr>
+          <p:cNvPr id="10" name="Picture 9" descr="Map&#10;&#10;Description automatically generated">
+            <a:extLst>
+              <a:ext uri="{FF2B5EF4-FFF2-40B4-BE49-F238E27FC236}">
+                <a16:creationId xmlns:a16="http://schemas.microsoft.com/office/drawing/2014/main" id="{B35E4439-AF08-5A49-6CDB-EC84BFC4C489}"/>
+              </a:ext>
+            </a:extLst>
+          </p:cNvPr>
+          <p:cNvPicPr>
+            <a:picLocks noChangeAspect="1"/>
+          </p:cNvPicPr>
+          <p:nvPr/>
+        </p:nvPicPr>
+        <p:blipFill rotWithShape="1">
+          <a:blip r:embed="rId6"/>
+          <a:srcRect l="2797" t="3069" r="5395"/>
+          <a:stretch/>
+        </p:blipFill>
+        <p:spPr>
+          <a:xfrm>
+            <a:off x="531921" y="677525"/>
+            <a:ext cx="2516347" cy="4140000"/>
           </a:xfrm>
           <a:prstGeom prst="rect">
             <a:avLst/>
@@ -24979,7 +25727,7 @@
         </p:nvSpPr>
         <p:spPr>
           <a:xfrm>
-            <a:off x="634051" y="914775"/>
+            <a:off x="609725" y="780462"/>
             <a:ext cx="1180369" cy="338554"/>
           </a:xfrm>
           <a:prstGeom prst="rect">
@@ -25084,7 +25832,7 @@
                             </p:stCondLst>
                             <p:childTnLst>
                               <p:par>
-                                <p:cTn id="9" presetID="1" presetClass="entr" presetSubtype="0" fill="hold" nodeType="clickEffect">
+                                <p:cTn id="9" presetID="1" presetClass="exit" presetSubtype="0" fill="hold" nodeType="clickEffect">
                                   <p:stCondLst>
                                     <p:cond delay="0"/>
                                   </p:stCondLst>
@@ -25092,33 +25840,6 @@
                                     <p:set>
                                       <p:cBhvr>
                                         <p:cTn id="10" dur="1" fill="hold">
-                                          <p:stCondLst>
-                                            <p:cond delay="0"/>
-                                          </p:stCondLst>
-                                        </p:cTn>
-                                        <p:tgtEl>
-                                          <p:spTgt spid="3"/>
-                                        </p:tgtEl>
-                                        <p:attrNameLst>
-                                          <p:attrName>style.visibility</p:attrName>
-                                        </p:attrNameLst>
-                                      </p:cBhvr>
-                                      <p:to>
-                                        <p:strVal val="visible"/>
-                                      </p:to>
-                                    </p:set>
-                                  </p:childTnLst>
-                                </p:cTn>
-                              </p:par>
-                              <p:par>
-                                <p:cTn id="11" presetID="1" presetClass="exit" presetSubtype="0" fill="hold" nodeType="withEffect">
-                                  <p:stCondLst>
-                                    <p:cond delay="0"/>
-                                  </p:stCondLst>
-                                  <p:childTnLst>
-                                    <p:set>
-                                      <p:cBhvr>
-                                        <p:cTn id="12" dur="1" fill="hold">
                                           <p:stCondLst>
                                             <p:cond delay="0"/>
                                           </p:stCondLst>
@@ -25132,6 +25853,33 @@
                                       </p:cBhvr>
                                       <p:to>
                                         <p:strVal val="hidden"/>
+                                      </p:to>
+                                    </p:set>
+                                  </p:childTnLst>
+                                </p:cTn>
+                              </p:par>
+                              <p:par>
+                                <p:cTn id="11" presetID="1" presetClass="entr" presetSubtype="0" fill="hold" nodeType="withEffect">
+                                  <p:stCondLst>
+                                    <p:cond delay="0"/>
+                                  </p:stCondLst>
+                                  <p:childTnLst>
+                                    <p:set>
+                                      <p:cBhvr>
+                                        <p:cTn id="12" dur="1" fill="hold">
+                                          <p:stCondLst>
+                                            <p:cond delay="0"/>
+                                          </p:stCondLst>
+                                        </p:cTn>
+                                        <p:tgtEl>
+                                          <p:spTgt spid="13"/>
+                                        </p:tgtEl>
+                                        <p:attrNameLst>
+                                          <p:attrName>style.visibility</p:attrName>
+                                        </p:attrNameLst>
+                                      </p:cBhvr>
+                                      <p:to>
+                                        <p:strVal val="visible"/>
                                       </p:to>
                                     </p:set>
                                   </p:childTnLst>
@@ -25188,6 +25936,78 @@
                       </p:childTnLst>
                     </p:cTn>
                   </p:par>
+                  <p:par>
+                    <p:cTn id="17" fill="hold">
+                      <p:stCondLst>
+                        <p:cond delay="indefinite"/>
+                      </p:stCondLst>
+                      <p:childTnLst>
+                        <p:par>
+                          <p:cTn id="18" fill="hold">
+                            <p:stCondLst>
+                              <p:cond delay="0"/>
+                            </p:stCondLst>
+                            <p:childTnLst>
+                              <p:par>
+                                <p:cTn id="19" presetID="1" presetClass="entr" presetSubtype="0" fill="hold" nodeType="clickEffect">
+                                  <p:stCondLst>
+                                    <p:cond delay="0"/>
+                                  </p:stCondLst>
+                                  <p:childTnLst>
+                                    <p:set>
+                                      <p:cBhvr>
+                                        <p:cTn id="20" dur="1" fill="hold">
+                                          <p:stCondLst>
+                                            <p:cond delay="0"/>
+                                          </p:stCondLst>
+                                        </p:cTn>
+                                        <p:tgtEl>
+                                          <p:spTgt spid="10"/>
+                                        </p:tgtEl>
+                                        <p:attrNameLst>
+                                          <p:attrName>style.visibility</p:attrName>
+                                        </p:attrNameLst>
+                                      </p:cBhvr>
+                                      <p:to>
+                                        <p:strVal val="visible"/>
+                                      </p:to>
+                                    </p:set>
+                                  </p:childTnLst>
+                                </p:cTn>
+                              </p:par>
+                              <p:par>
+                                <p:cTn id="21" presetID="1" presetClass="exit" presetSubtype="0" fill="hold" nodeType="withEffect">
+                                  <p:stCondLst>
+                                    <p:cond delay="0"/>
+                                  </p:stCondLst>
+                                  <p:childTnLst>
+                                    <p:set>
+                                      <p:cBhvr>
+                                        <p:cTn id="22" dur="1" fill="hold">
+                                          <p:stCondLst>
+                                            <p:cond delay="0"/>
+                                          </p:stCondLst>
+                                        </p:cTn>
+                                        <p:tgtEl>
+                                          <p:spTgt spid="8"/>
+                                        </p:tgtEl>
+                                        <p:attrNameLst>
+                                          <p:attrName>style.visibility</p:attrName>
+                                        </p:attrNameLst>
+                                      </p:cBhvr>
+                                      <p:to>
+                                        <p:strVal val="hidden"/>
+                                      </p:to>
+                                    </p:set>
+                                  </p:childTnLst>
+                                </p:cTn>
+                              </p:par>
+                            </p:childTnLst>
+                          </p:cTn>
+                        </p:par>
+                      </p:childTnLst>
+                    </p:cTn>
+                  </p:par>
                 </p:childTnLst>
               </p:cTn>
               <p:prevCondLst>
@@ -25233,80 +26053,6 @@
           <a:chExt cx="0" cy="0"/>
         </a:xfrm>
       </p:grpSpPr>
-      <p:sp>
-        <p:nvSpPr>
-          <p:cNvPr id="78" name="Google Shape;500;p18">
-            <a:extLst>
-              <a:ext uri="{FF2B5EF4-FFF2-40B4-BE49-F238E27FC236}">
-                <a16:creationId xmlns:a16="http://schemas.microsoft.com/office/drawing/2014/main" id="{C24AB7E0-ED67-6CB9-876A-EDC53966A689}"/>
-              </a:ext>
-            </a:extLst>
-          </p:cNvPr>
-          <p:cNvSpPr txBox="1">
-            <a:spLocks noGrp="1"/>
-          </p:cNvSpPr>
-          <p:nvPr>
-            <p:ph type="body" idx="1"/>
-          </p:nvPr>
-        </p:nvSpPr>
-        <p:spPr>
-          <a:xfrm>
-            <a:off x="641791" y="1206851"/>
-            <a:ext cx="7922029" cy="2346593"/>
-          </a:xfrm>
-          <a:prstGeom prst="rect">
-            <a:avLst/>
-          </a:prstGeom>
-        </p:spPr>
-        <p:txBody>
-          <a:bodyPr spcFirstLastPara="1" wrap="square" lIns="91425" tIns="91425" rIns="91425" bIns="91425" anchor="t" anchorCtr="0">
-            <a:normAutofit/>
-          </a:bodyPr>
-          <a:lstStyle/>
-          <a:p>
-            <a:pPr marL="101600" indent="0">
-              <a:buNone/>
-            </a:pPr>
-            <a:r>
-              <a:rPr lang="en-US" sz="1800" b="1" dirty="0"/>
-              <a:t>Akaike information criterion (AIC) and Bayesian information criterion (BIC)</a:t>
-            </a:r>
-          </a:p>
-          <a:p>
-            <a:r>
-              <a:rPr lang="en-US" sz="1800" dirty="0"/>
-              <a:t>Measure of model performance that accounts for model complexity</a:t>
-            </a:r>
-          </a:p>
-          <a:p>
-            <a:r>
-              <a:rPr lang="en-US" sz="1800" dirty="0"/>
-              <a:t>Combines a term for how well model fits data with a term that penalizes the model in proportion to the number of parameters</a:t>
-            </a:r>
-          </a:p>
-          <a:p>
-            <a:r>
-              <a:rPr lang="en-US" sz="1800" dirty="0"/>
-              <a:t>BIC penalizes more than AIC for additional parameters</a:t>
-            </a:r>
-          </a:p>
-          <a:p>
-            <a:r>
-              <a:rPr lang="en-US" sz="1800" dirty="0"/>
-              <a:t>Want AIC and BIC to be as low as possible</a:t>
-            </a:r>
-            <a:endParaRPr sz="1600" dirty="0">
-              <a:solidFill>
-                <a:schemeClr val="bg1">
-                  <a:lumMod val="50000"/>
-                </a:schemeClr>
-              </a:solidFill>
-              <a:latin typeface="Source Sans Pro" panose="020B0503030403020204" pitchFamily="34" charset="0"/>
-              <a:ea typeface="Source Sans Pro" panose="020B0503030403020204" pitchFamily="34" charset="0"/>
-            </a:endParaRPr>
-          </a:p>
-        </p:txBody>
-      </p:sp>
       <p:pic>
         <p:nvPicPr>
           <p:cNvPr id="84" name="Picture 83">
@@ -27560,6 +28306,74 @@
           </a:fontRef>
         </p:style>
       </p:cxnSp>
+      <p:sp>
+        <p:nvSpPr>
+          <p:cNvPr id="78" name="Google Shape;500;p18">
+            <a:extLst>
+              <a:ext uri="{FF2B5EF4-FFF2-40B4-BE49-F238E27FC236}">
+                <a16:creationId xmlns:a16="http://schemas.microsoft.com/office/drawing/2014/main" id="{C24AB7E0-ED67-6CB9-876A-EDC53966A689}"/>
+              </a:ext>
+            </a:extLst>
+          </p:cNvPr>
+          <p:cNvSpPr txBox="1">
+            <a:spLocks noGrp="1"/>
+          </p:cNvSpPr>
+          <p:nvPr>
+            <p:ph type="body" idx="1"/>
+          </p:nvPr>
+        </p:nvSpPr>
+        <p:spPr>
+          <a:xfrm>
+            <a:off x="691538" y="1146804"/>
+            <a:ext cx="7922029" cy="2346593"/>
+          </a:xfrm>
+          <a:prstGeom prst="rect">
+            <a:avLst/>
+          </a:prstGeom>
+        </p:spPr>
+        <p:txBody>
+          <a:bodyPr spcFirstLastPara="1" wrap="square" lIns="91425" tIns="91425" rIns="91425" bIns="91425" anchor="t" anchorCtr="0">
+            <a:normAutofit/>
+          </a:bodyPr>
+          <a:lstStyle/>
+          <a:p>
+            <a:pPr marL="101600" indent="0">
+              <a:buNone/>
+            </a:pPr>
+            <a:r>
+              <a:rPr lang="en-US" sz="1800" b="1" dirty="0"/>
+              <a:t>Akaike information criterion (AIC) and Bayesian information criterion (BIC)</a:t>
+            </a:r>
+          </a:p>
+          <a:p>
+            <a:r>
+              <a:rPr lang="en-US" sz="1800" dirty="0"/>
+              <a:t>Measures how well model fits data but penalizes the model in proportion to the number of parameters</a:t>
+            </a:r>
+          </a:p>
+          <a:p>
+            <a:r>
+              <a:rPr lang="en-US" sz="1800" dirty="0"/>
+              <a:t>BIC penalizes more than AIC for additional parameters</a:t>
+            </a:r>
+          </a:p>
+          <a:p>
+            <a:r>
+              <a:rPr lang="en-US" sz="1800" dirty="0"/>
+              <a:t>Want AIC and BIC to be as low as possible</a:t>
+            </a:r>
+            <a:endParaRPr sz="1600" dirty="0">
+              <a:solidFill>
+                <a:schemeClr val="bg1">
+                  <a:lumMod val="50000"/>
+                </a:schemeClr>
+              </a:solidFill>
+              <a:latin typeface="Source Sans Pro" panose="020B0503030403020204" pitchFamily="34" charset="0"/>
+              <a:ea typeface="Source Sans Pro" panose="020B0503030403020204" pitchFamily="34" charset="0"/>
+            </a:endParaRPr>
+          </a:p>
+        </p:txBody>
+      </p:sp>
     </p:spTree>
     <p:extLst>
       <p:ext uri="{BB962C8B-B14F-4D97-AF65-F5344CB8AC3E}">
@@ -27787,7 +28601,7 @@
                             </p:stCondLst>
                             <p:childTnLst>
                               <p:par>
-                                <p:cTn id="21" presetID="1" presetClass="entr" presetSubtype="0" fill="hold" nodeType="clickEffect">
+                                <p:cTn id="21" presetID="1" presetClass="exit" presetSubtype="0" fill="hold" grpId="0" nodeType="clickEffect">
                                   <p:stCondLst>
                                     <p:cond delay="0"/>
                                   </p:stCondLst>
@@ -27802,7 +28616,7 @@
                                         <p:tgtEl>
                                           <p:spTgt spid="78">
                                             <p:txEl>
-                                              <p:pRg st="4" end="4"/>
+                                              <p:pRg st="0" end="0"/>
                                             </p:txEl>
                                           </p:spTgt>
                                         </p:tgtEl>
@@ -27811,32 +28625,45 @@
                                         </p:attrNameLst>
                                       </p:cBhvr>
                                       <p:to>
-                                        <p:strVal val="visible"/>
+                                        <p:strVal val="hidden"/>
                                       </p:to>
                                     </p:set>
                                   </p:childTnLst>
                                 </p:cTn>
                               </p:par>
-                            </p:childTnLst>
-                          </p:cTn>
-                        </p:par>
-                      </p:childTnLst>
-                    </p:cTn>
-                  </p:par>
-                  <p:par>
-                    <p:cTn id="23" fill="hold">
-                      <p:stCondLst>
-                        <p:cond delay="indefinite"/>
-                      </p:stCondLst>
-                      <p:childTnLst>
-                        <p:par>
-                          <p:cTn id="24" fill="hold">
-                            <p:stCondLst>
-                              <p:cond delay="0"/>
-                            </p:stCondLst>
-                            <p:childTnLst>
                               <p:par>
-                                <p:cTn id="25" presetID="1" presetClass="exit" presetSubtype="0" fill="hold" grpId="0" nodeType="clickEffect">
+                                <p:cTn id="23" presetID="1" presetClass="exit" presetSubtype="0" fill="hold" grpId="0" nodeType="withEffect">
+                                  <p:stCondLst>
+                                    <p:cond delay="0"/>
+                                  </p:stCondLst>
+                                  <p:childTnLst>
+                                    <p:set>
+                                      <p:cBhvr>
+                                        <p:cTn id="24" dur="1" fill="hold">
+                                          <p:stCondLst>
+                                            <p:cond delay="0"/>
+                                          </p:stCondLst>
+                                        </p:cTn>
+                                        <p:tgtEl>
+                                          <p:spTgt spid="78">
+                                            <p:txEl>
+                                              <p:pRg st="1" end="1"/>
+                                            </p:txEl>
+                                          </p:spTgt>
+                                        </p:tgtEl>
+                                        <p:attrNameLst>
+                                          <p:attrName>style.visibility</p:attrName>
+                                        </p:attrNameLst>
+                                      </p:cBhvr>
+                                      <p:to>
+                                        <p:strVal val="hidden"/>
+                                      </p:to>
+                                    </p:set>
+                                  </p:childTnLst>
+                                </p:cTn>
+                              </p:par>
+                              <p:par>
+                                <p:cTn id="25" presetID="1" presetClass="exit" presetSubtype="0" fill="hold" grpId="0" nodeType="withEffect">
                                   <p:stCondLst>
                                     <p:cond delay="0"/>
                                   </p:stCondLst>
@@ -27851,7 +28678,7 @@
                                         <p:tgtEl>
                                           <p:spTgt spid="78">
                                             <p:txEl>
-                                              <p:pRg st="0" end="0"/>
+                                              <p:pRg st="2" end="2"/>
                                             </p:txEl>
                                           </p:spTgt>
                                         </p:tgtEl>
@@ -27882,68 +28709,6 @@
                                         <p:tgtEl>
                                           <p:spTgt spid="78">
                                             <p:txEl>
-                                              <p:pRg st="1" end="1"/>
-                                            </p:txEl>
-                                          </p:spTgt>
-                                        </p:tgtEl>
-                                        <p:attrNameLst>
-                                          <p:attrName>style.visibility</p:attrName>
-                                        </p:attrNameLst>
-                                      </p:cBhvr>
-                                      <p:to>
-                                        <p:strVal val="hidden"/>
-                                      </p:to>
-                                    </p:set>
-                                  </p:childTnLst>
-                                </p:cTn>
-                              </p:par>
-                              <p:par>
-                                <p:cTn id="29" presetID="1" presetClass="exit" presetSubtype="0" fill="hold" grpId="0" nodeType="withEffect">
-                                  <p:stCondLst>
-                                    <p:cond delay="0"/>
-                                  </p:stCondLst>
-                                  <p:childTnLst>
-                                    <p:set>
-                                      <p:cBhvr>
-                                        <p:cTn id="30" dur="1" fill="hold">
-                                          <p:stCondLst>
-                                            <p:cond delay="0"/>
-                                          </p:stCondLst>
-                                        </p:cTn>
-                                        <p:tgtEl>
-                                          <p:spTgt spid="78">
-                                            <p:txEl>
-                                              <p:pRg st="2" end="2"/>
-                                            </p:txEl>
-                                          </p:spTgt>
-                                        </p:tgtEl>
-                                        <p:attrNameLst>
-                                          <p:attrName>style.visibility</p:attrName>
-                                        </p:attrNameLst>
-                                      </p:cBhvr>
-                                      <p:to>
-                                        <p:strVal val="hidden"/>
-                                      </p:to>
-                                    </p:set>
-                                  </p:childTnLst>
-                                </p:cTn>
-                              </p:par>
-                              <p:par>
-                                <p:cTn id="31" presetID="1" presetClass="exit" presetSubtype="0" fill="hold" grpId="0" nodeType="withEffect">
-                                  <p:stCondLst>
-                                    <p:cond delay="0"/>
-                                  </p:stCondLst>
-                                  <p:childTnLst>
-                                    <p:set>
-                                      <p:cBhvr>
-                                        <p:cTn id="32" dur="1" fill="hold">
-                                          <p:stCondLst>
-                                            <p:cond delay="0"/>
-                                          </p:stCondLst>
-                                        </p:cTn>
-                                        <p:tgtEl>
-                                          <p:spTgt spid="78">
-                                            <p:txEl>
                                               <p:pRg st="3" end="3"/>
                                             </p:txEl>
                                           </p:spTgt>
@@ -27960,45 +28725,14 @@
                                 </p:cTn>
                               </p:par>
                               <p:par>
-                                <p:cTn id="33" presetID="1" presetClass="exit" presetSubtype="0" fill="hold" grpId="0" nodeType="withEffect">
+                                <p:cTn id="29" presetID="1" presetClass="entr" presetSubtype="0" fill="hold" nodeType="withEffect">
                                   <p:stCondLst>
                                     <p:cond delay="0"/>
                                   </p:stCondLst>
                                   <p:childTnLst>
                                     <p:set>
                                       <p:cBhvr>
-                                        <p:cTn id="34" dur="1" fill="hold">
-                                          <p:stCondLst>
-                                            <p:cond delay="0"/>
-                                          </p:stCondLst>
-                                        </p:cTn>
-                                        <p:tgtEl>
-                                          <p:spTgt spid="78">
-                                            <p:txEl>
-                                              <p:pRg st="4" end="4"/>
-                                            </p:txEl>
-                                          </p:spTgt>
-                                        </p:tgtEl>
-                                        <p:attrNameLst>
-                                          <p:attrName>style.visibility</p:attrName>
-                                        </p:attrNameLst>
-                                      </p:cBhvr>
-                                      <p:to>
-                                        <p:strVal val="hidden"/>
-                                      </p:to>
-                                    </p:set>
-                                  </p:childTnLst>
-                                </p:cTn>
-                              </p:par>
-                              <p:par>
-                                <p:cTn id="35" presetID="1" presetClass="entr" presetSubtype="0" fill="hold" nodeType="withEffect">
-                                  <p:stCondLst>
-                                    <p:cond delay="0"/>
-                                  </p:stCondLst>
-                                  <p:childTnLst>
-                                    <p:set>
-                                      <p:cBhvr>
-                                        <p:cTn id="36" dur="1" fill="hold">
+                                        <p:cTn id="30" dur="1" fill="hold">
                                           <p:stCondLst>
                                             <p:cond delay="0"/>
                                           </p:stCondLst>
@@ -28024,26 +28758,26 @@
                     </p:cTn>
                   </p:par>
                   <p:par>
-                    <p:cTn id="37" fill="hold">
+                    <p:cTn id="31" fill="hold">
                       <p:stCondLst>
                         <p:cond delay="indefinite"/>
                       </p:stCondLst>
                       <p:childTnLst>
                         <p:par>
-                          <p:cTn id="38" fill="hold">
+                          <p:cTn id="32" fill="hold">
                             <p:stCondLst>
                               <p:cond delay="0"/>
                             </p:stCondLst>
                             <p:childTnLst>
                               <p:par>
-                                <p:cTn id="39" presetID="1" presetClass="entr" presetSubtype="0" fill="hold" grpId="0" nodeType="clickEffect">
+                                <p:cTn id="33" presetID="1" presetClass="entr" presetSubtype="0" fill="hold" grpId="0" nodeType="clickEffect">
                                   <p:stCondLst>
                                     <p:cond delay="0"/>
                                   </p:stCondLst>
                                   <p:childTnLst>
                                     <p:set>
                                       <p:cBhvr>
-                                        <p:cTn id="40" dur="1" fill="hold">
+                                        <p:cTn id="34" dur="1" fill="hold">
                                           <p:stCondLst>
                                             <p:cond delay="0"/>
                                           </p:stCondLst>
@@ -28069,26 +28803,26 @@
                     </p:cTn>
                   </p:par>
                   <p:par>
-                    <p:cTn id="41" fill="hold">
+                    <p:cTn id="35" fill="hold">
                       <p:stCondLst>
                         <p:cond delay="indefinite"/>
                       </p:stCondLst>
                       <p:childTnLst>
                         <p:par>
-                          <p:cTn id="42" fill="hold">
+                          <p:cTn id="36" fill="hold">
                             <p:stCondLst>
                               <p:cond delay="0"/>
                             </p:stCondLst>
                             <p:childTnLst>
                               <p:par>
-                                <p:cTn id="43" presetID="1" presetClass="entr" presetSubtype="0" fill="hold" grpId="0" nodeType="clickEffect">
+                                <p:cTn id="37" presetID="1" presetClass="entr" presetSubtype="0" fill="hold" grpId="0" nodeType="clickEffect">
                                   <p:stCondLst>
                                     <p:cond delay="0"/>
                                   </p:stCondLst>
                                   <p:childTnLst>
                                     <p:set>
                                       <p:cBhvr>
-                                        <p:cTn id="44" dur="1" fill="hold">
+                                        <p:cTn id="38" dur="1" fill="hold">
                                           <p:stCondLst>
                                             <p:cond delay="0"/>
                                           </p:stCondLst>
@@ -28108,14 +28842,14 @@
                                 </p:cTn>
                               </p:par>
                               <p:par>
-                                <p:cTn id="45" presetID="1" presetClass="entr" presetSubtype="0" fill="hold" grpId="0" nodeType="withEffect">
+                                <p:cTn id="39" presetID="1" presetClass="entr" presetSubtype="0" fill="hold" grpId="0" nodeType="withEffect">
                                   <p:stCondLst>
                                     <p:cond delay="0"/>
                                   </p:stCondLst>
                                   <p:childTnLst>
                                     <p:set>
                                       <p:cBhvr>
-                                        <p:cTn id="46" dur="1" fill="hold">
+                                        <p:cTn id="40" dur="1" fill="hold">
                                           <p:stCondLst>
                                             <p:cond delay="0"/>
                                           </p:stCondLst>
@@ -28135,14 +28869,14 @@
                                 </p:cTn>
                               </p:par>
                               <p:par>
-                                <p:cTn id="47" presetID="1" presetClass="entr" presetSubtype="0" fill="hold" nodeType="withEffect">
+                                <p:cTn id="41" presetID="1" presetClass="entr" presetSubtype="0" fill="hold" nodeType="withEffect">
                                   <p:stCondLst>
                                     <p:cond delay="0"/>
                                   </p:stCondLst>
                                   <p:childTnLst>
                                     <p:set>
                                       <p:cBhvr>
-                                        <p:cTn id="48" dur="1" fill="hold">
+                                        <p:cTn id="42" dur="1" fill="hold">
                                           <p:stCondLst>
                                             <p:cond delay="0"/>
                                           </p:stCondLst>
@@ -28168,26 +28902,26 @@
                     </p:cTn>
                   </p:par>
                   <p:par>
-                    <p:cTn id="49" fill="hold">
+                    <p:cTn id="43" fill="hold">
                       <p:stCondLst>
                         <p:cond delay="indefinite"/>
                       </p:stCondLst>
                       <p:childTnLst>
                         <p:par>
-                          <p:cTn id="50" fill="hold">
+                          <p:cTn id="44" fill="hold">
                             <p:stCondLst>
                               <p:cond delay="0"/>
                             </p:stCondLst>
                             <p:childTnLst>
                               <p:par>
-                                <p:cTn id="51" presetID="1" presetClass="entr" presetSubtype="0" fill="hold" nodeType="clickEffect">
+                                <p:cTn id="45" presetID="1" presetClass="entr" presetSubtype="0" fill="hold" nodeType="clickEffect">
                                   <p:stCondLst>
                                     <p:cond delay="0"/>
                                   </p:stCondLst>
                                   <p:childTnLst>
                                     <p:set>
                                       <p:cBhvr>
-                                        <p:cTn id="52" dur="1" fill="hold">
+                                        <p:cTn id="46" dur="1" fill="hold">
                                           <p:stCondLst>
                                             <p:cond delay="0"/>
                                           </p:stCondLst>
@@ -28207,14 +28941,14 @@
                                 </p:cTn>
                               </p:par>
                               <p:par>
-                                <p:cTn id="53" presetID="1" presetClass="entr" presetSubtype="0" fill="hold" grpId="0" nodeType="withEffect">
+                                <p:cTn id="47" presetID="1" presetClass="entr" presetSubtype="0" fill="hold" grpId="0" nodeType="withEffect">
                                   <p:stCondLst>
                                     <p:cond delay="0"/>
                                   </p:stCondLst>
                                   <p:childTnLst>
                                     <p:set>
                                       <p:cBhvr>
-                                        <p:cTn id="54" dur="1" fill="hold">
+                                        <p:cTn id="48" dur="1" fill="hold">
                                           <p:stCondLst>
                                             <p:cond delay="0"/>
                                           </p:stCondLst>
@@ -28234,14 +28968,14 @@
                                 </p:cTn>
                               </p:par>
                               <p:par>
-                                <p:cTn id="55" presetID="1" presetClass="entr" presetSubtype="0" fill="hold" grpId="0" nodeType="withEffect">
+                                <p:cTn id="49" presetID="1" presetClass="entr" presetSubtype="0" fill="hold" grpId="0" nodeType="withEffect">
                                   <p:stCondLst>
                                     <p:cond delay="0"/>
                                   </p:stCondLst>
                                   <p:childTnLst>
                                     <p:set>
                                       <p:cBhvr>
-                                        <p:cTn id="56" dur="1" fill="hold">
+                                        <p:cTn id="50" dur="1" fill="hold">
                                           <p:stCondLst>
                                             <p:cond delay="0"/>
                                           </p:stCondLst>
@@ -28267,26 +29001,26 @@
                     </p:cTn>
                   </p:par>
                   <p:par>
-                    <p:cTn id="57" fill="hold">
+                    <p:cTn id="51" fill="hold">
                       <p:stCondLst>
                         <p:cond delay="indefinite"/>
                       </p:stCondLst>
                       <p:childTnLst>
                         <p:par>
-                          <p:cTn id="58" fill="hold">
+                          <p:cTn id="52" fill="hold">
                             <p:stCondLst>
                               <p:cond delay="0"/>
                             </p:stCondLst>
                             <p:childTnLst>
                               <p:par>
-                                <p:cTn id="59" presetID="1" presetClass="entr" presetSubtype="0" fill="hold" grpId="0" nodeType="clickEffect">
+                                <p:cTn id="53" presetID="1" presetClass="entr" presetSubtype="0" fill="hold" grpId="0" nodeType="clickEffect">
                                   <p:stCondLst>
                                     <p:cond delay="0"/>
                                   </p:stCondLst>
                                   <p:childTnLst>
                                     <p:set>
                                       <p:cBhvr>
-                                        <p:cTn id="60" dur="1" fill="hold">
+                                        <p:cTn id="54" dur="1" fill="hold">
                                           <p:stCondLst>
                                             <p:cond delay="0"/>
                                           </p:stCondLst>
@@ -28306,14 +29040,14 @@
                                 </p:cTn>
                               </p:par>
                               <p:par>
-                                <p:cTn id="61" presetID="1" presetClass="entr" presetSubtype="0" fill="hold" nodeType="withEffect">
+                                <p:cTn id="55" presetID="1" presetClass="entr" presetSubtype="0" fill="hold" nodeType="withEffect">
                                   <p:stCondLst>
                                     <p:cond delay="0"/>
                                   </p:stCondLst>
                                   <p:childTnLst>
                                     <p:set>
                                       <p:cBhvr>
-                                        <p:cTn id="62" dur="1" fill="hold">
+                                        <p:cTn id="56" dur="1" fill="hold">
                                           <p:stCondLst>
                                             <p:cond delay="0"/>
                                           </p:stCondLst>
@@ -28333,14 +29067,14 @@
                                 </p:cTn>
                               </p:par>
                               <p:par>
-                                <p:cTn id="63" presetID="1" presetClass="entr" presetSubtype="0" fill="hold" grpId="0" nodeType="withEffect">
+                                <p:cTn id="57" presetID="1" presetClass="entr" presetSubtype="0" fill="hold" grpId="0" nodeType="withEffect">
                                   <p:stCondLst>
                                     <p:cond delay="0"/>
                                   </p:stCondLst>
                                   <p:childTnLst>
                                     <p:set>
                                       <p:cBhvr>
-                                        <p:cTn id="64" dur="1" fill="hold">
+                                        <p:cTn id="58" dur="1" fill="hold">
                                           <p:stCondLst>
                                             <p:cond delay="0"/>
                                           </p:stCondLst>
@@ -28366,26 +29100,26 @@
                     </p:cTn>
                   </p:par>
                   <p:par>
-                    <p:cTn id="65" fill="hold">
+                    <p:cTn id="59" fill="hold">
                       <p:stCondLst>
                         <p:cond delay="indefinite"/>
                       </p:stCondLst>
                       <p:childTnLst>
                         <p:par>
-                          <p:cTn id="66" fill="hold">
+                          <p:cTn id="60" fill="hold">
                             <p:stCondLst>
                               <p:cond delay="0"/>
                             </p:stCondLst>
                             <p:childTnLst>
                               <p:par>
-                                <p:cTn id="67" presetID="1" presetClass="entr" presetSubtype="0" fill="hold" grpId="0" nodeType="clickEffect">
+                                <p:cTn id="61" presetID="1" presetClass="entr" presetSubtype="0" fill="hold" grpId="0" nodeType="clickEffect">
                                   <p:stCondLst>
                                     <p:cond delay="0"/>
                                   </p:stCondLst>
                                   <p:childTnLst>
                                     <p:set>
                                       <p:cBhvr>
-                                        <p:cTn id="68" dur="1" fill="hold">
+                                        <p:cTn id="62" dur="1" fill="hold">
                                           <p:stCondLst>
                                             <p:cond delay="0"/>
                                           </p:stCondLst>
@@ -28405,14 +29139,14 @@
                                 </p:cTn>
                               </p:par>
                               <p:par>
-                                <p:cTn id="69" presetID="1" presetClass="entr" presetSubtype="0" fill="hold" nodeType="withEffect">
+                                <p:cTn id="63" presetID="1" presetClass="entr" presetSubtype="0" fill="hold" nodeType="withEffect">
                                   <p:stCondLst>
                                     <p:cond delay="0"/>
                                   </p:stCondLst>
                                   <p:childTnLst>
                                     <p:set>
                                       <p:cBhvr>
-                                        <p:cTn id="70" dur="1" fill="hold">
+                                        <p:cTn id="64" dur="1" fill="hold">
                                           <p:stCondLst>
                                             <p:cond delay="0"/>
                                           </p:stCondLst>
@@ -28432,14 +29166,14 @@
                                 </p:cTn>
                               </p:par>
                               <p:par>
-                                <p:cTn id="71" presetID="1" presetClass="entr" presetSubtype="0" fill="hold" grpId="0" nodeType="withEffect">
+                                <p:cTn id="65" presetID="1" presetClass="entr" presetSubtype="0" fill="hold" grpId="0" nodeType="withEffect">
                                   <p:stCondLst>
                                     <p:cond delay="0"/>
                                   </p:stCondLst>
                                   <p:childTnLst>
                                     <p:set>
                                       <p:cBhvr>
-                                        <p:cTn id="72" dur="1" fill="hold">
+                                        <p:cTn id="66" dur="1" fill="hold">
                                           <p:stCondLst>
                                             <p:cond delay="0"/>
                                           </p:stCondLst>
@@ -28465,26 +29199,26 @@
                     </p:cTn>
                   </p:par>
                   <p:par>
-                    <p:cTn id="73" fill="hold">
+                    <p:cTn id="67" fill="hold">
                       <p:stCondLst>
                         <p:cond delay="indefinite"/>
                       </p:stCondLst>
                       <p:childTnLst>
                         <p:par>
-                          <p:cTn id="74" fill="hold">
+                          <p:cTn id="68" fill="hold">
                             <p:stCondLst>
                               <p:cond delay="0"/>
                             </p:stCondLst>
                             <p:childTnLst>
                               <p:par>
-                                <p:cTn id="75" presetID="1" presetClass="entr" presetSubtype="0" fill="hold" grpId="0" nodeType="clickEffect">
+                                <p:cTn id="69" presetID="1" presetClass="entr" presetSubtype="0" fill="hold" grpId="0" nodeType="clickEffect">
                                   <p:stCondLst>
                                     <p:cond delay="0"/>
                                   </p:stCondLst>
                                   <p:childTnLst>
                                     <p:set>
                                       <p:cBhvr>
-                                        <p:cTn id="76" dur="1" fill="hold">
+                                        <p:cTn id="70" dur="1" fill="hold">
                                           <p:stCondLst>
                                             <p:cond delay="0"/>
                                           </p:stCondLst>
@@ -28504,14 +29238,14 @@
                                 </p:cTn>
                               </p:par>
                               <p:par>
-                                <p:cTn id="77" presetID="1" presetClass="entr" presetSubtype="0" fill="hold" nodeType="withEffect">
+                                <p:cTn id="71" presetID="1" presetClass="entr" presetSubtype="0" fill="hold" nodeType="withEffect">
                                   <p:stCondLst>
                                     <p:cond delay="0"/>
                                   </p:stCondLst>
                                   <p:childTnLst>
                                     <p:set>
                                       <p:cBhvr>
-                                        <p:cTn id="78" dur="1" fill="hold">
+                                        <p:cTn id="72" dur="1" fill="hold">
                                           <p:stCondLst>
                                             <p:cond delay="0"/>
                                           </p:stCondLst>
@@ -28531,14 +29265,14 @@
                                 </p:cTn>
                               </p:par>
                               <p:par>
-                                <p:cTn id="79" presetID="1" presetClass="entr" presetSubtype="0" fill="hold" grpId="0" nodeType="withEffect">
+                                <p:cTn id="73" presetID="1" presetClass="entr" presetSubtype="0" fill="hold" grpId="0" nodeType="withEffect">
                                   <p:stCondLst>
                                     <p:cond delay="0"/>
                                   </p:stCondLst>
                                   <p:childTnLst>
                                     <p:set>
                                       <p:cBhvr>
-                                        <p:cTn id="80" dur="1" fill="hold">
+                                        <p:cTn id="74" dur="1" fill="hold">
                                           <p:stCondLst>
                                             <p:cond delay="0"/>
                                           </p:stCondLst>
@@ -28564,26 +29298,26 @@
                     </p:cTn>
                   </p:par>
                   <p:par>
-                    <p:cTn id="81" fill="hold">
+                    <p:cTn id="75" fill="hold">
                       <p:stCondLst>
                         <p:cond delay="indefinite"/>
                       </p:stCondLst>
                       <p:childTnLst>
                         <p:par>
-                          <p:cTn id="82" fill="hold">
+                          <p:cTn id="76" fill="hold">
                             <p:stCondLst>
                               <p:cond delay="0"/>
                             </p:stCondLst>
                             <p:childTnLst>
                               <p:par>
-                                <p:cTn id="83" presetID="1" presetClass="entr" presetSubtype="0" fill="hold" grpId="0" nodeType="clickEffect">
+                                <p:cTn id="77" presetID="1" presetClass="entr" presetSubtype="0" fill="hold" grpId="0" nodeType="clickEffect">
                                   <p:stCondLst>
                                     <p:cond delay="0"/>
                                   </p:stCondLst>
                                   <p:childTnLst>
                                     <p:set>
                                       <p:cBhvr>
-                                        <p:cTn id="84" dur="1" fill="hold">
+                                        <p:cTn id="78" dur="1" fill="hold">
                                           <p:stCondLst>
                                             <p:cond delay="0"/>
                                           </p:stCondLst>
@@ -28603,14 +29337,14 @@
                                 </p:cTn>
                               </p:par>
                               <p:par>
-                                <p:cTn id="85" presetID="1" presetClass="entr" presetSubtype="0" fill="hold" nodeType="withEffect">
+                                <p:cTn id="79" presetID="1" presetClass="entr" presetSubtype="0" fill="hold" nodeType="withEffect">
                                   <p:stCondLst>
                                     <p:cond delay="0"/>
                                   </p:stCondLst>
                                   <p:childTnLst>
                                     <p:set>
                                       <p:cBhvr>
-                                        <p:cTn id="86" dur="1" fill="hold">
+                                        <p:cTn id="80" dur="1" fill="hold">
                                           <p:stCondLst>
                                             <p:cond delay="0"/>
                                           </p:stCondLst>
@@ -28630,14 +29364,14 @@
                                 </p:cTn>
                               </p:par>
                               <p:par>
-                                <p:cTn id="87" presetID="1" presetClass="entr" presetSubtype="0" fill="hold" grpId="0" nodeType="withEffect">
+                                <p:cTn id="81" presetID="1" presetClass="entr" presetSubtype="0" fill="hold" grpId="0" nodeType="withEffect">
                                   <p:stCondLst>
                                     <p:cond delay="0"/>
                                   </p:stCondLst>
                                   <p:childTnLst>
                                     <p:set>
                                       <p:cBhvr>
-                                        <p:cTn id="88" dur="1" fill="hold">
+                                        <p:cTn id="82" dur="1" fill="hold">
                                           <p:stCondLst>
                                             <p:cond delay="0"/>
                                           </p:stCondLst>
@@ -28663,26 +29397,26 @@
                     </p:cTn>
                   </p:par>
                   <p:par>
-                    <p:cTn id="89" fill="hold">
+                    <p:cTn id="83" fill="hold">
                       <p:stCondLst>
                         <p:cond delay="indefinite"/>
                       </p:stCondLst>
                       <p:childTnLst>
                         <p:par>
-                          <p:cTn id="90" fill="hold">
+                          <p:cTn id="84" fill="hold">
                             <p:stCondLst>
                               <p:cond delay="0"/>
                             </p:stCondLst>
                             <p:childTnLst>
                               <p:par>
-                                <p:cTn id="91" presetID="1" presetClass="entr" presetSubtype="0" fill="hold" grpId="0" nodeType="clickEffect">
+                                <p:cTn id="85" presetID="1" presetClass="entr" presetSubtype="0" fill="hold" grpId="0" nodeType="clickEffect">
                                   <p:stCondLst>
                                     <p:cond delay="0"/>
                                   </p:stCondLst>
                                   <p:childTnLst>
                                     <p:set>
                                       <p:cBhvr>
-                                        <p:cTn id="92" dur="1" fill="hold">
+                                        <p:cTn id="86" dur="1" fill="hold">
                                           <p:stCondLst>
                                             <p:cond delay="0"/>
                                           </p:stCondLst>
@@ -28702,7 +29436,79 @@
                                 </p:cTn>
                               </p:par>
                               <p:par>
-                                <p:cTn id="93" presetID="1" presetClass="entr" presetSubtype="0" fill="hold" nodeType="withEffect">
+                                <p:cTn id="87" presetID="1" presetClass="entr" presetSubtype="0" fill="hold" nodeType="withEffect">
+                                  <p:stCondLst>
+                                    <p:cond delay="0"/>
+                                  </p:stCondLst>
+                                  <p:childTnLst>
+                                    <p:set>
+                                      <p:cBhvr>
+                                        <p:cTn id="88" dur="1" fill="hold">
+                                          <p:stCondLst>
+                                            <p:cond delay="0"/>
+                                          </p:stCondLst>
+                                        </p:cTn>
+                                        <p:tgtEl>
+                                          <p:spTgt spid="56"/>
+                                        </p:tgtEl>
+                                        <p:attrNameLst>
+                                          <p:attrName>style.visibility</p:attrName>
+                                        </p:attrNameLst>
+                                      </p:cBhvr>
+                                      <p:to>
+                                        <p:strVal val="visible"/>
+                                      </p:to>
+                                    </p:set>
+                                  </p:childTnLst>
+                                </p:cTn>
+                              </p:par>
+                              <p:par>
+                                <p:cTn id="89" presetID="1" presetClass="entr" presetSubtype="0" fill="hold" grpId="0" nodeType="withEffect">
+                                  <p:stCondLst>
+                                    <p:cond delay="0"/>
+                                  </p:stCondLst>
+                                  <p:childTnLst>
+                                    <p:set>
+                                      <p:cBhvr>
+                                        <p:cTn id="90" dur="1" fill="hold">
+                                          <p:stCondLst>
+                                            <p:cond delay="0"/>
+                                          </p:stCondLst>
+                                        </p:cTn>
+                                        <p:tgtEl>
+                                          <p:spTgt spid="21"/>
+                                        </p:tgtEl>
+                                        <p:attrNameLst>
+                                          <p:attrName>style.visibility</p:attrName>
+                                        </p:attrNameLst>
+                                      </p:cBhvr>
+                                      <p:to>
+                                        <p:strVal val="visible"/>
+                                      </p:to>
+                                    </p:set>
+                                  </p:childTnLst>
+                                </p:cTn>
+                              </p:par>
+                            </p:childTnLst>
+                          </p:cTn>
+                        </p:par>
+                      </p:childTnLst>
+                    </p:cTn>
+                  </p:par>
+                  <p:par>
+                    <p:cTn id="91" fill="hold">
+                      <p:stCondLst>
+                        <p:cond delay="indefinite"/>
+                      </p:stCondLst>
+                      <p:childTnLst>
+                        <p:par>
+                          <p:cTn id="92" fill="hold">
+                            <p:stCondLst>
+                              <p:cond delay="0"/>
+                            </p:stCondLst>
+                            <p:childTnLst>
+                              <p:par>
+                                <p:cTn id="93" presetID="1" presetClass="entr" presetSubtype="0" fill="hold" nodeType="clickEffect">
                                   <p:stCondLst>
                                     <p:cond delay="0"/>
                                   </p:stCondLst>
@@ -28715,7 +29521,7 @@
                                           </p:stCondLst>
                                         </p:cTn>
                                         <p:tgtEl>
-                                          <p:spTgt spid="56"/>
+                                          <p:spTgt spid="63"/>
                                         </p:tgtEl>
                                         <p:attrNameLst>
                                           <p:attrName>style.visibility</p:attrName>
@@ -28742,78 +29548,6 @@
                                           </p:stCondLst>
                                         </p:cTn>
                                         <p:tgtEl>
-                                          <p:spTgt spid="21"/>
-                                        </p:tgtEl>
-                                        <p:attrNameLst>
-                                          <p:attrName>style.visibility</p:attrName>
-                                        </p:attrNameLst>
-                                      </p:cBhvr>
-                                      <p:to>
-                                        <p:strVal val="visible"/>
-                                      </p:to>
-                                    </p:set>
-                                  </p:childTnLst>
-                                </p:cTn>
-                              </p:par>
-                            </p:childTnLst>
-                          </p:cTn>
-                        </p:par>
-                      </p:childTnLst>
-                    </p:cTn>
-                  </p:par>
-                  <p:par>
-                    <p:cTn id="97" fill="hold">
-                      <p:stCondLst>
-                        <p:cond delay="indefinite"/>
-                      </p:stCondLst>
-                      <p:childTnLst>
-                        <p:par>
-                          <p:cTn id="98" fill="hold">
-                            <p:stCondLst>
-                              <p:cond delay="0"/>
-                            </p:stCondLst>
-                            <p:childTnLst>
-                              <p:par>
-                                <p:cTn id="99" presetID="1" presetClass="entr" presetSubtype="0" fill="hold" nodeType="clickEffect">
-                                  <p:stCondLst>
-                                    <p:cond delay="0"/>
-                                  </p:stCondLst>
-                                  <p:childTnLst>
-                                    <p:set>
-                                      <p:cBhvr>
-                                        <p:cTn id="100" dur="1" fill="hold">
-                                          <p:stCondLst>
-                                            <p:cond delay="0"/>
-                                          </p:stCondLst>
-                                        </p:cTn>
-                                        <p:tgtEl>
-                                          <p:spTgt spid="63"/>
-                                        </p:tgtEl>
-                                        <p:attrNameLst>
-                                          <p:attrName>style.visibility</p:attrName>
-                                        </p:attrNameLst>
-                                      </p:cBhvr>
-                                      <p:to>
-                                        <p:strVal val="visible"/>
-                                      </p:to>
-                                    </p:set>
-                                  </p:childTnLst>
-                                </p:cTn>
-                              </p:par>
-                              <p:par>
-                                <p:cTn id="101" presetID="1" presetClass="entr" presetSubtype="0" fill="hold" grpId="0" nodeType="withEffect">
-                                  <p:stCondLst>
-                                    <p:cond delay="0"/>
-                                  </p:stCondLst>
-                                  <p:childTnLst>
-                                    <p:set>
-                                      <p:cBhvr>
-                                        <p:cTn id="102" dur="1" fill="hold">
-                                          <p:stCondLst>
-                                            <p:cond delay="0"/>
-                                          </p:stCondLst>
-                                        </p:cTn>
-                                        <p:tgtEl>
                                           <p:spTgt spid="62"/>
                                         </p:tgtEl>
                                         <p:attrNameLst>
@@ -28828,14 +29562,14 @@
                                 </p:cTn>
                               </p:par>
                               <p:par>
-                                <p:cTn id="103" presetID="1" presetClass="entr" presetSubtype="0" fill="hold" grpId="0" nodeType="withEffect">
+                                <p:cTn id="97" presetID="1" presetClass="entr" presetSubtype="0" fill="hold" grpId="0" nodeType="withEffect">
                                   <p:stCondLst>
                                     <p:cond delay="0"/>
                                   </p:stCondLst>
                                   <p:childTnLst>
                                     <p:set>
                                       <p:cBhvr>
-                                        <p:cTn id="104" dur="1" fill="hold">
+                                        <p:cTn id="98" dur="1" fill="hold">
                                           <p:stCondLst>
                                             <p:cond delay="0"/>
                                           </p:stCondLst>
@@ -28861,26 +29595,26 @@
                     </p:cTn>
                   </p:par>
                   <p:par>
-                    <p:cTn id="105" fill="hold">
+                    <p:cTn id="99" fill="hold">
                       <p:stCondLst>
                         <p:cond delay="indefinite"/>
                       </p:stCondLst>
                       <p:childTnLst>
                         <p:par>
-                          <p:cTn id="106" fill="hold">
+                          <p:cTn id="100" fill="hold">
                             <p:stCondLst>
                               <p:cond delay="0"/>
                             </p:stCondLst>
                             <p:childTnLst>
                               <p:par>
-                                <p:cTn id="107" presetID="1" presetClass="entr" presetSubtype="0" fill="hold" grpId="0" nodeType="clickEffect">
+                                <p:cTn id="101" presetID="1" presetClass="entr" presetSubtype="0" fill="hold" grpId="0" nodeType="clickEffect">
                                   <p:stCondLst>
                                     <p:cond delay="0"/>
                                   </p:stCondLst>
                                   <p:childTnLst>
                                     <p:set>
                                       <p:cBhvr>
-                                        <p:cTn id="108" dur="1" fill="hold">
+                                        <p:cTn id="102" dur="1" fill="hold">
                                           <p:stCondLst>
                                             <p:cond delay="0"/>
                                           </p:stCondLst>
@@ -28900,7 +29634,79 @@
                                 </p:cTn>
                               </p:par>
                               <p:par>
-                                <p:cTn id="109" presetID="1" presetClass="entr" presetSubtype="0" fill="hold" nodeType="withEffect">
+                                <p:cTn id="103" presetID="1" presetClass="entr" presetSubtype="0" fill="hold" nodeType="withEffect">
+                                  <p:stCondLst>
+                                    <p:cond delay="0"/>
+                                  </p:stCondLst>
+                                  <p:childTnLst>
+                                    <p:set>
+                                      <p:cBhvr>
+                                        <p:cTn id="104" dur="1" fill="hold">
+                                          <p:stCondLst>
+                                            <p:cond delay="0"/>
+                                          </p:stCondLst>
+                                        </p:cTn>
+                                        <p:tgtEl>
+                                          <p:spTgt spid="67"/>
+                                        </p:tgtEl>
+                                        <p:attrNameLst>
+                                          <p:attrName>style.visibility</p:attrName>
+                                        </p:attrNameLst>
+                                      </p:cBhvr>
+                                      <p:to>
+                                        <p:strVal val="visible"/>
+                                      </p:to>
+                                    </p:set>
+                                  </p:childTnLst>
+                                </p:cTn>
+                              </p:par>
+                              <p:par>
+                                <p:cTn id="105" presetID="1" presetClass="entr" presetSubtype="0" fill="hold" grpId="0" nodeType="withEffect">
+                                  <p:stCondLst>
+                                    <p:cond delay="0"/>
+                                  </p:stCondLst>
+                                  <p:childTnLst>
+                                    <p:set>
+                                      <p:cBhvr>
+                                        <p:cTn id="106" dur="1" fill="hold">
+                                          <p:stCondLst>
+                                            <p:cond delay="0"/>
+                                          </p:stCondLst>
+                                        </p:cTn>
+                                        <p:tgtEl>
+                                          <p:spTgt spid="23"/>
+                                        </p:tgtEl>
+                                        <p:attrNameLst>
+                                          <p:attrName>style.visibility</p:attrName>
+                                        </p:attrNameLst>
+                                      </p:cBhvr>
+                                      <p:to>
+                                        <p:strVal val="visible"/>
+                                      </p:to>
+                                    </p:set>
+                                  </p:childTnLst>
+                                </p:cTn>
+                              </p:par>
+                            </p:childTnLst>
+                          </p:cTn>
+                        </p:par>
+                      </p:childTnLst>
+                    </p:cTn>
+                  </p:par>
+                  <p:par>
+                    <p:cTn id="107" fill="hold">
+                      <p:stCondLst>
+                        <p:cond delay="indefinite"/>
+                      </p:stCondLst>
+                      <p:childTnLst>
+                        <p:par>
+                          <p:cTn id="108" fill="hold">
+                            <p:stCondLst>
+                              <p:cond delay="0"/>
+                            </p:stCondLst>
+                            <p:childTnLst>
+                              <p:par>
+                                <p:cTn id="109" presetID="1" presetClass="entr" presetSubtype="0" fill="hold" grpId="0" nodeType="clickEffect">
                                   <p:stCondLst>
                                     <p:cond delay="0"/>
                                   </p:stCondLst>
@@ -28913,7 +29719,7 @@
                                           </p:stCondLst>
                                         </p:cTn>
                                         <p:tgtEl>
-                                          <p:spTgt spid="67"/>
+                                          <p:spTgt spid="68"/>
                                         </p:tgtEl>
                                         <p:attrNameLst>
                                           <p:attrName>style.visibility</p:attrName>
@@ -28940,78 +29746,6 @@
                                           </p:stCondLst>
                                         </p:cTn>
                                         <p:tgtEl>
-                                          <p:spTgt spid="23"/>
-                                        </p:tgtEl>
-                                        <p:attrNameLst>
-                                          <p:attrName>style.visibility</p:attrName>
-                                        </p:attrNameLst>
-                                      </p:cBhvr>
-                                      <p:to>
-                                        <p:strVal val="visible"/>
-                                      </p:to>
-                                    </p:set>
-                                  </p:childTnLst>
-                                </p:cTn>
-                              </p:par>
-                            </p:childTnLst>
-                          </p:cTn>
-                        </p:par>
-                      </p:childTnLst>
-                    </p:cTn>
-                  </p:par>
-                  <p:par>
-                    <p:cTn id="113" fill="hold">
-                      <p:stCondLst>
-                        <p:cond delay="indefinite"/>
-                      </p:stCondLst>
-                      <p:childTnLst>
-                        <p:par>
-                          <p:cTn id="114" fill="hold">
-                            <p:stCondLst>
-                              <p:cond delay="0"/>
-                            </p:stCondLst>
-                            <p:childTnLst>
-                              <p:par>
-                                <p:cTn id="115" presetID="1" presetClass="entr" presetSubtype="0" fill="hold" grpId="0" nodeType="clickEffect">
-                                  <p:stCondLst>
-                                    <p:cond delay="0"/>
-                                  </p:stCondLst>
-                                  <p:childTnLst>
-                                    <p:set>
-                                      <p:cBhvr>
-                                        <p:cTn id="116" dur="1" fill="hold">
-                                          <p:stCondLst>
-                                            <p:cond delay="0"/>
-                                          </p:stCondLst>
-                                        </p:cTn>
-                                        <p:tgtEl>
-                                          <p:spTgt spid="68"/>
-                                        </p:tgtEl>
-                                        <p:attrNameLst>
-                                          <p:attrName>style.visibility</p:attrName>
-                                        </p:attrNameLst>
-                                      </p:cBhvr>
-                                      <p:to>
-                                        <p:strVal val="visible"/>
-                                      </p:to>
-                                    </p:set>
-                                  </p:childTnLst>
-                                </p:cTn>
-                              </p:par>
-                              <p:par>
-                                <p:cTn id="117" presetID="1" presetClass="entr" presetSubtype="0" fill="hold" grpId="0" nodeType="withEffect">
-                                  <p:stCondLst>
-                                    <p:cond delay="0"/>
-                                  </p:stCondLst>
-                                  <p:childTnLst>
-                                    <p:set>
-                                      <p:cBhvr>
-                                        <p:cTn id="118" dur="1" fill="hold">
-                                          <p:stCondLst>
-                                            <p:cond delay="0"/>
-                                          </p:stCondLst>
-                                        </p:cTn>
-                                        <p:tgtEl>
                                           <p:spTgt spid="24"/>
                                         </p:tgtEl>
                                         <p:attrNameLst>
@@ -29026,14 +29760,14 @@
                                 </p:cTn>
                               </p:par>
                               <p:par>
-                                <p:cTn id="119" presetID="1" presetClass="entr" presetSubtype="0" fill="hold" nodeType="withEffect">
+                                <p:cTn id="113" presetID="1" presetClass="entr" presetSubtype="0" fill="hold" nodeType="withEffect">
                                   <p:stCondLst>
                                     <p:cond delay="0"/>
                                   </p:stCondLst>
                                   <p:childTnLst>
                                     <p:set>
                                       <p:cBhvr>
-                                        <p:cTn id="120" dur="1" fill="hold">
+                                        <p:cTn id="114" dur="1" fill="hold">
                                           <p:stCondLst>
                                             <p:cond delay="0"/>
                                           </p:stCondLst>
@@ -29059,26 +29793,26 @@
                     </p:cTn>
                   </p:par>
                   <p:par>
-                    <p:cTn id="121" fill="hold">
+                    <p:cTn id="115" fill="hold">
                       <p:stCondLst>
                         <p:cond delay="indefinite"/>
                       </p:stCondLst>
                       <p:childTnLst>
                         <p:par>
-                          <p:cTn id="122" fill="hold">
+                          <p:cTn id="116" fill="hold">
                             <p:stCondLst>
                               <p:cond delay="0"/>
                             </p:stCondLst>
                             <p:childTnLst>
                               <p:par>
-                                <p:cTn id="123" presetID="1" presetClass="entr" presetSubtype="0" fill="hold" grpId="0" nodeType="clickEffect">
+                                <p:cTn id="117" presetID="1" presetClass="entr" presetSubtype="0" fill="hold" grpId="0" nodeType="clickEffect">
                                   <p:stCondLst>
                                     <p:cond delay="0"/>
                                   </p:stCondLst>
                                   <p:childTnLst>
                                     <p:set>
                                       <p:cBhvr>
-                                        <p:cTn id="124" dur="1" fill="hold">
+                                        <p:cTn id="118" dur="1" fill="hold">
                                           <p:stCondLst>
                                             <p:cond delay="0"/>
                                           </p:stCondLst>
@@ -29098,7 +29832,88 @@
                                 </p:cTn>
                               </p:par>
                               <p:par>
-                                <p:cTn id="125" presetID="1" presetClass="entr" presetSubtype="0" fill="hold" grpId="0" nodeType="withEffect">
+                                <p:cTn id="119" presetID="1" presetClass="entr" presetSubtype="0" fill="hold" grpId="0" nodeType="withEffect">
+                                  <p:stCondLst>
+                                    <p:cond delay="0"/>
+                                  </p:stCondLst>
+                                  <p:childTnLst>
+                                    <p:set>
+                                      <p:cBhvr>
+                                        <p:cTn id="120" dur="1" fill="hold">
+                                          <p:stCondLst>
+                                            <p:cond delay="0"/>
+                                          </p:stCondLst>
+                                        </p:cTn>
+                                        <p:tgtEl>
+                                          <p:spTgt spid="81"/>
+                                        </p:tgtEl>
+                                        <p:attrNameLst>
+                                          <p:attrName>style.visibility</p:attrName>
+                                        </p:attrNameLst>
+                                      </p:cBhvr>
+                                      <p:to>
+                                        <p:strVal val="visible"/>
+                                      </p:to>
+                                    </p:set>
+                                  </p:childTnLst>
+                                </p:cTn>
+                              </p:par>
+                              <p:par>
+                                <p:cTn id="121" presetID="1" presetClass="entr" presetSubtype="0" fill="hold" grpId="0" nodeType="withEffect">
+                                  <p:stCondLst>
+                                    <p:cond delay="0"/>
+                                  </p:stCondLst>
+                                  <p:childTnLst>
+                                    <p:set>
+                                      <p:cBhvr>
+                                        <p:cTn id="122" dur="1" fill="hold">
+                                          <p:stCondLst>
+                                            <p:cond delay="0"/>
+                                          </p:stCondLst>
+                                        </p:cTn>
+                                        <p:tgtEl>
+                                          <p:spTgt spid="82"/>
+                                        </p:tgtEl>
+                                        <p:attrNameLst>
+                                          <p:attrName>style.visibility</p:attrName>
+                                        </p:attrNameLst>
+                                      </p:cBhvr>
+                                      <p:to>
+                                        <p:strVal val="visible"/>
+                                      </p:to>
+                                    </p:set>
+                                  </p:childTnLst>
+                                </p:cTn>
+                              </p:par>
+                              <p:par>
+                                <p:cTn id="123" presetID="1" presetClass="entr" presetSubtype="0" fill="hold" grpId="0" nodeType="withEffect">
+                                  <p:stCondLst>
+                                    <p:cond delay="0"/>
+                                  </p:stCondLst>
+                                  <p:childTnLst>
+                                    <p:set>
+                                      <p:cBhvr>
+                                        <p:cTn id="124" dur="1" fill="hold">
+                                          <p:stCondLst>
+                                            <p:cond delay="0"/>
+                                          </p:stCondLst>
+                                        </p:cTn>
+                                        <p:tgtEl>
+                                          <p:spTgt spid="83"/>
+                                        </p:tgtEl>
+                                        <p:attrNameLst>
+                                          <p:attrName>style.visibility</p:attrName>
+                                        </p:attrNameLst>
+                                      </p:cBhvr>
+                                      <p:to>
+                                        <p:strVal val="visible"/>
+                                      </p:to>
+                                    </p:set>
+                                  </p:childTnLst>
+                                </p:cTn>
+                              </p:par>
+                              <p:par>
+                                <p:cTn id="125" presetID="1" presetClass="entr" presetSubtype="0" fill="hold" nodeType="withEffect">
                                   <p:stCondLst>
                                     <p:cond delay="0"/>
                                   </p:stCondLst>
@@ -29111,7 +29926,7 @@
                                           </p:stCondLst>
                                         </p:cTn>
                                         <p:tgtEl>
-                                          <p:spTgt spid="81"/>
+                                          <p:spTgt spid="69"/>
                                         </p:tgtEl>
                                         <p:attrNameLst>
                                           <p:attrName>style.visibility</p:attrName>
@@ -29138,7 +29953,7 @@
                                           </p:stCondLst>
                                         </p:cTn>
                                         <p:tgtEl>
-                                          <p:spTgt spid="82"/>
+                                          <p:spTgt spid="34"/>
                                         </p:tgtEl>
                                         <p:attrNameLst>
                                           <p:attrName>style.visibility</p:attrName>
@@ -29165,7 +29980,7 @@
                                           </p:stCondLst>
                                         </p:cTn>
                                         <p:tgtEl>
-                                          <p:spTgt spid="83"/>
+                                          <p:spTgt spid="37"/>
                                         </p:tgtEl>
                                         <p:attrNameLst>
                                           <p:attrName>style.visibility</p:attrName>
@@ -29179,7 +29994,7 @@
                                 </p:cTn>
                               </p:par>
                               <p:par>
-                                <p:cTn id="131" presetID="1" presetClass="entr" presetSubtype="0" fill="hold" nodeType="withEffect">
+                                <p:cTn id="131" presetID="1" presetClass="entr" presetSubtype="0" fill="hold" grpId="0" nodeType="withEffect">
                                   <p:stCondLst>
                                     <p:cond delay="0"/>
                                   </p:stCondLst>
@@ -29192,7 +30007,7 @@
                                           </p:stCondLst>
                                         </p:cTn>
                                         <p:tgtEl>
-                                          <p:spTgt spid="69"/>
+                                          <p:spTgt spid="38"/>
                                         </p:tgtEl>
                                         <p:attrNameLst>
                                           <p:attrName>style.visibility</p:attrName>
@@ -29219,87 +30034,6 @@
                                           </p:stCondLst>
                                         </p:cTn>
                                         <p:tgtEl>
-                                          <p:spTgt spid="34"/>
-                                        </p:tgtEl>
-                                        <p:attrNameLst>
-                                          <p:attrName>style.visibility</p:attrName>
-                                        </p:attrNameLst>
-                                      </p:cBhvr>
-                                      <p:to>
-                                        <p:strVal val="visible"/>
-                                      </p:to>
-                                    </p:set>
-                                  </p:childTnLst>
-                                </p:cTn>
-                              </p:par>
-                              <p:par>
-                                <p:cTn id="135" presetID="1" presetClass="entr" presetSubtype="0" fill="hold" grpId="0" nodeType="withEffect">
-                                  <p:stCondLst>
-                                    <p:cond delay="0"/>
-                                  </p:stCondLst>
-                                  <p:childTnLst>
-                                    <p:set>
-                                      <p:cBhvr>
-                                        <p:cTn id="136" dur="1" fill="hold">
-                                          <p:stCondLst>
-                                            <p:cond delay="0"/>
-                                          </p:stCondLst>
-                                        </p:cTn>
-                                        <p:tgtEl>
-                                          <p:spTgt spid="37"/>
-                                        </p:tgtEl>
-                                        <p:attrNameLst>
-                                          <p:attrName>style.visibility</p:attrName>
-                                        </p:attrNameLst>
-                                      </p:cBhvr>
-                                      <p:to>
-                                        <p:strVal val="visible"/>
-                                      </p:to>
-                                    </p:set>
-                                  </p:childTnLst>
-                                </p:cTn>
-                              </p:par>
-                              <p:par>
-                                <p:cTn id="137" presetID="1" presetClass="entr" presetSubtype="0" fill="hold" grpId="0" nodeType="withEffect">
-                                  <p:stCondLst>
-                                    <p:cond delay="0"/>
-                                  </p:stCondLst>
-                                  <p:childTnLst>
-                                    <p:set>
-                                      <p:cBhvr>
-                                        <p:cTn id="138" dur="1" fill="hold">
-                                          <p:stCondLst>
-                                            <p:cond delay="0"/>
-                                          </p:stCondLst>
-                                        </p:cTn>
-                                        <p:tgtEl>
-                                          <p:spTgt spid="38"/>
-                                        </p:tgtEl>
-                                        <p:attrNameLst>
-                                          <p:attrName>style.visibility</p:attrName>
-                                        </p:attrNameLst>
-                                      </p:cBhvr>
-                                      <p:to>
-                                        <p:strVal val="visible"/>
-                                      </p:to>
-                                    </p:set>
-                                  </p:childTnLst>
-                                </p:cTn>
-                              </p:par>
-                              <p:par>
-                                <p:cTn id="139" presetID="1" presetClass="entr" presetSubtype="0" fill="hold" grpId="0" nodeType="withEffect">
-                                  <p:stCondLst>
-                                    <p:cond delay="0"/>
-                                  </p:stCondLst>
-                                  <p:childTnLst>
-                                    <p:set>
-                                      <p:cBhvr>
-                                        <p:cTn id="140" dur="1" fill="hold">
-                                          <p:stCondLst>
-                                            <p:cond delay="0"/>
-                                          </p:stCondLst>
-                                        </p:cTn>
-                                        <p:tgtEl>
                                           <p:spTgt spid="42"/>
                                         </p:tgtEl>
                                         <p:attrNameLst>
@@ -29320,26 +30054,26 @@
                     </p:cTn>
                   </p:par>
                   <p:par>
-                    <p:cTn id="141" fill="hold">
+                    <p:cTn id="135" fill="hold">
                       <p:stCondLst>
                         <p:cond delay="indefinite"/>
                       </p:stCondLst>
                       <p:childTnLst>
                         <p:par>
-                          <p:cTn id="142" fill="hold">
+                          <p:cTn id="136" fill="hold">
                             <p:stCondLst>
                               <p:cond delay="0"/>
                             </p:stCondLst>
                             <p:childTnLst>
                               <p:par>
-                                <p:cTn id="143" presetID="1" presetClass="entr" presetSubtype="0" fill="hold" grpId="0" nodeType="clickEffect">
+                                <p:cTn id="137" presetID="1" presetClass="entr" presetSubtype="0" fill="hold" grpId="0" nodeType="clickEffect">
                                   <p:stCondLst>
                                     <p:cond delay="0"/>
                                   </p:stCondLst>
                                   <p:childTnLst>
                                     <p:set>
                                       <p:cBhvr>
-                                        <p:cTn id="144" dur="1" fill="hold">
+                                        <p:cTn id="138" dur="1" fill="hold">
                                           <p:stCondLst>
                                             <p:cond delay="0"/>
                                           </p:stCondLst>
@@ -29386,7 +30120,6 @@
       </p:par>
     </p:tnLst>
     <p:bldLst>
-      <p:bldP spid="78" grpId="0" build="p"/>
       <p:bldP spid="5" grpId="0"/>
       <p:bldP spid="9" grpId="0" animBg="1"/>
       <p:bldP spid="15" grpId="0"/>
@@ -29417,6 +30150,7 @@
       <p:bldP spid="37" grpId="0" animBg="1"/>
       <p:bldP spid="38" grpId="0" animBg="1"/>
       <p:bldP spid="42" grpId="0" animBg="1"/>
+      <p:bldP spid="78" grpId="0" build="p"/>
     </p:bldLst>
   </p:timing>
 </p:sld>

</xml_diff>